<commit_message>
Tentative d'intégration de la partie d'Enol et Laure
</commit_message>
<xml_diff>
--- a/UE14-poster-sujet14.pptx
+++ b/UE14-poster-sujet14.pptx
@@ -553,7 +553,7 @@
                 <c:order val="2"/>
                 <c:tx>
                   <c:strRef>
-                    <c:extLst>
+                    <c:extLst xmlns:c15="http://schemas.microsoft.com/office/drawing/2012/chart">
                       <c:ext xmlns:c15="http://schemas.microsoft.com/office/drawing/2012/chart" uri="{02D57815-91ED-43cb-92C2-25804820EDAC}">
                         <c15:formulaRef>
                           <c15:sqref>Feuil1!$D$1</c15:sqref>
@@ -582,7 +582,7 @@
                 <c:invertIfNegative val="0"/>
                 <c:cat>
                   <c:strRef>
-                    <c:extLst>
+                    <c:extLst xmlns:c15="http://schemas.microsoft.com/office/drawing/2012/chart">
                       <c:ext xmlns:c15="http://schemas.microsoft.com/office/drawing/2012/chart" uri="{02D57815-91ED-43cb-92C2-25804820EDAC}">
                         <c15:formulaRef>
                           <c15:sqref>Feuil1!$A$2:$A$5</c15:sqref>
@@ -608,7 +608,7 @@
                 </c:cat>
                 <c:val>
                   <c:numRef>
-                    <c:extLst>
+                    <c:extLst xmlns:c15="http://schemas.microsoft.com/office/drawing/2012/chart">
                       <c:ext xmlns:c15="http://schemas.microsoft.com/office/drawing/2012/chart" uri="{02D57815-91ED-43cb-92C2-25804820EDAC}">
                         <c15:formulaRef>
                           <c15:sqref>Feuil1!$D$2:$D$5</c15:sqref>
@@ -633,7 +633,7 @@
                     </c:numCache>
                   </c:numRef>
                 </c:val>
-                <c:extLst>
+                <c:extLst xmlns:c15="http://schemas.microsoft.com/office/drawing/2012/chart">
                   <c:ext xmlns:c16="http://schemas.microsoft.com/office/drawing/2014/chart" uri="{C3380CC4-5D6E-409C-BE32-E72D297353CC}">
                     <c16:uniqueId val="{00000002-6B7B-499E-8BFB-B1A285E080E8}"/>
                   </c:ext>
@@ -2690,14 +2690,11 @@
         <a:lstStyle/>
         <a:p>
           <a:r>
-            <a:rPr lang="fr-FR" dirty="0" smtClean="0">
+            <a:rPr lang="fr-FR" dirty="0">
               <a:latin typeface="Berlin Sans FB Demi" panose="020E0802020502020306" pitchFamily="34" charset="0"/>
             </a:rPr>
             <a:t>Diminuer le temps de vie d’un objet réintègre son cuivre plus vite dans la production… mais l’expose plus souvent à des pertes (taux de collecte et de recyclage) </a:t>
           </a:r>
-          <a:endParaRPr lang="fr-FR" dirty="0">
-            <a:latin typeface="Berlin Sans FB Demi" panose="020E0802020502020306" pitchFamily="34" charset="0"/>
-          </a:endParaRPr>
         </a:p>
       </dgm:t>
     </dgm:pt>
@@ -2731,14 +2728,11 @@
         <a:lstStyle/>
         <a:p>
           <a:r>
-            <a:rPr lang="fr-FR" dirty="0" smtClean="0">
+            <a:rPr lang="fr-FR" dirty="0">
               <a:latin typeface="Berlin Sans FB Demi" panose="020E0802020502020306" pitchFamily="34" charset="0"/>
             </a:rPr>
             <a:t>Augmenter le temps de vie d’un objet empêche de le récupérer rapidement… mais diminue les pertes</a:t>
           </a:r>
-          <a:endParaRPr lang="fr-FR" dirty="0">
-            <a:latin typeface="Berlin Sans FB Demi" panose="020E0802020502020306" pitchFamily="34" charset="0"/>
-          </a:endParaRPr>
         </a:p>
       </dgm:t>
     </dgm:pt>
@@ -2802,11 +2796,11 @@
     </dgm:pt>
   </dgm:ptLst>
   <dgm:cxnLst>
+    <dgm:cxn modelId="{C5489E2D-8BB1-440A-A12A-64B5F996DFA9}" srcId="{62283C60-3109-4813-B877-13E1614CDC93}" destId="{17BBD623-3721-4BE3-B5FF-A77E851E6C3A}" srcOrd="1" destOrd="0" parTransId="{325CCC3D-332C-4DE6-AB10-163FF393F513}" sibTransId="{F5113C04-32F2-4C70-B297-10FE83FD3990}"/>
+    <dgm:cxn modelId="{19630F6B-1AA5-4421-B2C3-BC00822E03AE}" type="presOf" srcId="{62283C60-3109-4813-B877-13E1614CDC93}" destId="{2F932DFC-8D37-483E-A0D8-A2CDC6234D5A}" srcOrd="0" destOrd="0" presId="urn:microsoft.com/office/officeart/2005/8/layout/arrow4"/>
+    <dgm:cxn modelId="{46A35756-E392-4F63-8B0D-E09E3471B508}" type="presOf" srcId="{E0C05CFD-A0F4-4469-80A1-D3C82E738803}" destId="{B7F1DF16-F3B8-4818-87F6-0E05AF45A2C7}" srcOrd="0" destOrd="0" presId="urn:microsoft.com/office/officeart/2005/8/layout/arrow4"/>
     <dgm:cxn modelId="{9F93F595-404B-417B-9B5C-8EEC8250C40D}" srcId="{62283C60-3109-4813-B877-13E1614CDC93}" destId="{E0C05CFD-A0F4-4469-80A1-D3C82E738803}" srcOrd="0" destOrd="0" parTransId="{D7FBCCD6-7AB3-4158-89FA-121B2FC05415}" sibTransId="{B627ABA9-4BDA-4297-9FAC-496080351108}"/>
     <dgm:cxn modelId="{F041FF9F-E371-49A1-8B72-99DCAA313406}" type="presOf" srcId="{17BBD623-3721-4BE3-B5FF-A77E851E6C3A}" destId="{F3542F7E-34C6-4CCA-B44D-663D3A574EF0}" srcOrd="0" destOrd="0" presId="urn:microsoft.com/office/officeart/2005/8/layout/arrow4"/>
-    <dgm:cxn modelId="{19630F6B-1AA5-4421-B2C3-BC00822E03AE}" type="presOf" srcId="{62283C60-3109-4813-B877-13E1614CDC93}" destId="{2F932DFC-8D37-483E-A0D8-A2CDC6234D5A}" srcOrd="0" destOrd="0" presId="urn:microsoft.com/office/officeart/2005/8/layout/arrow4"/>
-    <dgm:cxn modelId="{C5489E2D-8BB1-440A-A12A-64B5F996DFA9}" srcId="{62283C60-3109-4813-B877-13E1614CDC93}" destId="{17BBD623-3721-4BE3-B5FF-A77E851E6C3A}" srcOrd="1" destOrd="0" parTransId="{325CCC3D-332C-4DE6-AB10-163FF393F513}" sibTransId="{F5113C04-32F2-4C70-B297-10FE83FD3990}"/>
-    <dgm:cxn modelId="{46A35756-E392-4F63-8B0D-E09E3471B508}" type="presOf" srcId="{E0C05CFD-A0F4-4469-80A1-D3C82E738803}" destId="{B7F1DF16-F3B8-4818-87F6-0E05AF45A2C7}" srcOrd="0" destOrd="0" presId="urn:microsoft.com/office/officeart/2005/8/layout/arrow4"/>
     <dgm:cxn modelId="{2CD72FE7-FA60-480C-A26D-B6C100B8F548}" type="presParOf" srcId="{2F932DFC-8D37-483E-A0D8-A2CDC6234D5A}" destId="{2D99AE35-4FB4-4D7D-98F5-32707679D85C}" srcOrd="0" destOrd="0" presId="urn:microsoft.com/office/officeart/2005/8/layout/arrow4"/>
     <dgm:cxn modelId="{EC8D77D3-718B-466D-97FD-33D3465DEC26}" type="presParOf" srcId="{2F932DFC-8D37-483E-A0D8-A2CDC6234D5A}" destId="{B7F1DF16-F3B8-4818-87F6-0E05AF45A2C7}" srcOrd="1" destOrd="0" presId="urn:microsoft.com/office/officeart/2005/8/layout/arrow4"/>
     <dgm:cxn modelId="{FE143A34-CAA1-443E-A353-F7B35F1A320F}" type="presParOf" srcId="{2F932DFC-8D37-483E-A0D8-A2CDC6234D5A}" destId="{F19A29E1-E739-4CD4-BCD6-86B4881388E5}" srcOrd="2" destOrd="0" presId="urn:microsoft.com/office/officeart/2005/8/layout/arrow4"/>
@@ -2917,7 +2911,7 @@
         </a:bodyPr>
         <a:lstStyle/>
         <a:p>
-          <a:pPr lvl="0" algn="l" defTabSz="711200">
+          <a:pPr marL="0" lvl="0" indent="0" algn="l" defTabSz="711200">
             <a:lnSpc>
               <a:spcPct val="90000"/>
             </a:lnSpc>
@@ -2927,16 +2921,14 @@
             <a:spcAft>
               <a:spcPct val="35000"/>
             </a:spcAft>
+            <a:buNone/>
           </a:pPr>
           <a:r>
-            <a:rPr lang="fr-FR" sz="1600" kern="1200" dirty="0" smtClean="0">
+            <a:rPr lang="fr-FR" sz="1600" kern="1200" dirty="0">
               <a:latin typeface="Berlin Sans FB Demi" panose="020E0802020502020306" pitchFamily="34" charset="0"/>
             </a:rPr>
             <a:t>Augmenter le temps de vie d’un objet empêche de le récupérer rapidement… mais diminue les pertes</a:t>
           </a:r>
-          <a:endParaRPr lang="fr-FR" sz="1600" kern="1200" dirty="0">
-            <a:latin typeface="Berlin Sans FB Demi" panose="020E0802020502020306" pitchFamily="34" charset="0"/>
-          </a:endParaRPr>
         </a:p>
       </dsp:txBody>
       <dsp:txXfrm>
@@ -3031,7 +3023,7 @@
         </a:bodyPr>
         <a:lstStyle/>
         <a:p>
-          <a:pPr lvl="0" algn="l" defTabSz="711200">
+          <a:pPr marL="0" lvl="0" indent="0" algn="l" defTabSz="711200">
             <a:lnSpc>
               <a:spcPct val="90000"/>
             </a:lnSpc>
@@ -3041,16 +3033,14 @@
             <a:spcAft>
               <a:spcPct val="35000"/>
             </a:spcAft>
+            <a:buNone/>
           </a:pPr>
           <a:r>
-            <a:rPr lang="fr-FR" sz="1600" kern="1200" dirty="0" smtClean="0">
+            <a:rPr lang="fr-FR" sz="1600" kern="1200" dirty="0">
               <a:latin typeface="Berlin Sans FB Demi" panose="020E0802020502020306" pitchFamily="34" charset="0"/>
             </a:rPr>
             <a:t>Diminuer le temps de vie d’un objet réintègre son cuivre plus vite dans la production… mais l’expose plus souvent à des pertes (taux de collecte et de recyclage) </a:t>
           </a:r>
-          <a:endParaRPr lang="fr-FR" sz="1600" kern="1200" dirty="0">
-            <a:latin typeface="Berlin Sans FB Demi" panose="020E0802020502020306" pitchFamily="34" charset="0"/>
-          </a:endParaRPr>
         </a:p>
       </dsp:txBody>
       <dsp:txXfrm>
@@ -4391,7 +4381,7 @@
         <a:lstStyle xmlns:a="http://schemas.openxmlformats.org/drawingml/2006/main"/>
         <a:p xmlns:a="http://schemas.openxmlformats.org/drawingml/2006/main">
           <a:r>
-            <a:rPr lang="en-GB" sz="1800" dirty="0" smtClean="0">
+            <a:rPr lang="en-GB" sz="1800" dirty="0">
               <a:solidFill>
                 <a:schemeClr val="bg1"/>
               </a:solidFill>
@@ -4431,7 +4421,7 @@
         <a:lstStyle xmlns:a="http://schemas.openxmlformats.org/drawingml/2006/main"/>
         <a:p xmlns:a="http://schemas.openxmlformats.org/drawingml/2006/main">
           <a:r>
-            <a:rPr lang="en-GB" sz="2400" dirty="0" smtClean="0">
+            <a:rPr lang="en-GB" sz="2400" dirty="0">
               <a:solidFill>
                 <a:schemeClr val="bg1"/>
               </a:solidFill>
@@ -4439,12 +4429,6 @@
             </a:rPr>
             <a:t>1000</a:t>
           </a:r>
-          <a:endParaRPr lang="en-GB" sz="2400" dirty="0">
-            <a:solidFill>
-              <a:schemeClr val="bg1"/>
-            </a:solidFill>
-            <a:latin typeface="Eras Demi ITC" panose="020B0805030504020804" pitchFamily="34" charset="0"/>
-          </a:endParaRPr>
         </a:p>
       </cdr:txBody>
     </cdr:sp>
@@ -4534,7 +4518,7 @@
           <a:p>
             <a:fld id="{A401968E-8C69-45DB-A237-BCB9D76C0F09}" type="datetimeFigureOut">
               <a:rPr lang="fr-FR" smtClean="0"/>
-              <a:t>10/12/2020</a:t>
+              <a:t>11/12/2020</a:t>
             </a:fld>
             <a:endParaRPr lang="fr-FR"/>
           </a:p>
@@ -9713,7 +9697,7 @@
           <a:lstStyle/>
           <a:p>
             <a:r>
-              <a:rPr lang="fr-FR" sz="4000" dirty="0" smtClean="0">
+              <a:rPr lang="fr-FR" sz="4000" dirty="0">
                 <a:solidFill>
                   <a:srgbClr val="00458A"/>
                 </a:solidFill>
@@ -9724,7 +9708,7 @@
               <a:t>Quelle part de la demande française en cuivre peut être satisfaite à partir du recyclage sur le territoire national des objets en </a:t>
             </a:r>
             <a:r>
-              <a:rPr lang="fr-FR" sz="4000" i="1" dirty="0" smtClean="0">
+              <a:rPr lang="fr-FR" sz="4000" i="1" dirty="0">
                 <a:solidFill>
                   <a:srgbClr val="00458A"/>
                 </a:solidFill>
@@ -9735,7 +9719,7 @@
               <a:t>fin de vie</a:t>
             </a:r>
             <a:r>
-              <a:rPr lang="fr-FR" sz="4000" dirty="0" smtClean="0">
+              <a:rPr lang="fr-FR" sz="4000" dirty="0">
                 <a:solidFill>
                   <a:srgbClr val="00458A"/>
                 </a:solidFill>
@@ -9745,7 +9729,7 @@
               </a:rPr>
               <a:t> ?</a:t>
             </a:r>
-            <a:endParaRPr lang="fr-FR" sz="3200" b="1" dirty="0" smtClean="0"/>
+            <a:endParaRPr lang="fr-FR" sz="3200" b="1" dirty="0"/>
           </a:p>
           <a:p>
             <a:pPr algn="r"/>
@@ -9758,27 +9742,8 @@
                 <a:ea typeface="+mj-ea"/>
                 <a:cs typeface="+mj-cs"/>
               </a:rPr>
-              <a:t>La France pourrait-elle-même devenir autonome en cuivre </a:t>
-            </a:r>
-            <a:r>
-              <a:rPr lang="fr-FR" sz="4000" dirty="0" smtClean="0">
-                <a:solidFill>
-                  <a:srgbClr val="00458A"/>
-                </a:solidFill>
-                <a:latin typeface="Berlin Sans FB Demi" panose="020E0802020502020306" pitchFamily="34" charset="0"/>
-                <a:ea typeface="+mj-ea"/>
-                <a:cs typeface="+mj-cs"/>
-              </a:rPr>
-              <a:t>?</a:t>
-            </a:r>
-            <a:endParaRPr lang="fr-FR" sz="4000" dirty="0">
-              <a:solidFill>
-                <a:srgbClr val="00458A"/>
-              </a:solidFill>
-              <a:latin typeface="Berlin Sans FB Demi" panose="020E0802020502020306" pitchFamily="34" charset="0"/>
-              <a:ea typeface="+mj-ea"/>
-              <a:cs typeface="+mj-cs"/>
-            </a:endParaRPr>
+              <a:t>La France pourrait-elle-même devenir autonome en cuivre ?</a:t>
+            </a:r>
           </a:p>
         </p:txBody>
       </p:sp>
@@ -9814,7 +9779,7 @@
               <a:defRPr/>
             </a:pPr>
             <a:r>
-              <a:rPr lang="fr-FR" sz="3200" i="1" dirty="0" smtClean="0">
+              <a:rPr lang="fr-FR" sz="3200" i="1" dirty="0">
                 <a:solidFill>
                   <a:srgbClr val="09B4E9"/>
                 </a:solidFill>
@@ -9938,7 +9903,7 @@
           <a:lstStyle/>
           <a:p>
             <a:r>
-              <a:rPr lang="fr-FR" sz="2800" b="1" u="sng" dirty="0" smtClean="0">
+              <a:rPr lang="fr-FR" sz="2800" b="1" u="sng" dirty="0">
                 <a:solidFill>
                   <a:srgbClr val="7030A0"/>
                 </a:solidFill>
@@ -9947,16 +9912,10 @@
               <a:t>Constat</a:t>
             </a:r>
             <a:r>
-              <a:rPr lang="fr-FR" sz="2800" dirty="0" smtClean="0">
-                <a:latin typeface="Berlin Sans FB Demi" panose="020E0802020502020306" pitchFamily="34" charset="0"/>
-              </a:rPr>
-              <a:t> : la </a:t>
-            </a:r>
-            <a:r>
               <a:rPr lang="fr-FR" sz="2800" dirty="0">
                 <a:latin typeface="Berlin Sans FB Demi" panose="020E0802020502020306" pitchFamily="34" charset="0"/>
               </a:rPr>
-              <a:t>France possède un </a:t>
+              <a:t> : la France possède un </a:t>
             </a:r>
             <a:r>
               <a:rPr lang="fr-FR" sz="2800" b="1" dirty="0">
@@ -9968,18 +9927,12 @@
               <a:rPr lang="fr-FR" sz="2800" dirty="0">
                 <a:latin typeface="Berlin Sans FB Demi" panose="020E0802020502020306" pitchFamily="34" charset="0"/>
               </a:rPr>
-              <a:t> de cuivre important sur son </a:t>
-            </a:r>
-            <a:r>
-              <a:rPr lang="fr-FR" sz="2800" dirty="0" smtClean="0">
-                <a:latin typeface="Berlin Sans FB Demi" panose="020E0802020502020306" pitchFamily="34" charset="0"/>
-              </a:rPr>
-              <a:t>territoire</a:t>
-            </a:r>
-          </a:p>
-          <a:p>
-            <a:r>
-              <a:rPr lang="fr-FR" sz="2800" b="1" u="sng" dirty="0" smtClean="0">
+              <a:t> de cuivre important sur son territoire</a:t>
+            </a:r>
+          </a:p>
+          <a:p>
+            <a:r>
+              <a:rPr lang="fr-FR" sz="2800" b="1" u="sng" dirty="0">
                 <a:solidFill>
                   <a:srgbClr val="7030A0"/>
                 </a:solidFill>
@@ -9988,34 +9941,16 @@
               <a:t>Objectif</a:t>
             </a:r>
             <a:r>
-              <a:rPr lang="fr-FR" sz="2800" dirty="0" smtClean="0">
-                <a:latin typeface="Berlin Sans FB Demi" panose="020E0802020502020306" pitchFamily="34" charset="0"/>
-              </a:rPr>
-              <a:t> </a:t>
-            </a:r>
-            <a:r>
               <a:rPr lang="fr-FR" sz="2800" dirty="0">
                 <a:latin typeface="Berlin Sans FB Demi" panose="020E0802020502020306" pitchFamily="34" charset="0"/>
               </a:rPr>
-              <a:t>: établir deux scénarios du recyclage français pour les 30 prochaines </a:t>
-            </a:r>
-            <a:r>
-              <a:rPr lang="fr-FR" sz="2800" dirty="0" smtClean="0">
-                <a:latin typeface="Berlin Sans FB Demi" panose="020E0802020502020306" pitchFamily="34" charset="0"/>
-              </a:rPr>
-              <a:t>années. Comparer alors la consommation et le recyclage en France : est-il </a:t>
+              <a:t> : établir deux scénarios du recyclage français pour les 30 prochaines années. Comparer alors la consommation et le recyclage en France : est-il </a:t>
             </a:r>
             <a:r>
               <a:rPr lang="fr-FR" sz="2800">
                 <a:latin typeface="Berlin Sans FB Demi" panose="020E0802020502020306" pitchFamily="34" charset="0"/>
               </a:rPr>
-              <a:t>réaliste </a:t>
-            </a:r>
-            <a:r>
-              <a:rPr lang="fr-FR" sz="2800" smtClean="0">
-                <a:latin typeface="Berlin Sans FB Demi" panose="020E0802020502020306" pitchFamily="34" charset="0"/>
-              </a:rPr>
-              <a:t>d’pour </a:t>
+              <a:t>réaliste d’pour </a:t>
             </a:r>
             <a:r>
               <a:rPr lang="fr-FR" sz="2800" dirty="0">
@@ -10030,14 +9965,11 @@
               <a:t>toujours croissante </a:t>
             </a:r>
             <a:r>
-              <a:rPr lang="fr-FR" sz="2800" dirty="0" smtClean="0">
+              <a:rPr lang="fr-FR" sz="2800" dirty="0">
                 <a:latin typeface="Berlin Sans FB Demi" panose="020E0802020502020306" pitchFamily="34" charset="0"/>
               </a:rPr>
               <a:t>?</a:t>
             </a:r>
-            <a:endParaRPr lang="fr-FR" sz="2800" dirty="0">
-              <a:latin typeface="Berlin Sans FB Demi" panose="020E0802020502020306" pitchFamily="34" charset="0"/>
-            </a:endParaRPr>
           </a:p>
         </p:txBody>
       </p:sp>
@@ -10147,7 +10079,7 @@
           </a:lstStyle>
           <a:p>
             <a:r>
-              <a:rPr lang="en-GB" sz="1800" dirty="0" smtClean="0">
+              <a:rPr lang="en-GB" sz="1800" dirty="0">
                 <a:solidFill>
                   <a:schemeClr val="bg1"/>
                 </a:solidFill>
@@ -10155,7 +10087,7 @@
               </a:rPr>
               <a:t>VEHICULES</a:t>
             </a:r>
-            <a:endParaRPr lang="en-GB" sz="1600" dirty="0" smtClean="0">
+            <a:endParaRPr lang="en-GB" sz="1600" dirty="0">
               <a:solidFill>
                 <a:srgbClr val="FFC000"/>
               </a:solidFill>
@@ -10247,7 +10179,7 @@
           </a:lstStyle>
           <a:p>
             <a:r>
-              <a:rPr lang="en-GB" sz="1800" dirty="0" smtClean="0">
+              <a:rPr lang="en-GB" sz="1800" dirty="0">
                 <a:solidFill>
                   <a:schemeClr val="bg1"/>
                 </a:solidFill>
@@ -10258,7 +10190,7 @@
           </a:p>
           <a:p>
             <a:r>
-              <a:rPr lang="en-GB" sz="1800" dirty="0" smtClean="0">
+              <a:rPr lang="en-GB" sz="1800" dirty="0">
                 <a:solidFill>
                   <a:schemeClr val="bg1"/>
                 </a:solidFill>
@@ -10266,12 +10198,6 @@
               </a:rPr>
               <a:t>ELECTRONIQUES</a:t>
             </a:r>
-            <a:endParaRPr lang="en-GB" sz="1800" dirty="0" smtClean="0">
-              <a:solidFill>
-                <a:schemeClr val="bg1"/>
-              </a:solidFill>
-              <a:latin typeface="Berlin Sans FB Demi" panose="020E0802020502020306" pitchFamily="34" charset="0"/>
-            </a:endParaRPr>
           </a:p>
         </p:txBody>
       </p:sp>
@@ -10359,7 +10285,7 @@
           </a:lstStyle>
           <a:p>
             <a:r>
-              <a:rPr lang="en-GB" sz="1800" dirty="0" smtClean="0">
+              <a:rPr lang="en-GB" sz="1800" dirty="0">
                 <a:solidFill>
                   <a:schemeClr val="bg1"/>
                 </a:solidFill>
@@ -10370,7 +10296,7 @@
           </a:p>
           <a:p>
             <a:r>
-              <a:rPr lang="en-GB" sz="1800" dirty="0" smtClean="0">
+              <a:rPr lang="en-GB" sz="1800" dirty="0">
                 <a:solidFill>
                   <a:schemeClr val="bg1"/>
                 </a:solidFill>
@@ -10378,12 +10304,6 @@
               </a:rPr>
               <a:t>ELECTROMENAGER</a:t>
             </a:r>
-            <a:endParaRPr lang="en-GB" sz="1800" dirty="0" smtClean="0">
-              <a:solidFill>
-                <a:schemeClr val="bg1"/>
-              </a:solidFill>
-              <a:latin typeface="Berlin Sans FB Demi" panose="020E0802020502020306" pitchFamily="34" charset="0"/>
-            </a:endParaRPr>
           </a:p>
         </p:txBody>
       </p:sp>
@@ -10471,7 +10391,7 @@
           </a:lstStyle>
           <a:p>
             <a:r>
-              <a:rPr lang="en-GB" sz="2400" dirty="0" smtClean="0">
+              <a:rPr lang="en-GB" sz="2400" dirty="0">
                 <a:solidFill>
                   <a:schemeClr val="bg1"/>
                 </a:solidFill>
@@ -10479,12 +10399,6 @@
               </a:rPr>
               <a:t>225</a:t>
             </a:r>
-            <a:endParaRPr lang="en-GB" sz="2400" dirty="0">
-              <a:solidFill>
-                <a:schemeClr val="bg1"/>
-              </a:solidFill>
-              <a:latin typeface="Eras Demi ITC" panose="020B0805030504020804" pitchFamily="34" charset="0"/>
-            </a:endParaRPr>
           </a:p>
         </p:txBody>
       </p:sp>
@@ -10572,7 +10486,7 @@
           </a:lstStyle>
           <a:p>
             <a:r>
-              <a:rPr lang="en-GB" sz="2400" dirty="0" smtClean="0">
+              <a:rPr lang="en-GB" sz="2400" dirty="0">
                 <a:solidFill>
                   <a:schemeClr val="bg1"/>
                 </a:solidFill>
@@ -10580,12 +10494,6 @@
               </a:rPr>
               <a:t>10</a:t>
             </a:r>
-            <a:endParaRPr lang="en-GB" sz="2400" dirty="0">
-              <a:solidFill>
-                <a:schemeClr val="bg1"/>
-              </a:solidFill>
-              <a:latin typeface="Eras Demi ITC" panose="020B0805030504020804" pitchFamily="34" charset="0"/>
-            </a:endParaRPr>
           </a:p>
         </p:txBody>
       </p:sp>
@@ -10673,7 +10581,7 @@
           </a:lstStyle>
           <a:p>
             <a:r>
-              <a:rPr lang="en-GB" sz="2400" dirty="0" smtClean="0">
+              <a:rPr lang="en-GB" sz="2400" dirty="0">
                 <a:solidFill>
                   <a:schemeClr val="bg1"/>
                 </a:solidFill>
@@ -10681,12 +10589,6 @@
               </a:rPr>
               <a:t>20 000</a:t>
             </a:r>
-            <a:endParaRPr lang="en-GB" sz="2400" dirty="0">
-              <a:solidFill>
-                <a:schemeClr val="bg1"/>
-              </a:solidFill>
-              <a:latin typeface="Eras Demi ITC" panose="020B0805030504020804" pitchFamily="34" charset="0"/>
-            </a:endParaRPr>
           </a:p>
         </p:txBody>
       </p:sp>
@@ -10698,7 +10600,7 @@
         </p:nvSpPr>
         <p:spPr>
           <a:xfrm>
-            <a:off x="441690" y="27918222"/>
+            <a:off x="5628146" y="26997737"/>
             <a:ext cx="3177017" cy="1815882"/>
           </a:xfrm>
           <a:prstGeom prst="rect">
@@ -10714,7 +10616,7 @@
           <a:p>
             <a:pPr algn="just"/>
             <a:r>
-              <a:rPr lang="fr-FR" sz="2800" dirty="0" smtClean="0">
+              <a:rPr lang="fr-FR" sz="2800" dirty="0">
                 <a:latin typeface="Berlin Sans FB Demi" panose="020E0802020502020306" pitchFamily="34" charset="0"/>
               </a:rPr>
               <a:t>4 secteurs concentrent la majorité du cuivre sur le territoire :</a:t>
@@ -10754,7 +10656,7 @@
               <a:defRPr/>
             </a:pPr>
             <a:r>
-              <a:rPr lang="fr-FR" sz="3200" i="1" dirty="0" smtClean="0">
+              <a:rPr lang="fr-FR" sz="3200" i="1" dirty="0">
                 <a:solidFill>
                   <a:srgbClr val="09B4E9"/>
                 </a:solidFill>
@@ -10795,7 +10697,7 @@
           <a:p>
             <a:pPr algn="just"/>
             <a:r>
-              <a:rPr lang="fr-FR" sz="2400" u="sng" dirty="0" smtClean="0">
+              <a:rPr lang="fr-FR" sz="2400" u="sng" dirty="0">
                 <a:solidFill>
                   <a:schemeClr val="accent6">
                     <a:lumMod val="60000"/>
@@ -10807,7 +10709,7 @@
               <a:t>Le temps de vie de l’objet </a:t>
             </a:r>
             <a:r>
-              <a:rPr lang="fr-FR" sz="2400" dirty="0" smtClean="0">
+              <a:rPr lang="fr-FR" sz="2400" dirty="0">
                 <a:solidFill>
                   <a:schemeClr val="accent6">
                     <a:lumMod val="60000"/>
@@ -10845,7 +10747,7 @@
           <a:p>
             <a:pPr algn="just"/>
             <a:r>
-              <a:rPr lang="fr-FR" sz="2400" u="sng" dirty="0" smtClean="0">
+              <a:rPr lang="fr-FR" sz="2400" u="sng" dirty="0">
                 <a:solidFill>
                   <a:schemeClr val="accent6">
                     <a:lumMod val="60000"/>
@@ -10857,7 +10759,7 @@
               <a:t>Le taux de collecte</a:t>
             </a:r>
             <a:r>
-              <a:rPr lang="fr-FR" sz="2400" dirty="0" smtClean="0">
+              <a:rPr lang="fr-FR" sz="2400" dirty="0">
                 <a:solidFill>
                   <a:schemeClr val="accent6">
                     <a:lumMod val="60000"/>
@@ -10872,13 +10774,13 @@
           <a:p>
             <a:pPr algn="just"/>
             <a:r>
-              <a:rPr lang="fr-FR" sz="2400" dirty="0" smtClean="0">
+              <a:rPr lang="fr-FR" sz="2400" dirty="0">
                 <a:latin typeface="Berlin Sans FB Demi" panose="020E0802020502020306" pitchFamily="34" charset="0"/>
               </a:rPr>
               <a:t>Un objet en fin de vie n’est pas nécessairement récupéré pour être recyclé. Par exemple, seulement </a:t>
             </a:r>
             <a:r>
-              <a:rPr lang="fr-FR" sz="2400" dirty="0" smtClean="0">
+              <a:rPr lang="fr-FR" sz="2400" dirty="0">
                 <a:solidFill>
                   <a:schemeClr val="accent1">
                     <a:lumMod val="75000"/>
@@ -10889,13 +10791,13 @@
               <a:t>44,8%</a:t>
             </a:r>
             <a:r>
-              <a:rPr lang="fr-FR" sz="2400" dirty="0" smtClean="0">
+              <a:rPr lang="fr-FR" sz="2400" dirty="0">
                 <a:latin typeface="Berlin Sans FB Demi" panose="020E0802020502020306" pitchFamily="34" charset="0"/>
               </a:rPr>
               <a:t> des DEEE (Déchets des Equipements Electriques et Electroniques) étaient collectés en 2018. </a:t>
             </a:r>
             <a:r>
-              <a:rPr lang="fr-FR" sz="2400" baseline="30000" dirty="0" smtClean="0">
+              <a:rPr lang="fr-FR" sz="2400" baseline="30000" dirty="0">
                 <a:latin typeface="Berlin Sans FB Demi" panose="020E0802020502020306" pitchFamily="34" charset="0"/>
               </a:rPr>
               <a:t>(1)</a:t>
@@ -10927,7 +10829,7 @@
           <a:p>
             <a:pPr algn="just"/>
             <a:r>
-              <a:rPr lang="fr-FR" sz="2400" u="sng" dirty="0" smtClean="0">
+              <a:rPr lang="fr-FR" sz="2400" u="sng" dirty="0">
                 <a:solidFill>
                   <a:schemeClr val="accent6">
                     <a:lumMod val="60000"/>
@@ -10939,7 +10841,7 @@
               <a:t>Le taux de recyclage</a:t>
             </a:r>
             <a:r>
-              <a:rPr lang="fr-FR" sz="2400" dirty="0" smtClean="0">
+              <a:rPr lang="fr-FR" sz="2400" dirty="0">
                 <a:solidFill>
                   <a:schemeClr val="accent6">
                     <a:lumMod val="60000"/>
@@ -10954,13 +10856,13 @@
           <a:p>
             <a:pPr algn="just"/>
             <a:r>
-              <a:rPr lang="fr-FR" sz="2400" dirty="0" smtClean="0">
+              <a:rPr lang="fr-FR" sz="2400" dirty="0">
                 <a:latin typeface="Berlin Sans FB Demi" panose="020E0802020502020306" pitchFamily="34" charset="0"/>
               </a:rPr>
               <a:t>Même si un objet est recyclé, on ne peut pas récupérer la totalité du cuivre qu’il contient. Par exemple, </a:t>
             </a:r>
             <a:r>
-              <a:rPr lang="fr-FR" sz="2400" dirty="0" smtClean="0">
+              <a:rPr lang="fr-FR" sz="2400" dirty="0">
                 <a:solidFill>
                   <a:schemeClr val="accent1">
                     <a:lumMod val="75000"/>
@@ -10971,13 +10873,13 @@
               <a:t>30%</a:t>
             </a:r>
             <a:r>
-              <a:rPr lang="fr-FR" sz="2400" dirty="0" smtClean="0">
+              <a:rPr lang="fr-FR" sz="2400" dirty="0">
                 <a:latin typeface="Berlin Sans FB Demi" panose="020E0802020502020306" pitchFamily="34" charset="0"/>
               </a:rPr>
               <a:t> du cuivre contenu dans un écran était effectivement récupéré en 2017. </a:t>
             </a:r>
             <a:r>
-              <a:rPr lang="fr-FR" sz="2400" baseline="30000" dirty="0" smtClean="0">
+              <a:rPr lang="fr-FR" sz="2400" baseline="30000" dirty="0">
                 <a:latin typeface="Berlin Sans FB Demi" panose="020E0802020502020306" pitchFamily="34" charset="0"/>
               </a:rPr>
               <a:t>(2)</a:t>
@@ -10993,7 +10895,7 @@
         </p:nvSpPr>
         <p:spPr>
           <a:xfrm>
-            <a:off x="15499736" y="37224035"/>
+            <a:off x="15506455" y="37057376"/>
             <a:ext cx="14420490" cy="3166824"/>
           </a:xfrm>
           <a:prstGeom prst="roundRect">
@@ -11022,7 +10924,7 @@
           <a:lstStyle/>
           <a:p>
             <a:r>
-              <a:rPr lang="fr-FR" sz="2000" dirty="0" smtClean="0"/>
+              <a:rPr lang="fr-FR" sz="2000" dirty="0"/>
               <a:t>Sources :</a:t>
             </a:r>
           </a:p>
@@ -11031,12 +10933,8 @@
               <a:buAutoNum type="arabicParenBoth"/>
             </a:pPr>
             <a:r>
-              <a:rPr lang="fr-FR" sz="2000" dirty="0" smtClean="0"/>
-              <a:t>ADEME</a:t>
-            </a:r>
-            <a:r>
               <a:rPr lang="fr-FR" sz="2000" dirty="0"/>
-              <a:t>, </a:t>
+              <a:t>ADEME, </a:t>
             </a:r>
             <a:r>
               <a:rPr lang="fr-FR" sz="2000" dirty="0" err="1"/>
@@ -11044,35 +10942,7 @@
             </a:r>
             <a:r>
               <a:rPr lang="fr-FR" sz="2000" dirty="0"/>
-              <a:t> FANGEAT. Groupement Deloitte Développement Durable</a:t>
-            </a:r>
-            <a:r>
-              <a:rPr lang="fr-FR" sz="2000" dirty="0" smtClean="0"/>
-              <a:t>, Alice DEPROUW (</a:t>
-            </a:r>
-            <a:r>
-              <a:rPr lang="fr-FR" sz="2000" dirty="0"/>
-              <a:t>In Extenso Innovation Croissance), Marion </a:t>
-            </a:r>
-            <a:r>
-              <a:rPr lang="fr-FR" sz="2000" dirty="0" smtClean="0"/>
-              <a:t>JOVER (</a:t>
-            </a:r>
-            <a:r>
-              <a:rPr lang="fr-FR" sz="2000" dirty="0"/>
-              <a:t>IEIC), Mathilde </a:t>
-            </a:r>
-            <a:r>
-              <a:rPr lang="fr-FR" sz="2000" dirty="0" smtClean="0"/>
-              <a:t>BORIE (</a:t>
-            </a:r>
-            <a:r>
-              <a:rPr lang="fr-FR" sz="2000" dirty="0"/>
-              <a:t>IEIC). 2019. Rapport Annuel du registre des déchets d’équipements électriques et électroniques–données 2018. </a:t>
-            </a:r>
-            <a:r>
-              <a:rPr lang="fr-FR" sz="2000" dirty="0" smtClean="0"/>
-              <a:t>112 pages.</a:t>
+              <a:t> FANGEAT. Groupement Deloitte Développement Durable, Alice DEPROUW (In Extenso Innovation Croissance), Marion JOVER (IEIC), Mathilde BORIE (IEIC). 2019. Rapport Annuel du registre des déchets d’équipements électriques et électroniques–données 2018. 112 pages.</a:t>
             </a:r>
           </a:p>
           <a:p>
@@ -11080,12 +10950,8 @@
               <a:buAutoNum type="arabicParenBoth"/>
             </a:pPr>
             <a:r>
-              <a:rPr lang="fr-FR" sz="2000" dirty="0" smtClean="0"/>
-              <a:t>Rachel </a:t>
-            </a:r>
-            <a:r>
               <a:rPr lang="fr-FR" sz="2000" dirty="0"/>
-              <a:t>Horta </a:t>
+              <a:t>Rachel Horta </a:t>
             </a:r>
             <a:r>
               <a:rPr lang="fr-FR" sz="2000" dirty="0" err="1"/>
@@ -11133,18 +10999,14 @@
             </a:r>
             <a:r>
               <a:rPr lang="fr-FR" sz="2000" dirty="0"/>
-              <a:t>, Nicolas </a:t>
-            </a:r>
-            <a:r>
-              <a:rPr lang="fr-FR" sz="2000" dirty="0" smtClean="0"/>
-              <a:t>Perry, </a:t>
-            </a:r>
-            <a:r>
-              <a:rPr lang="fr-FR" sz="2000" dirty="0" err="1" smtClean="0"/>
+              <a:t>, Nicolas Perry, </a:t>
+            </a:r>
+            <a:r>
+              <a:rPr lang="fr-FR" sz="2000" dirty="0" err="1"/>
               <a:t>Novel</a:t>
             </a:r>
             <a:r>
-              <a:rPr lang="fr-FR" sz="2000" dirty="0" smtClean="0"/>
+              <a:rPr lang="fr-FR" sz="2000" dirty="0"/>
               <a:t> </a:t>
             </a:r>
             <a:r>
@@ -11193,22 +11055,18 @@
             </a:r>
             <a:r>
               <a:rPr lang="fr-FR" sz="2000" dirty="0"/>
-              <a:t> in WEEE: Focus </a:t>
-            </a:r>
-            <a:r>
-              <a:rPr lang="fr-FR" sz="2000" dirty="0" smtClean="0"/>
-              <a:t>on </a:t>
-            </a:r>
-            <a:r>
-              <a:rPr lang="fr-FR" sz="2000" dirty="0" err="1" smtClean="0"/>
+              <a:t> in WEEE: Focus on </a:t>
+            </a:r>
+            <a:r>
+              <a:rPr lang="fr-FR" sz="2000" dirty="0" err="1"/>
               <a:t>screens</a:t>
             </a:r>
             <a:r>
-              <a:rPr lang="fr-FR" sz="2000" dirty="0" smtClean="0"/>
+              <a:rPr lang="fr-FR" sz="2000" dirty="0"/>
               <a:t>, </a:t>
             </a:r>
             <a:r>
-              <a:rPr lang="fr-FR" sz="2000" dirty="0" err="1" smtClean="0"/>
+              <a:rPr lang="fr-FR" sz="2000" dirty="0" err="1"/>
               <a:t>Resources</a:t>
             </a:r>
             <a:r>
@@ -11216,42 +11074,29 @@
               <a:t>, Conservation and </a:t>
             </a:r>
             <a:r>
-              <a:rPr lang="fr-FR" sz="2000" dirty="0" err="1" smtClean="0"/>
+              <a:rPr lang="fr-FR" sz="2000" dirty="0" err="1"/>
               <a:t>Recycling,Volume</a:t>
             </a:r>
             <a:r>
-              <a:rPr lang="fr-FR" sz="2000" dirty="0" smtClean="0"/>
+              <a:rPr lang="fr-FR" sz="2000" dirty="0"/>
               <a:t> 157,2020,104772, ISSN 0921-3449, </a:t>
-            </a:r>
-            <a:r>
-              <a:rPr lang="fr-FR" sz="2000" dirty="0" smtClean="0">
-                <a:hlinkClick r:id="rId7"/>
-              </a:rPr>
-              <a:t>https</a:t>
             </a:r>
             <a:r>
               <a:rPr lang="fr-FR" sz="2000" dirty="0">
                 <a:hlinkClick r:id="rId7"/>
               </a:rPr>
-              <a:t>://</a:t>
-            </a:r>
-            <a:r>
-              <a:rPr lang="fr-FR" sz="2000" dirty="0" smtClean="0">
-                <a:hlinkClick r:id="rId7"/>
-              </a:rPr>
-              <a:t>doi.org/10.1016/j.resconrec.2020.104772</a:t>
-            </a:r>
-            <a:endParaRPr lang="fr-FR" sz="2000" dirty="0" smtClean="0"/>
+              <a:t>https://doi.org/10.1016/j.resconrec.2020.104772</a:t>
+            </a:r>
+            <a:endParaRPr lang="fr-FR" sz="2000" dirty="0"/>
           </a:p>
           <a:p>
             <a:pPr marL="457200" indent="-457200">
               <a:buAutoNum type="arabicParenBoth"/>
             </a:pPr>
             <a:r>
-              <a:rPr lang="fr-FR" sz="2000" dirty="0" smtClean="0"/>
+              <a:rPr lang="fr-FR" sz="2000" dirty="0"/>
               <a:t>TODO</a:t>
             </a:r>
-            <a:endParaRPr lang="fr-FR" sz="2000" dirty="0"/>
           </a:p>
         </p:txBody>
       </p:sp>
@@ -11301,14 +11146,11 @@
           <a:p>
             <a:pPr algn="r"/>
             <a:r>
-              <a:rPr lang="fr-FR" sz="1400" dirty="0" smtClean="0">
+              <a:rPr lang="fr-FR" sz="1400" dirty="0">
                 <a:latin typeface="Berlin Sans FB Demi" panose="020E0802020502020306" pitchFamily="34" charset="0"/>
               </a:rPr>
               <a:t>Appareils électroniques</a:t>
             </a:r>
-            <a:endParaRPr lang="fr-FR" sz="1400" dirty="0">
-              <a:latin typeface="Berlin Sans FB Demi" panose="020E0802020502020306" pitchFamily="34" charset="0"/>
-            </a:endParaRPr>
           </a:p>
         </p:txBody>
       </p:sp>
@@ -11336,14 +11178,11 @@
           <a:p>
             <a:pPr algn="r"/>
             <a:r>
-              <a:rPr lang="fr-FR" sz="1400" dirty="0" smtClean="0">
+              <a:rPr lang="fr-FR" sz="1400" dirty="0">
                 <a:latin typeface="Berlin Sans FB Demi" panose="020E0802020502020306" pitchFamily="34" charset="0"/>
               </a:rPr>
               <a:t>Equipement électroménager</a:t>
             </a:r>
-            <a:endParaRPr lang="fr-FR" sz="1400" dirty="0">
-              <a:latin typeface="Berlin Sans FB Demi" panose="020E0802020502020306" pitchFamily="34" charset="0"/>
-            </a:endParaRPr>
           </a:p>
         </p:txBody>
       </p:sp>
@@ -11371,14 +11210,11 @@
           <a:p>
             <a:pPr algn="r"/>
             <a:r>
-              <a:rPr lang="fr-FR" sz="1400" dirty="0" smtClean="0">
+              <a:rPr lang="fr-FR" sz="1400" dirty="0">
                 <a:latin typeface="Berlin Sans FB Demi" panose="020E0802020502020306" pitchFamily="34" charset="0"/>
               </a:rPr>
               <a:t>Véhicules</a:t>
             </a:r>
-            <a:endParaRPr lang="fr-FR" sz="1400" dirty="0">
-              <a:latin typeface="Berlin Sans FB Demi" panose="020E0802020502020306" pitchFamily="34" charset="0"/>
-            </a:endParaRPr>
           </a:p>
         </p:txBody>
       </p:sp>
@@ -11406,14 +11242,11 @@
           <a:p>
             <a:pPr algn="r"/>
             <a:r>
-              <a:rPr lang="fr-FR" sz="1400" dirty="0" smtClean="0">
+              <a:rPr lang="fr-FR" sz="1400" dirty="0">
                 <a:latin typeface="Berlin Sans FB Demi" panose="020E0802020502020306" pitchFamily="34" charset="0"/>
               </a:rPr>
               <a:t>Bâtiments</a:t>
             </a:r>
-            <a:endParaRPr lang="fr-FR" sz="1400" dirty="0">
-              <a:latin typeface="Berlin Sans FB Demi" panose="020E0802020502020306" pitchFamily="34" charset="0"/>
-            </a:endParaRPr>
           </a:p>
         </p:txBody>
       </p:sp>
@@ -11463,7 +11296,7 @@
           <a:p>
             <a:pPr algn="r"/>
             <a:r>
-              <a:rPr lang="fr-FR" sz="1100" dirty="0" smtClean="0">
+              <a:rPr lang="fr-FR" sz="1100" dirty="0">
                 <a:latin typeface="Berlin Sans FB Demi" panose="020E0802020502020306" pitchFamily="34" charset="0"/>
               </a:rPr>
               <a:t>(3)</a:t>
@@ -11472,7 +11305,7 @@
           <a:p>
             <a:pPr algn="r"/>
             <a:r>
-              <a:rPr lang="fr-FR" sz="1100" dirty="0" smtClean="0">
+              <a:rPr lang="fr-FR" sz="1100" dirty="0">
                 <a:latin typeface="Berlin Sans FB Demi" panose="020E0802020502020306" pitchFamily="34" charset="0"/>
               </a:rPr>
               <a:t>(milliers de tonnes)</a:t>
@@ -11481,14 +11314,11 @@
           <a:p>
             <a:pPr algn="r"/>
             <a:r>
-              <a:rPr lang="fr-FR" sz="1100" dirty="0" smtClean="0">
+              <a:rPr lang="fr-FR" sz="1100" dirty="0">
                 <a:latin typeface="Berlin Sans FB Demi" panose="020E0802020502020306" pitchFamily="34" charset="0"/>
               </a:rPr>
               <a:t>(le graphique n’est pas à l’échelle)</a:t>
             </a:r>
-            <a:endParaRPr lang="fr-FR" sz="1100" dirty="0">
-              <a:latin typeface="Berlin Sans FB Demi" panose="020E0802020502020306" pitchFamily="34" charset="0"/>
-            </a:endParaRPr>
           </a:p>
         </p:txBody>
       </p:sp>
@@ -11515,17 +11345,2437 @@
           <a:lstStyle/>
           <a:p>
             <a:r>
-              <a:rPr lang="fr-FR" sz="1100" i="1" dirty="0" smtClean="0">
+              <a:rPr lang="fr-FR" sz="1100" i="1" dirty="0">
                 <a:latin typeface="Berlin Sans FB Demi" panose="020E0802020502020306" pitchFamily="34" charset="0"/>
               </a:rPr>
               <a:t>(estimations)</a:t>
             </a:r>
-            <a:endParaRPr lang="fr-FR" sz="1100" i="1" dirty="0">
-              <a:latin typeface="Berlin Sans FB Demi" panose="020E0802020502020306" pitchFamily="34" charset="0"/>
-            </a:endParaRPr>
           </a:p>
         </p:txBody>
       </p:sp>
+      <p:pic>
+        <p:nvPicPr>
+          <p:cNvPr id="45" name="Google Shape;111;p1">
+            <a:extLst>
+              <a:ext uri="{FF2B5EF4-FFF2-40B4-BE49-F238E27FC236}">
+                <a16:creationId xmlns:a16="http://schemas.microsoft.com/office/drawing/2014/main" id="{01CFA2A8-C94D-4229-8105-FF264702F35F}"/>
+              </a:ext>
+            </a:extLst>
+          </p:cNvPr>
+          <p:cNvPicPr preferRelativeResize="0"/>
+          <p:nvPr/>
+        </p:nvPicPr>
+        <p:blipFill>
+          <a:blip r:embed="rId14">
+            <a:alphaModFix/>
+          </a:blip>
+          <a:stretch>
+            <a:fillRect/>
+          </a:stretch>
+        </p:blipFill>
+        <p:spPr>
+          <a:xfrm>
+            <a:off x="16936240" y="29229124"/>
+            <a:ext cx="10593899" cy="7490211"/>
+          </a:xfrm>
+          <a:prstGeom prst="rect">
+            <a:avLst/>
+          </a:prstGeom>
+          <a:noFill/>
+          <a:ln>
+            <a:noFill/>
+          </a:ln>
+        </p:spPr>
+      </p:pic>
+      <p:grpSp>
+        <p:nvGrpSpPr>
+          <p:cNvPr id="46" name="Google Shape;112;p1">
+            <a:extLst>
+              <a:ext uri="{FF2B5EF4-FFF2-40B4-BE49-F238E27FC236}">
+                <a16:creationId xmlns:a16="http://schemas.microsoft.com/office/drawing/2014/main" id="{7AB4EA1E-81F2-433D-9A53-8F2D63387439}"/>
+              </a:ext>
+            </a:extLst>
+          </p:cNvPr>
+          <p:cNvGrpSpPr/>
+          <p:nvPr/>
+        </p:nvGrpSpPr>
+        <p:grpSpPr>
+          <a:xfrm>
+            <a:off x="267800" y="6138566"/>
+            <a:ext cx="9876600" cy="4197600"/>
+            <a:chOff x="267800" y="7023250"/>
+            <a:chExt cx="9876600" cy="4197600"/>
+          </a:xfrm>
+        </p:grpSpPr>
+        <p:sp>
+          <p:nvSpPr>
+            <p:cNvPr id="47" name="Google Shape;113;p1">
+              <a:extLst>
+                <a:ext uri="{FF2B5EF4-FFF2-40B4-BE49-F238E27FC236}">
+                  <a16:creationId xmlns:a16="http://schemas.microsoft.com/office/drawing/2014/main" id="{F2F4484E-0D35-4A85-8FDB-BBE0F01C8AC8}"/>
+                </a:ext>
+              </a:extLst>
+            </p:cNvPr>
+            <p:cNvSpPr/>
+            <p:nvPr/>
+          </p:nvSpPr>
+          <p:spPr>
+            <a:xfrm>
+              <a:off x="267800" y="7023250"/>
+              <a:ext cx="9876600" cy="4197600"/>
+            </a:xfrm>
+            <a:prstGeom prst="roundRect">
+              <a:avLst>
+                <a:gd name="adj" fmla="val 16667"/>
+              </a:avLst>
+            </a:prstGeom>
+            <a:gradFill>
+              <a:gsLst>
+                <a:gs pos="0">
+                  <a:srgbClr val="DCECD5"/>
+                </a:gs>
+                <a:gs pos="100000">
+                  <a:srgbClr val="93BC81"/>
+                </a:gs>
+              </a:gsLst>
+              <a:path path="circle">
+                <a:fillToRect l="50000" t="50000" r="50000" b="50000"/>
+              </a:path>
+              <a:tileRect/>
+            </a:gradFill>
+            <a:ln w="9525" cap="flat" cmpd="sng">
+              <a:solidFill>
+                <a:schemeClr val="dk2"/>
+              </a:solidFill>
+              <a:prstDash val="solid"/>
+              <a:round/>
+              <a:headEnd type="none" w="sm" len="sm"/>
+              <a:tailEnd type="none" w="sm" len="sm"/>
+            </a:ln>
+          </p:spPr>
+          <p:txBody>
+            <a:bodyPr spcFirstLastPara="1" wrap="square" lIns="91425" tIns="91425" rIns="91425" bIns="91425" anchor="ctr" anchorCtr="0">
+              <a:noAutofit/>
+            </a:bodyPr>
+            <a:lstStyle/>
+            <a:p>
+              <a:pPr marL="0" lvl="0" indent="0" algn="just" rtl="0">
+                <a:spcBef>
+                  <a:spcPts val="0"/>
+                </a:spcBef>
+                <a:spcAft>
+                  <a:spcPts val="0"/>
+                </a:spcAft>
+                <a:buNone/>
+              </a:pPr>
+              <a:endParaRPr sz="2400">
+                <a:solidFill>
+                  <a:schemeClr val="dk1"/>
+                </a:solidFill>
+              </a:endParaRPr>
+            </a:p>
+            <a:p>
+              <a:pPr marL="0" lvl="0" indent="0" algn="just" rtl="0">
+                <a:spcBef>
+                  <a:spcPts val="0"/>
+                </a:spcBef>
+                <a:spcAft>
+                  <a:spcPts val="0"/>
+                </a:spcAft>
+                <a:buNone/>
+              </a:pPr>
+              <a:endParaRPr sz="2400">
+                <a:solidFill>
+                  <a:schemeClr val="dk1"/>
+                </a:solidFill>
+              </a:endParaRPr>
+            </a:p>
+            <a:p>
+              <a:pPr marL="0" lvl="0" indent="0" algn="just" rtl="0">
+                <a:spcBef>
+                  <a:spcPts val="0"/>
+                </a:spcBef>
+                <a:spcAft>
+                  <a:spcPts val="0"/>
+                </a:spcAft>
+                <a:buClr>
+                  <a:schemeClr val="dk1"/>
+                </a:buClr>
+                <a:buSzPts val="1100"/>
+                <a:buFont typeface="Arial"/>
+                <a:buNone/>
+              </a:pPr>
+              <a:r>
+                <a:rPr lang="fr-FR" sz="2400">
+                  <a:solidFill>
+                    <a:schemeClr val="dk1"/>
+                  </a:solidFill>
+                </a:rPr>
+                <a:t>Le recyclage est un procédé de traitement des déchets et de réintroduction des matériaux qui en sont issus dans le cycle de production d'autres produits équivalents ou différents. Le recyclage permet de réduire les volumes de déchets, et donc leur pollution, et de préserver les ressources naturelles en réutilisant des matières premières déjà extraites.</a:t>
+              </a:r>
+              <a:endParaRPr sz="2400">
+                <a:solidFill>
+                  <a:schemeClr val="dk1"/>
+                </a:solidFill>
+              </a:endParaRPr>
+            </a:p>
+            <a:p>
+              <a:pPr marL="0" lvl="0" indent="0" algn="just" rtl="0">
+                <a:spcBef>
+                  <a:spcPts val="0"/>
+                </a:spcBef>
+                <a:spcAft>
+                  <a:spcPts val="0"/>
+                </a:spcAft>
+                <a:buClr>
+                  <a:schemeClr val="dk1"/>
+                </a:buClr>
+                <a:buSzPts val="1100"/>
+                <a:buFont typeface="Arial"/>
+                <a:buNone/>
+              </a:pPr>
+              <a:r>
+                <a:rPr lang="fr-FR" sz="2400">
+                  <a:solidFill>
+                    <a:schemeClr val="dk1"/>
+                  </a:solidFill>
+                </a:rPr>
+                <a:t>Deux problèmes principaux apparaissent: la dispersion et le rendement</a:t>
+              </a:r>
+              <a:endParaRPr/>
+            </a:p>
+          </p:txBody>
+        </p:sp>
+        <p:sp>
+          <p:nvSpPr>
+            <p:cNvPr id="48" name="Google Shape;114;p1">
+              <a:extLst>
+                <a:ext uri="{FF2B5EF4-FFF2-40B4-BE49-F238E27FC236}">
+                  <a16:creationId xmlns:a16="http://schemas.microsoft.com/office/drawing/2014/main" id="{38390F01-CDF3-41E5-A5EB-97752D0FAE22}"/>
+                </a:ext>
+              </a:extLst>
+            </p:cNvPr>
+            <p:cNvSpPr txBox="1"/>
+            <p:nvPr/>
+          </p:nvSpPr>
+          <p:spPr>
+            <a:xfrm>
+              <a:off x="695150" y="7023250"/>
+              <a:ext cx="4841400" cy="742200"/>
+            </a:xfrm>
+            <a:prstGeom prst="rect">
+              <a:avLst/>
+            </a:prstGeom>
+            <a:noFill/>
+            <a:ln>
+              <a:noFill/>
+            </a:ln>
+          </p:spPr>
+          <p:txBody>
+            <a:bodyPr spcFirstLastPara="1" wrap="square" lIns="91425" tIns="91425" rIns="91425" bIns="91425" anchor="t" anchorCtr="0">
+              <a:noAutofit/>
+            </a:bodyPr>
+            <a:lstStyle/>
+            <a:p>
+              <a:pPr marL="0" lvl="0" indent="0" algn="l" rtl="0">
+                <a:spcBef>
+                  <a:spcPts val="0"/>
+                </a:spcBef>
+                <a:spcAft>
+                  <a:spcPts val="0"/>
+                </a:spcAft>
+                <a:buNone/>
+              </a:pPr>
+              <a:r>
+                <a:rPr lang="fr-FR" sz="4100" b="1">
+                  <a:latin typeface="Lora"/>
+                  <a:ea typeface="Lora"/>
+                  <a:cs typeface="Lora"/>
+                  <a:sym typeface="Lora"/>
+                </a:rPr>
+                <a:t>Parlons recyclage !</a:t>
+              </a:r>
+              <a:endParaRPr sz="4100" b="1">
+                <a:latin typeface="Lora"/>
+                <a:ea typeface="Lora"/>
+                <a:cs typeface="Lora"/>
+                <a:sym typeface="Lora"/>
+              </a:endParaRPr>
+            </a:p>
+          </p:txBody>
+        </p:sp>
+      </p:grpSp>
+      <p:grpSp>
+        <p:nvGrpSpPr>
+          <p:cNvPr id="49" name="Google Shape;115;p1">
+            <a:extLst>
+              <a:ext uri="{FF2B5EF4-FFF2-40B4-BE49-F238E27FC236}">
+                <a16:creationId xmlns:a16="http://schemas.microsoft.com/office/drawing/2014/main" id="{DE6D2AA0-4081-401B-9176-BEC6463598C1}"/>
+              </a:ext>
+            </a:extLst>
+          </p:cNvPr>
+          <p:cNvGrpSpPr/>
+          <p:nvPr/>
+        </p:nvGrpSpPr>
+        <p:grpSpPr>
+          <a:xfrm>
+            <a:off x="22137925" y="6210341"/>
+            <a:ext cx="8054400" cy="5314800"/>
+            <a:chOff x="22137925" y="7095025"/>
+            <a:chExt cx="8054400" cy="5314800"/>
+          </a:xfrm>
+        </p:grpSpPr>
+        <p:sp>
+          <p:nvSpPr>
+            <p:cNvPr id="50" name="Google Shape;116;p1">
+              <a:extLst>
+                <a:ext uri="{FF2B5EF4-FFF2-40B4-BE49-F238E27FC236}">
+                  <a16:creationId xmlns:a16="http://schemas.microsoft.com/office/drawing/2014/main" id="{EA0E58B5-944A-4EA4-B8EE-AD3D08DF3297}"/>
+                </a:ext>
+              </a:extLst>
+            </p:cNvPr>
+            <p:cNvSpPr/>
+            <p:nvPr/>
+          </p:nvSpPr>
+          <p:spPr>
+            <a:xfrm>
+              <a:off x="22137925" y="7095025"/>
+              <a:ext cx="8054400" cy="5314800"/>
+            </a:xfrm>
+            <a:prstGeom prst="roundRect">
+              <a:avLst>
+                <a:gd name="adj" fmla="val 16667"/>
+              </a:avLst>
+            </a:prstGeom>
+            <a:gradFill>
+              <a:gsLst>
+                <a:gs pos="0">
+                  <a:srgbClr val="DCECD5"/>
+                </a:gs>
+                <a:gs pos="100000">
+                  <a:srgbClr val="93BC81"/>
+                </a:gs>
+              </a:gsLst>
+              <a:lin ang="5400012" scaled="0"/>
+            </a:gradFill>
+            <a:ln w="9525" cap="flat" cmpd="sng">
+              <a:solidFill>
+                <a:schemeClr val="dk2"/>
+              </a:solidFill>
+              <a:prstDash val="solid"/>
+              <a:round/>
+              <a:headEnd type="none" w="sm" len="sm"/>
+              <a:tailEnd type="none" w="sm" len="sm"/>
+            </a:ln>
+          </p:spPr>
+          <p:txBody>
+            <a:bodyPr spcFirstLastPara="1" wrap="square" lIns="91425" tIns="91425" rIns="91425" bIns="91425" anchor="ctr" anchorCtr="0">
+              <a:noAutofit/>
+            </a:bodyPr>
+            <a:lstStyle/>
+            <a:p>
+              <a:pPr marL="0" lvl="0" indent="0" algn="just" rtl="0">
+                <a:lnSpc>
+                  <a:spcPct val="115000"/>
+                </a:lnSpc>
+                <a:spcBef>
+                  <a:spcPts val="0"/>
+                </a:spcBef>
+                <a:spcAft>
+                  <a:spcPts val="0"/>
+                </a:spcAft>
+                <a:buNone/>
+              </a:pPr>
+              <a:endParaRPr sz="2800" u="sng">
+                <a:solidFill>
+                  <a:schemeClr val="dk1"/>
+                </a:solidFill>
+              </a:endParaRPr>
+            </a:p>
+            <a:p>
+              <a:pPr marL="0" lvl="0" indent="0" algn="just" rtl="0">
+                <a:lnSpc>
+                  <a:spcPct val="115000"/>
+                </a:lnSpc>
+                <a:spcBef>
+                  <a:spcPts val="0"/>
+                </a:spcBef>
+                <a:spcAft>
+                  <a:spcPts val="0"/>
+                </a:spcAft>
+                <a:buNone/>
+              </a:pPr>
+              <a:endParaRPr sz="2800" u="sng">
+                <a:solidFill>
+                  <a:schemeClr val="dk1"/>
+                </a:solidFill>
+              </a:endParaRPr>
+            </a:p>
+            <a:p>
+              <a:pPr marL="0" lvl="0" indent="0" algn="just" rtl="0">
+                <a:lnSpc>
+                  <a:spcPct val="115000"/>
+                </a:lnSpc>
+                <a:spcBef>
+                  <a:spcPts val="0"/>
+                </a:spcBef>
+                <a:spcAft>
+                  <a:spcPts val="0"/>
+                </a:spcAft>
+                <a:buNone/>
+              </a:pPr>
+              <a:endParaRPr sz="2800" u="sng">
+                <a:solidFill>
+                  <a:schemeClr val="dk1"/>
+                </a:solidFill>
+              </a:endParaRPr>
+            </a:p>
+            <a:p>
+              <a:pPr marL="0" lvl="0" indent="0" algn="just" rtl="0">
+                <a:lnSpc>
+                  <a:spcPct val="115000"/>
+                </a:lnSpc>
+                <a:spcBef>
+                  <a:spcPts val="0"/>
+                </a:spcBef>
+                <a:spcAft>
+                  <a:spcPts val="0"/>
+                </a:spcAft>
+                <a:buNone/>
+              </a:pPr>
+              <a:r>
+                <a:rPr lang="fr-FR" sz="2800" u="sng">
+                  <a:solidFill>
+                    <a:schemeClr val="dk1"/>
+                  </a:solidFill>
+                </a:rPr>
+                <a:t>Avantages du recyclage du cuivre:</a:t>
+              </a:r>
+              <a:endParaRPr sz="2800" u="sng">
+                <a:solidFill>
+                  <a:srgbClr val="222222"/>
+                </a:solidFill>
+                <a:highlight>
+                  <a:schemeClr val="lt1"/>
+                </a:highlight>
+              </a:endParaRPr>
+            </a:p>
+            <a:p>
+              <a:pPr marL="0" lvl="0" indent="0" algn="just" rtl="0">
+                <a:lnSpc>
+                  <a:spcPct val="115000"/>
+                </a:lnSpc>
+                <a:spcBef>
+                  <a:spcPts val="0"/>
+                </a:spcBef>
+                <a:spcAft>
+                  <a:spcPts val="0"/>
+                </a:spcAft>
+                <a:buNone/>
+              </a:pPr>
+              <a:endParaRPr sz="2400">
+                <a:solidFill>
+                  <a:srgbClr val="222222"/>
+                </a:solidFill>
+                <a:highlight>
+                  <a:schemeClr val="lt1"/>
+                </a:highlight>
+              </a:endParaRPr>
+            </a:p>
+            <a:p>
+              <a:pPr marL="457200" lvl="0" indent="-381000" algn="just" rtl="0">
+                <a:lnSpc>
+                  <a:spcPct val="150000"/>
+                </a:lnSpc>
+                <a:spcBef>
+                  <a:spcPts val="0"/>
+                </a:spcBef>
+                <a:spcAft>
+                  <a:spcPts val="0"/>
+                </a:spcAft>
+                <a:buClr>
+                  <a:schemeClr val="dk1"/>
+                </a:buClr>
+                <a:buSzPts val="2400"/>
+                <a:buChar char="➔"/>
+              </a:pPr>
+              <a:r>
+                <a:rPr lang="fr-FR" sz="2400">
+                  <a:solidFill>
+                    <a:schemeClr val="dk1"/>
+                  </a:solidFill>
+                </a:rPr>
+                <a:t>Éviter l’extraction des ressources naturelles</a:t>
+              </a:r>
+              <a:endParaRPr sz="2400">
+                <a:solidFill>
+                  <a:schemeClr val="dk1"/>
+                </a:solidFill>
+              </a:endParaRPr>
+            </a:p>
+            <a:p>
+              <a:pPr marL="457200" lvl="0" indent="-381000" algn="just" rtl="0">
+                <a:lnSpc>
+                  <a:spcPct val="150000"/>
+                </a:lnSpc>
+                <a:spcBef>
+                  <a:spcPts val="0"/>
+                </a:spcBef>
+                <a:spcAft>
+                  <a:spcPts val="0"/>
+                </a:spcAft>
+                <a:buClr>
+                  <a:schemeClr val="dk1"/>
+                </a:buClr>
+                <a:buSzPts val="2400"/>
+                <a:buChar char="➔"/>
+              </a:pPr>
+              <a:r>
+                <a:rPr lang="fr-FR" sz="2400">
+                  <a:solidFill>
+                    <a:schemeClr val="dk1"/>
+                  </a:solidFill>
+                </a:rPr>
+                <a:t>Créer des emplois localement</a:t>
+              </a:r>
+              <a:endParaRPr sz="2400">
+                <a:solidFill>
+                  <a:schemeClr val="dk1"/>
+                </a:solidFill>
+              </a:endParaRPr>
+            </a:p>
+            <a:p>
+              <a:pPr marL="457200" lvl="0" indent="-381000" algn="just" rtl="0">
+                <a:lnSpc>
+                  <a:spcPct val="150000"/>
+                </a:lnSpc>
+                <a:spcBef>
+                  <a:spcPts val="0"/>
+                </a:spcBef>
+                <a:spcAft>
+                  <a:spcPts val="0"/>
+                </a:spcAft>
+                <a:buClr>
+                  <a:schemeClr val="dk1"/>
+                </a:buClr>
+                <a:buSzPts val="2400"/>
+                <a:buChar char="➔"/>
+              </a:pPr>
+              <a:r>
+                <a:rPr lang="fr-FR" sz="2400">
+                  <a:solidFill>
+                    <a:schemeClr val="dk1"/>
+                  </a:solidFill>
+                </a:rPr>
+                <a:t>Eviter la mise en décharge</a:t>
+              </a:r>
+              <a:endParaRPr sz="2400">
+                <a:solidFill>
+                  <a:schemeClr val="dk1"/>
+                </a:solidFill>
+              </a:endParaRPr>
+            </a:p>
+            <a:p>
+              <a:pPr marL="914400" lvl="0" indent="0" algn="just" rtl="0">
+                <a:lnSpc>
+                  <a:spcPct val="115000"/>
+                </a:lnSpc>
+                <a:spcBef>
+                  <a:spcPts val="1200"/>
+                </a:spcBef>
+                <a:spcAft>
+                  <a:spcPts val="1200"/>
+                </a:spcAft>
+                <a:buNone/>
+              </a:pPr>
+              <a:endParaRPr/>
+            </a:p>
+          </p:txBody>
+        </p:sp>
+        <p:sp>
+          <p:nvSpPr>
+            <p:cNvPr id="51" name="Google Shape;117;p1">
+              <a:extLst>
+                <a:ext uri="{FF2B5EF4-FFF2-40B4-BE49-F238E27FC236}">
+                  <a16:creationId xmlns:a16="http://schemas.microsoft.com/office/drawing/2014/main" id="{2CDB3D15-7739-4D1B-840E-E32D862679CA}"/>
+                </a:ext>
+              </a:extLst>
+            </p:cNvPr>
+            <p:cNvSpPr txBox="1"/>
+            <p:nvPr/>
+          </p:nvSpPr>
+          <p:spPr>
+            <a:xfrm>
+              <a:off x="22716700" y="7231075"/>
+              <a:ext cx="5825100" cy="1446300"/>
+            </a:xfrm>
+            <a:prstGeom prst="rect">
+              <a:avLst/>
+            </a:prstGeom>
+            <a:noFill/>
+            <a:ln>
+              <a:noFill/>
+            </a:ln>
+          </p:spPr>
+          <p:txBody>
+            <a:bodyPr spcFirstLastPara="1" wrap="square" lIns="91425" tIns="91425" rIns="91425" bIns="91425" anchor="t" anchorCtr="0">
+              <a:noAutofit/>
+            </a:bodyPr>
+            <a:lstStyle/>
+            <a:p>
+              <a:pPr marL="0" lvl="0" indent="0" algn="l" rtl="0">
+                <a:spcBef>
+                  <a:spcPts val="0"/>
+                </a:spcBef>
+                <a:spcAft>
+                  <a:spcPts val="0"/>
+                </a:spcAft>
+                <a:buNone/>
+              </a:pPr>
+              <a:r>
+                <a:rPr lang="fr-FR" sz="4000" b="1">
+                  <a:latin typeface="Lora"/>
+                  <a:ea typeface="Lora"/>
+                  <a:cs typeface="Lora"/>
+                  <a:sym typeface="Lora"/>
+                </a:rPr>
+                <a:t>Mais voyons, à quoi bon recycler?</a:t>
+              </a:r>
+              <a:endParaRPr sz="4000" b="1">
+                <a:latin typeface="Lora"/>
+                <a:ea typeface="Lora"/>
+                <a:cs typeface="Lora"/>
+                <a:sym typeface="Lora"/>
+              </a:endParaRPr>
+            </a:p>
+          </p:txBody>
+        </p:sp>
+      </p:grpSp>
+      <p:grpSp>
+        <p:nvGrpSpPr>
+          <p:cNvPr id="52" name="Google Shape;118;p1">
+            <a:extLst>
+              <a:ext uri="{FF2B5EF4-FFF2-40B4-BE49-F238E27FC236}">
+                <a16:creationId xmlns:a16="http://schemas.microsoft.com/office/drawing/2014/main" id="{CF505326-7239-48BC-BCC5-B4D81498F7EB}"/>
+              </a:ext>
+            </a:extLst>
+          </p:cNvPr>
+          <p:cNvGrpSpPr/>
+          <p:nvPr/>
+        </p:nvGrpSpPr>
+        <p:grpSpPr>
+          <a:xfrm>
+            <a:off x="10232128" y="5986620"/>
+            <a:ext cx="11274900" cy="5132573"/>
+            <a:chOff x="10232128" y="6871304"/>
+            <a:chExt cx="11274900" cy="5132573"/>
+          </a:xfrm>
+        </p:grpSpPr>
+        <p:sp>
+          <p:nvSpPr>
+            <p:cNvPr id="53" name="Google Shape;119;p1">
+              <a:extLst>
+                <a:ext uri="{FF2B5EF4-FFF2-40B4-BE49-F238E27FC236}">
+                  <a16:creationId xmlns:a16="http://schemas.microsoft.com/office/drawing/2014/main" id="{96A0AE13-627F-4DB3-BF4B-E34F54EBB7B4}"/>
+                </a:ext>
+              </a:extLst>
+            </p:cNvPr>
+            <p:cNvSpPr/>
+            <p:nvPr/>
+          </p:nvSpPr>
+          <p:spPr>
+            <a:xfrm>
+              <a:off x="10232128" y="6871304"/>
+              <a:ext cx="11274900" cy="5132573"/>
+            </a:xfrm>
+            <a:prstGeom prst="roundRect">
+              <a:avLst>
+                <a:gd name="adj" fmla="val 16667"/>
+              </a:avLst>
+            </a:prstGeom>
+            <a:gradFill>
+              <a:gsLst>
+                <a:gs pos="0">
+                  <a:srgbClr val="DCECD5"/>
+                </a:gs>
+                <a:gs pos="100000">
+                  <a:srgbClr val="93BC81"/>
+                </a:gs>
+              </a:gsLst>
+              <a:lin ang="5400012" scaled="0"/>
+            </a:gradFill>
+            <a:ln w="9525" cap="flat" cmpd="sng">
+              <a:solidFill>
+                <a:schemeClr val="dk2"/>
+              </a:solidFill>
+              <a:prstDash val="solid"/>
+              <a:round/>
+              <a:headEnd type="none" w="sm" len="sm"/>
+              <a:tailEnd type="none" w="sm" len="sm"/>
+            </a:ln>
+          </p:spPr>
+          <p:txBody>
+            <a:bodyPr spcFirstLastPara="1" wrap="square" lIns="91425" tIns="91425" rIns="91425" bIns="91425" anchor="ctr" anchorCtr="0">
+              <a:noAutofit/>
+            </a:bodyPr>
+            <a:lstStyle/>
+            <a:p>
+              <a:pPr marL="0" lvl="0" indent="0" algn="just" rtl="0">
+                <a:spcBef>
+                  <a:spcPts val="0"/>
+                </a:spcBef>
+                <a:spcAft>
+                  <a:spcPts val="0"/>
+                </a:spcAft>
+                <a:buNone/>
+              </a:pPr>
+              <a:endParaRPr sz="2400" dirty="0">
+                <a:solidFill>
+                  <a:schemeClr val="dk1"/>
+                </a:solidFill>
+              </a:endParaRPr>
+            </a:p>
+            <a:p>
+              <a:pPr marL="0" lvl="0" indent="0" algn="just" rtl="0">
+                <a:spcBef>
+                  <a:spcPts val="0"/>
+                </a:spcBef>
+                <a:spcAft>
+                  <a:spcPts val="0"/>
+                </a:spcAft>
+                <a:buNone/>
+              </a:pPr>
+              <a:r>
+                <a:rPr lang="fr-FR" sz="2400" dirty="0">
+                  <a:solidFill>
+                    <a:schemeClr val="dk1"/>
+                  </a:solidFill>
+                </a:rPr>
+                <a:t>Il existe 2 procédés pour recycler les métaux comme le cuivre : </a:t>
+              </a:r>
+              <a:endParaRPr sz="2400" dirty="0">
+                <a:solidFill>
+                  <a:schemeClr val="dk1"/>
+                </a:solidFill>
+              </a:endParaRPr>
+            </a:p>
+            <a:p>
+              <a:pPr marL="0" lvl="0" indent="0" algn="just" rtl="0">
+                <a:spcBef>
+                  <a:spcPts val="0"/>
+                </a:spcBef>
+                <a:spcAft>
+                  <a:spcPts val="0"/>
+                </a:spcAft>
+                <a:buClr>
+                  <a:schemeClr val="dk1"/>
+                </a:buClr>
+                <a:buSzPts val="1100"/>
+                <a:buFont typeface="Arial"/>
+                <a:buNone/>
+              </a:pPr>
+              <a:endParaRPr sz="2400" dirty="0">
+                <a:solidFill>
+                  <a:schemeClr val="dk1"/>
+                </a:solidFill>
+              </a:endParaRPr>
+            </a:p>
+            <a:p>
+              <a:pPr marL="457200" lvl="0" indent="-381000" algn="just" rtl="0">
+                <a:spcBef>
+                  <a:spcPts val="0"/>
+                </a:spcBef>
+                <a:spcAft>
+                  <a:spcPts val="0"/>
+                </a:spcAft>
+                <a:buClr>
+                  <a:schemeClr val="dk1"/>
+                </a:buClr>
+                <a:buSzPts val="2400"/>
+                <a:buChar char="-"/>
+              </a:pPr>
+              <a:r>
+                <a:rPr lang="fr-FR" sz="2400" dirty="0">
+                  <a:solidFill>
+                    <a:schemeClr val="dk1"/>
+                  </a:solidFill>
+                </a:rPr>
+                <a:t>l</a:t>
+              </a:r>
+              <a:r>
+                <a:rPr lang="fr-FR" sz="2400" b="1" dirty="0">
+                  <a:solidFill>
+                    <a:schemeClr val="dk1"/>
+                  </a:solidFill>
+                </a:rPr>
+                <a:t>’affinage </a:t>
+              </a:r>
+              <a:r>
+                <a:rPr lang="fr-FR" sz="2400" dirty="0">
+                  <a:solidFill>
+                    <a:schemeClr val="dk1"/>
+                  </a:solidFill>
+                </a:rPr>
+                <a:t>(“</a:t>
+              </a:r>
+              <a:r>
+                <a:rPr lang="fr-FR" sz="2400" dirty="0" err="1">
+                  <a:solidFill>
+                    <a:schemeClr val="dk1"/>
+                  </a:solidFill>
+                </a:rPr>
+                <a:t>refining</a:t>
+              </a:r>
+              <a:r>
+                <a:rPr lang="fr-FR" sz="2400" dirty="0">
+                  <a:solidFill>
+                    <a:schemeClr val="dk1"/>
+                  </a:solidFill>
+                </a:rPr>
+                <a:t>”) : à partir d’un mélange de concentrés cuivreux issus des mines et de déchets de qualité moindre (fraction peu triée, alliages complexes ou cuivre sous forme non métallique)</a:t>
+              </a:r>
+              <a:endParaRPr sz="2400" dirty="0">
+                <a:solidFill>
+                  <a:schemeClr val="dk1"/>
+                </a:solidFill>
+              </a:endParaRPr>
+            </a:p>
+            <a:p>
+              <a:pPr marL="457200" lvl="0" indent="-381000" algn="just" rtl="0">
+                <a:spcBef>
+                  <a:spcPts val="0"/>
+                </a:spcBef>
+                <a:spcAft>
+                  <a:spcPts val="0"/>
+                </a:spcAft>
+                <a:buClr>
+                  <a:schemeClr val="dk1"/>
+                </a:buClr>
+                <a:buSzPts val="2400"/>
+                <a:buChar char="-"/>
+              </a:pPr>
+              <a:r>
+                <a:rPr lang="fr-FR" sz="2400" dirty="0">
+                  <a:solidFill>
+                    <a:schemeClr val="dk1"/>
+                  </a:solidFill>
+                </a:rPr>
+                <a:t>la </a:t>
+              </a:r>
+              <a:r>
+                <a:rPr lang="fr-FR" sz="2400" b="1" dirty="0">
+                  <a:solidFill>
+                    <a:schemeClr val="dk1"/>
+                  </a:solidFill>
+                </a:rPr>
+                <a:t>fusion</a:t>
+              </a:r>
+              <a:r>
+                <a:rPr lang="fr-FR" sz="2400" dirty="0">
+                  <a:solidFill>
+                    <a:schemeClr val="dk1"/>
+                  </a:solidFill>
+                </a:rPr>
+                <a:t> (“</a:t>
+              </a:r>
+              <a:r>
+                <a:rPr lang="fr-FR" sz="2400" dirty="0" err="1">
+                  <a:solidFill>
+                    <a:schemeClr val="dk1"/>
+                  </a:solidFill>
+                </a:rPr>
+                <a:t>smelting</a:t>
+              </a:r>
+              <a:r>
+                <a:rPr lang="fr-FR" sz="2400" dirty="0">
+                  <a:solidFill>
+                    <a:schemeClr val="dk1"/>
+                  </a:solidFill>
+                </a:rPr>
+                <a:t>”) : à partir de déchets de qualité supérieure (cuivre métallique, matière première de recyclage), via un procédé de fusion.</a:t>
+              </a:r>
+              <a:endParaRPr sz="2400" dirty="0">
+                <a:solidFill>
+                  <a:schemeClr val="dk1"/>
+                </a:solidFill>
+              </a:endParaRPr>
+            </a:p>
+            <a:p>
+              <a:pPr marL="0" lvl="0" indent="0" algn="l" rtl="0">
+                <a:spcBef>
+                  <a:spcPts val="0"/>
+                </a:spcBef>
+                <a:spcAft>
+                  <a:spcPts val="0"/>
+                </a:spcAft>
+                <a:buClr>
+                  <a:schemeClr val="dk1"/>
+                </a:buClr>
+                <a:buSzPts val="1100"/>
+                <a:buFont typeface="Arial"/>
+                <a:buNone/>
+              </a:pPr>
+              <a:endParaRPr sz="2400" dirty="0">
+                <a:solidFill>
+                  <a:schemeClr val="dk1"/>
+                </a:solidFill>
+              </a:endParaRPr>
+            </a:p>
+            <a:p>
+              <a:pPr marL="0" lvl="0" indent="0" algn="l" rtl="0">
+                <a:spcBef>
+                  <a:spcPts val="0"/>
+                </a:spcBef>
+                <a:spcAft>
+                  <a:spcPts val="0"/>
+                </a:spcAft>
+                <a:buClr>
+                  <a:schemeClr val="dk1"/>
+                </a:buClr>
+                <a:buSzPts val="1100"/>
+                <a:buFont typeface="Arial"/>
+                <a:buNone/>
+              </a:pPr>
+              <a:r>
+                <a:rPr lang="fr-FR" sz="2400" dirty="0">
+                  <a:solidFill>
+                    <a:schemeClr val="dk1"/>
+                  </a:solidFill>
+                </a:rPr>
+                <a:t>⇒ les exportations de déchets métalliques sont plus importantes que les importations correspondantes :179 kt versus 55 kt pour le cuivre en 2019 </a:t>
+              </a:r>
+              <a:endParaRPr dirty="0"/>
+            </a:p>
+          </p:txBody>
+        </p:sp>
+        <p:sp>
+          <p:nvSpPr>
+            <p:cNvPr id="56" name="Google Shape;120;p1">
+              <a:extLst>
+                <a:ext uri="{FF2B5EF4-FFF2-40B4-BE49-F238E27FC236}">
+                  <a16:creationId xmlns:a16="http://schemas.microsoft.com/office/drawing/2014/main" id="{12E18F9A-80BF-4D0F-A0B4-E2356D2030A6}"/>
+                </a:ext>
+              </a:extLst>
+            </p:cNvPr>
+            <p:cNvSpPr txBox="1"/>
+            <p:nvPr/>
+          </p:nvSpPr>
+          <p:spPr>
+            <a:xfrm>
+              <a:off x="11355338" y="7023250"/>
+              <a:ext cx="7569300" cy="1093200"/>
+            </a:xfrm>
+            <a:prstGeom prst="rect">
+              <a:avLst/>
+            </a:prstGeom>
+            <a:noFill/>
+            <a:ln>
+              <a:noFill/>
+            </a:ln>
+          </p:spPr>
+          <p:txBody>
+            <a:bodyPr spcFirstLastPara="1" wrap="square" lIns="91425" tIns="91425" rIns="91425" bIns="91425" anchor="t" anchorCtr="0">
+              <a:noAutofit/>
+            </a:bodyPr>
+            <a:lstStyle/>
+            <a:p>
+              <a:pPr marL="0" lvl="0" indent="0" algn="l" rtl="0">
+                <a:spcBef>
+                  <a:spcPts val="0"/>
+                </a:spcBef>
+                <a:spcAft>
+                  <a:spcPts val="0"/>
+                </a:spcAft>
+                <a:buNone/>
+              </a:pPr>
+              <a:r>
+                <a:rPr lang="fr-FR" sz="4100" b="1">
+                  <a:latin typeface="Lora"/>
+                  <a:ea typeface="Lora"/>
+                  <a:cs typeface="Lora"/>
+                  <a:sym typeface="Lora"/>
+                </a:rPr>
+                <a:t>Comment recycler ?</a:t>
+              </a:r>
+              <a:endParaRPr sz="4100" b="1">
+                <a:latin typeface="Lora"/>
+                <a:ea typeface="Lora"/>
+                <a:cs typeface="Lora"/>
+                <a:sym typeface="Lora"/>
+              </a:endParaRPr>
+            </a:p>
+          </p:txBody>
+        </p:sp>
+      </p:grpSp>
+      <p:grpSp>
+        <p:nvGrpSpPr>
+          <p:cNvPr id="58" name="Google Shape;121;p1">
+            <a:extLst>
+              <a:ext uri="{FF2B5EF4-FFF2-40B4-BE49-F238E27FC236}">
+                <a16:creationId xmlns:a16="http://schemas.microsoft.com/office/drawing/2014/main" id="{99E86E9D-651B-4C12-AB23-D7D09E6D1468}"/>
+              </a:ext>
+            </a:extLst>
+          </p:cNvPr>
+          <p:cNvGrpSpPr/>
+          <p:nvPr/>
+        </p:nvGrpSpPr>
+        <p:grpSpPr>
+          <a:xfrm>
+            <a:off x="522363" y="11251134"/>
+            <a:ext cx="10366875" cy="9030300"/>
+            <a:chOff x="8010000" y="17212713"/>
+            <a:chExt cx="10366875" cy="9030300"/>
+          </a:xfrm>
+        </p:grpSpPr>
+        <p:sp>
+          <p:nvSpPr>
+            <p:cNvPr id="60" name="Google Shape;122;p1">
+              <a:extLst>
+                <a:ext uri="{FF2B5EF4-FFF2-40B4-BE49-F238E27FC236}">
+                  <a16:creationId xmlns:a16="http://schemas.microsoft.com/office/drawing/2014/main" id="{CFD94CCC-715D-44C3-B7B5-60CD29474D0F}"/>
+                </a:ext>
+              </a:extLst>
+            </p:cNvPr>
+            <p:cNvSpPr/>
+            <p:nvPr/>
+          </p:nvSpPr>
+          <p:spPr>
+            <a:xfrm>
+              <a:off x="8010000" y="17212713"/>
+              <a:ext cx="8909400" cy="9030300"/>
+            </a:xfrm>
+            <a:prstGeom prst="roundRect">
+              <a:avLst>
+                <a:gd name="adj" fmla="val 16667"/>
+              </a:avLst>
+            </a:prstGeom>
+            <a:gradFill>
+              <a:gsLst>
+                <a:gs pos="0">
+                  <a:srgbClr val="FDECDB"/>
+                </a:gs>
+                <a:gs pos="100000">
+                  <a:srgbClr val="F0A963"/>
+                </a:gs>
+              </a:gsLst>
+              <a:path path="circle">
+                <a:fillToRect l="50000" t="50000" r="50000" b="50000"/>
+              </a:path>
+              <a:tileRect/>
+            </a:gradFill>
+            <a:ln w="9525" cap="flat" cmpd="sng">
+              <a:solidFill>
+                <a:schemeClr val="dk2"/>
+              </a:solidFill>
+              <a:prstDash val="solid"/>
+              <a:round/>
+              <a:headEnd type="none" w="sm" len="sm"/>
+              <a:tailEnd type="none" w="sm" len="sm"/>
+            </a:ln>
+          </p:spPr>
+          <p:txBody>
+            <a:bodyPr spcFirstLastPara="1" wrap="square" lIns="91425" tIns="91425" rIns="91425" bIns="91425" anchor="ctr" anchorCtr="0">
+              <a:noAutofit/>
+            </a:bodyPr>
+            <a:lstStyle/>
+            <a:p>
+              <a:pPr marL="457200" lvl="0" indent="-381000" algn="just" rtl="0">
+                <a:spcBef>
+                  <a:spcPts val="0"/>
+                </a:spcBef>
+                <a:spcAft>
+                  <a:spcPts val="0"/>
+                </a:spcAft>
+                <a:buClr>
+                  <a:schemeClr val="dk1"/>
+                </a:buClr>
+                <a:buSzPts val="2400"/>
+                <a:buChar char="●"/>
+              </a:pPr>
+              <a:r>
+                <a:rPr lang="fr-FR" sz="2400">
+                  <a:solidFill>
+                    <a:schemeClr val="dk1"/>
+                  </a:solidFill>
+                </a:rPr>
+                <a:t>Production minière de cuivre dans le monde en 2019 : 20 Mt</a:t>
+              </a:r>
+              <a:endParaRPr sz="2400">
+                <a:solidFill>
+                  <a:schemeClr val="dk1"/>
+                </a:solidFill>
+              </a:endParaRPr>
+            </a:p>
+            <a:p>
+              <a:pPr marL="457200" lvl="0" indent="0" algn="just" rtl="0">
+                <a:spcBef>
+                  <a:spcPts val="0"/>
+                </a:spcBef>
+                <a:spcAft>
+                  <a:spcPts val="0"/>
+                </a:spcAft>
+                <a:buClr>
+                  <a:schemeClr val="dk1"/>
+                </a:buClr>
+                <a:buSzPts val="1100"/>
+                <a:buFont typeface="Arial"/>
+                <a:buNone/>
+              </a:pPr>
+              <a:endParaRPr sz="2400">
+                <a:solidFill>
+                  <a:schemeClr val="dk1"/>
+                </a:solidFill>
+              </a:endParaRPr>
+            </a:p>
+            <a:p>
+              <a:pPr marL="457200" lvl="0" indent="-381000" algn="just" rtl="0">
+                <a:spcBef>
+                  <a:spcPts val="0"/>
+                </a:spcBef>
+                <a:spcAft>
+                  <a:spcPts val="0"/>
+                </a:spcAft>
+                <a:buClr>
+                  <a:schemeClr val="dk1"/>
+                </a:buClr>
+                <a:buSzPts val="2400"/>
+                <a:buChar char="●"/>
+              </a:pPr>
+              <a:r>
+                <a:rPr lang="fr-FR" sz="2400">
+                  <a:solidFill>
+                    <a:schemeClr val="dk1"/>
+                  </a:solidFill>
+                </a:rPr>
+                <a:t>Réserves actuelles (gisements découverts et jugés rentables en 2017) : environ 720 millions de tonnes</a:t>
+              </a:r>
+              <a:endParaRPr sz="2400">
+                <a:solidFill>
+                  <a:schemeClr val="dk1"/>
+                </a:solidFill>
+              </a:endParaRPr>
+            </a:p>
+            <a:p>
+              <a:pPr marL="457200" lvl="0" indent="0" algn="just" rtl="0">
+                <a:spcBef>
+                  <a:spcPts val="0"/>
+                </a:spcBef>
+                <a:spcAft>
+                  <a:spcPts val="0"/>
+                </a:spcAft>
+                <a:buNone/>
+              </a:pPr>
+              <a:endParaRPr sz="2400">
+                <a:solidFill>
+                  <a:schemeClr val="dk1"/>
+                </a:solidFill>
+              </a:endParaRPr>
+            </a:p>
+            <a:p>
+              <a:pPr marL="457200" lvl="0" indent="-381000" algn="just" rtl="0">
+                <a:spcBef>
+                  <a:spcPts val="0"/>
+                </a:spcBef>
+                <a:spcAft>
+                  <a:spcPts val="0"/>
+                </a:spcAft>
+                <a:buClr>
+                  <a:schemeClr val="dk1"/>
+                </a:buClr>
+                <a:buSzPts val="2400"/>
+                <a:buChar char="●"/>
+              </a:pPr>
+              <a:r>
+                <a:rPr lang="fr-FR" sz="2400">
+                  <a:solidFill>
+                    <a:schemeClr val="dk1"/>
+                  </a:solidFill>
+                </a:rPr>
+                <a:t>Ressources globales (réserves + gisements potentiels pas encore exploités) : plus de 5 milliards de tonnes</a:t>
+              </a:r>
+              <a:endParaRPr sz="2400" i="1">
+                <a:solidFill>
+                  <a:srgbClr val="0000FF"/>
+                </a:solidFill>
+              </a:endParaRPr>
+            </a:p>
+            <a:p>
+              <a:pPr marL="457200" lvl="0" indent="0" algn="just" rtl="0">
+                <a:spcBef>
+                  <a:spcPts val="0"/>
+                </a:spcBef>
+                <a:spcAft>
+                  <a:spcPts val="0"/>
+                </a:spcAft>
+                <a:buClr>
+                  <a:schemeClr val="dk1"/>
+                </a:buClr>
+                <a:buSzPts val="1100"/>
+                <a:buFont typeface="Arial"/>
+                <a:buNone/>
+              </a:pPr>
+              <a:endParaRPr sz="2400">
+                <a:solidFill>
+                  <a:schemeClr val="dk1"/>
+                </a:solidFill>
+              </a:endParaRPr>
+            </a:p>
+            <a:p>
+              <a:pPr marL="457200" lvl="0" indent="-381000" algn="just" rtl="0">
+                <a:spcBef>
+                  <a:spcPts val="0"/>
+                </a:spcBef>
+                <a:spcAft>
+                  <a:spcPts val="0"/>
+                </a:spcAft>
+                <a:buClr>
+                  <a:schemeClr val="dk1"/>
+                </a:buClr>
+                <a:buSzPts val="2400"/>
+                <a:buChar char="●"/>
+              </a:pPr>
+              <a:r>
+                <a:rPr lang="fr-FR" sz="2400">
+                  <a:solidFill>
+                    <a:schemeClr val="dk1"/>
+                  </a:solidFill>
+                </a:rPr>
+                <a:t>⅔  des 550 millions de tonnes de cuivre produites depuis 1900 sont encore utilisées</a:t>
+              </a:r>
+              <a:endParaRPr sz="2400">
+                <a:solidFill>
+                  <a:schemeClr val="dk1"/>
+                </a:solidFill>
+              </a:endParaRPr>
+            </a:p>
+            <a:p>
+              <a:pPr marL="457200" lvl="0" indent="0" algn="just" rtl="0">
+                <a:spcBef>
+                  <a:spcPts val="0"/>
+                </a:spcBef>
+                <a:spcAft>
+                  <a:spcPts val="0"/>
+                </a:spcAft>
+                <a:buClr>
+                  <a:schemeClr val="dk1"/>
+                </a:buClr>
+                <a:buSzPts val="1100"/>
+                <a:buFont typeface="Arial"/>
+                <a:buNone/>
+              </a:pPr>
+              <a:endParaRPr sz="2400">
+                <a:solidFill>
+                  <a:schemeClr val="dk1"/>
+                </a:solidFill>
+              </a:endParaRPr>
+            </a:p>
+            <a:p>
+              <a:pPr marL="457200" lvl="0" indent="-381000" algn="just" rtl="0">
+                <a:spcBef>
+                  <a:spcPts val="0"/>
+                </a:spcBef>
+                <a:spcAft>
+                  <a:spcPts val="0"/>
+                </a:spcAft>
+                <a:buClr>
+                  <a:schemeClr val="dk1"/>
+                </a:buClr>
+                <a:buSzPts val="2400"/>
+                <a:buChar char="●"/>
+              </a:pPr>
+              <a:r>
+                <a:rPr lang="fr-FR" sz="2400">
+                  <a:solidFill>
+                    <a:schemeClr val="dk1"/>
+                  </a:solidFill>
+                </a:rPr>
+                <a:t>Besoin croissant de cuivre : + 250 % depuis 1960 (5 à 18 millions de tonnes)</a:t>
+              </a:r>
+              <a:endParaRPr sz="2400">
+                <a:solidFill>
+                  <a:schemeClr val="dk1"/>
+                </a:solidFill>
+              </a:endParaRPr>
+            </a:p>
+            <a:p>
+              <a:pPr marL="457200" lvl="0" indent="0" algn="just" rtl="0">
+                <a:spcBef>
+                  <a:spcPts val="0"/>
+                </a:spcBef>
+                <a:spcAft>
+                  <a:spcPts val="0"/>
+                </a:spcAft>
+                <a:buClr>
+                  <a:schemeClr val="dk1"/>
+                </a:buClr>
+                <a:buSzPts val="1100"/>
+                <a:buFont typeface="Arial"/>
+                <a:buNone/>
+              </a:pPr>
+              <a:endParaRPr sz="2400">
+                <a:solidFill>
+                  <a:schemeClr val="dk1"/>
+                </a:solidFill>
+              </a:endParaRPr>
+            </a:p>
+            <a:p>
+              <a:pPr marL="457200" lvl="0" indent="-381000" algn="just" rtl="0">
+                <a:spcBef>
+                  <a:spcPts val="0"/>
+                </a:spcBef>
+                <a:spcAft>
+                  <a:spcPts val="0"/>
+                </a:spcAft>
+                <a:buClr>
+                  <a:schemeClr val="dk1"/>
+                </a:buClr>
+                <a:buSzPts val="2400"/>
+                <a:buChar char="●"/>
+              </a:pPr>
+              <a:r>
+                <a:rPr lang="fr-FR" sz="2400">
+                  <a:solidFill>
+                    <a:schemeClr val="dk1"/>
+                  </a:solidFill>
+                </a:rPr>
+                <a:t>41,5% du cuivre utilisé en Europe provient du recyclage ce qui représente entre 2 et 3 millions de tonnes</a:t>
+              </a:r>
+              <a:endParaRPr/>
+            </a:p>
+          </p:txBody>
+        </p:sp>
+        <p:sp>
+          <p:nvSpPr>
+            <p:cNvPr id="61" name="Google Shape;123;p1">
+              <a:extLst>
+                <a:ext uri="{FF2B5EF4-FFF2-40B4-BE49-F238E27FC236}">
+                  <a16:creationId xmlns:a16="http://schemas.microsoft.com/office/drawing/2014/main" id="{61AB3CF2-89E8-4E66-93C5-AA2FB848058D}"/>
+                </a:ext>
+              </a:extLst>
+            </p:cNvPr>
+            <p:cNvSpPr txBox="1"/>
+            <p:nvPr/>
+          </p:nvSpPr>
+          <p:spPr>
+            <a:xfrm>
+              <a:off x="8321775" y="17515900"/>
+              <a:ext cx="10055100" cy="1093200"/>
+            </a:xfrm>
+            <a:prstGeom prst="rect">
+              <a:avLst/>
+            </a:prstGeom>
+            <a:noFill/>
+            <a:ln>
+              <a:noFill/>
+            </a:ln>
+          </p:spPr>
+          <p:txBody>
+            <a:bodyPr spcFirstLastPara="1" wrap="square" lIns="91425" tIns="91425" rIns="91425" bIns="91425" anchor="t" anchorCtr="0">
+              <a:noAutofit/>
+            </a:bodyPr>
+            <a:lstStyle/>
+            <a:p>
+              <a:pPr marL="0" lvl="0" indent="0" algn="l" rtl="0">
+                <a:spcBef>
+                  <a:spcPts val="0"/>
+                </a:spcBef>
+                <a:spcAft>
+                  <a:spcPts val="0"/>
+                </a:spcAft>
+                <a:buNone/>
+              </a:pPr>
+              <a:r>
+                <a:rPr lang="fr-FR" sz="4500" b="1">
+                  <a:latin typeface="Lora"/>
+                  <a:ea typeface="Lora"/>
+                  <a:cs typeface="Lora"/>
+                  <a:sym typeface="Lora"/>
+                </a:rPr>
+                <a:t>Le cuivre en quelques chiffres</a:t>
+              </a:r>
+              <a:endParaRPr sz="4500" b="1">
+                <a:latin typeface="Lora"/>
+                <a:ea typeface="Lora"/>
+                <a:cs typeface="Lora"/>
+                <a:sym typeface="Lora"/>
+              </a:endParaRPr>
+            </a:p>
+          </p:txBody>
+        </p:sp>
+      </p:grpSp>
+      <p:pic>
+        <p:nvPicPr>
+          <p:cNvPr id="62" name="Google Shape;125;p1">
+            <a:extLst>
+              <a:ext uri="{FF2B5EF4-FFF2-40B4-BE49-F238E27FC236}">
+                <a16:creationId xmlns:a16="http://schemas.microsoft.com/office/drawing/2014/main" id="{F328FB4C-438B-49CC-B307-E5699B074CC1}"/>
+              </a:ext>
+            </a:extLst>
+          </p:cNvPr>
+          <p:cNvPicPr preferRelativeResize="0"/>
+          <p:nvPr/>
+        </p:nvPicPr>
+        <p:blipFill rotWithShape="1">
+          <a:blip r:embed="rId15">
+            <a:alphaModFix/>
+          </a:blip>
+          <a:srcRect l="20831" t="27074" r="23736" b="9384"/>
+          <a:stretch/>
+        </p:blipFill>
+        <p:spPr>
+          <a:xfrm>
+            <a:off x="18307" y="27934534"/>
+            <a:ext cx="6952824" cy="4482899"/>
+          </a:xfrm>
+          <a:prstGeom prst="rect">
+            <a:avLst/>
+          </a:prstGeom>
+          <a:noFill/>
+          <a:ln>
+            <a:noFill/>
+          </a:ln>
+        </p:spPr>
+      </p:pic>
+      <p:grpSp>
+        <p:nvGrpSpPr>
+          <p:cNvPr id="65" name="Google Shape;126;p1">
+            <a:extLst>
+              <a:ext uri="{FF2B5EF4-FFF2-40B4-BE49-F238E27FC236}">
+                <a16:creationId xmlns:a16="http://schemas.microsoft.com/office/drawing/2014/main" id="{757EF556-293B-472C-8260-FCE7595C16B8}"/>
+              </a:ext>
+            </a:extLst>
+          </p:cNvPr>
+          <p:cNvGrpSpPr/>
+          <p:nvPr/>
+        </p:nvGrpSpPr>
+        <p:grpSpPr>
+          <a:xfrm>
+            <a:off x="9972616" y="11358802"/>
+            <a:ext cx="11522100" cy="10405500"/>
+            <a:chOff x="17693900" y="14715413"/>
+            <a:chExt cx="11522100" cy="10405500"/>
+          </a:xfrm>
+        </p:grpSpPr>
+        <p:grpSp>
+          <p:nvGrpSpPr>
+            <p:cNvPr id="66" name="Google Shape;127;p1">
+              <a:extLst>
+                <a:ext uri="{FF2B5EF4-FFF2-40B4-BE49-F238E27FC236}">
+                  <a16:creationId xmlns:a16="http://schemas.microsoft.com/office/drawing/2014/main" id="{A366C2D6-D4EB-415F-AF2B-1C5EF8991DF6}"/>
+                </a:ext>
+              </a:extLst>
+            </p:cNvPr>
+            <p:cNvGrpSpPr/>
+            <p:nvPr/>
+          </p:nvGrpSpPr>
+          <p:grpSpPr>
+            <a:xfrm>
+              <a:off x="17693900" y="14715413"/>
+              <a:ext cx="11522100" cy="10405500"/>
+              <a:chOff x="17693900" y="14715413"/>
+              <a:chExt cx="11522100" cy="10405500"/>
+            </a:xfrm>
+          </p:grpSpPr>
+          <p:sp>
+            <p:nvSpPr>
+              <p:cNvPr id="70" name="Google Shape;128;p1">
+                <a:extLst>
+                  <a:ext uri="{FF2B5EF4-FFF2-40B4-BE49-F238E27FC236}">
+                    <a16:creationId xmlns:a16="http://schemas.microsoft.com/office/drawing/2014/main" id="{E1970B28-196F-4FB1-834A-DF1A4AAEF48C}"/>
+                  </a:ext>
+                </a:extLst>
+              </p:cNvPr>
+              <p:cNvSpPr/>
+              <p:nvPr/>
+            </p:nvSpPr>
+            <p:spPr>
+              <a:xfrm>
+                <a:off x="17693900" y="14715413"/>
+                <a:ext cx="11522100" cy="10405500"/>
+              </a:xfrm>
+              <a:prstGeom prst="roundRect">
+                <a:avLst>
+                  <a:gd name="adj" fmla="val 16667"/>
+                </a:avLst>
+              </a:prstGeom>
+              <a:gradFill>
+                <a:gsLst>
+                  <a:gs pos="0">
+                    <a:srgbClr val="FDECDB"/>
+                  </a:gs>
+                  <a:gs pos="100000">
+                    <a:srgbClr val="F0A963"/>
+                  </a:gs>
+                </a:gsLst>
+                <a:path path="circle">
+                  <a:fillToRect l="50000" t="50000" r="50000" b="50000"/>
+                </a:path>
+                <a:tileRect/>
+              </a:gradFill>
+              <a:ln w="9525" cap="flat" cmpd="sng">
+                <a:solidFill>
+                  <a:schemeClr val="dk2"/>
+                </a:solidFill>
+                <a:prstDash val="solid"/>
+                <a:round/>
+                <a:headEnd type="none" w="sm" len="sm"/>
+                <a:tailEnd type="none" w="sm" len="sm"/>
+              </a:ln>
+            </p:spPr>
+            <p:txBody>
+              <a:bodyPr spcFirstLastPara="1" wrap="square" lIns="91425" tIns="91425" rIns="91425" bIns="91425" anchor="ctr" anchorCtr="0">
+                <a:noAutofit/>
+              </a:bodyPr>
+              <a:lstStyle/>
+              <a:p>
+                <a:pPr marL="0" lvl="0" indent="0" algn="just" rtl="0">
+                  <a:spcBef>
+                    <a:spcPts val="0"/>
+                  </a:spcBef>
+                  <a:spcAft>
+                    <a:spcPts val="0"/>
+                  </a:spcAft>
+                  <a:buNone/>
+                </a:pPr>
+                <a:r>
+                  <a:rPr lang="fr-FR" sz="2400" dirty="0">
+                    <a:solidFill>
+                      <a:schemeClr val="dk1"/>
+                    </a:solidFill>
+                  </a:rPr>
+                  <a:t>                                 </a:t>
+                </a:r>
+                <a:r>
+                  <a:rPr lang="fr-FR" sz="2800" dirty="0">
+                    <a:solidFill>
+                      <a:schemeClr val="dk1"/>
+                    </a:solidFill>
+                  </a:rPr>
+                  <a:t>  </a:t>
+                </a:r>
+                <a:endParaRPr sz="2800" dirty="0">
+                  <a:solidFill>
+                    <a:schemeClr val="dk1"/>
+                  </a:solidFill>
+                </a:endParaRPr>
+              </a:p>
+              <a:p>
+                <a:pPr marL="0" lvl="0" indent="0" algn="just" rtl="0">
+                  <a:spcBef>
+                    <a:spcPts val="0"/>
+                  </a:spcBef>
+                  <a:spcAft>
+                    <a:spcPts val="0"/>
+                  </a:spcAft>
+                  <a:buNone/>
+                </a:pPr>
+                <a:endParaRPr sz="3300" u="sng" dirty="0">
+                  <a:solidFill>
+                    <a:schemeClr val="dk1"/>
+                  </a:solidFill>
+                </a:endParaRPr>
+              </a:p>
+              <a:p>
+                <a:pPr marL="2880000" lvl="0" indent="0" algn="just" rtl="0">
+                  <a:spcBef>
+                    <a:spcPts val="0"/>
+                  </a:spcBef>
+                  <a:spcAft>
+                    <a:spcPts val="0"/>
+                  </a:spcAft>
+                  <a:buNone/>
+                </a:pPr>
+                <a:r>
+                  <a:rPr lang="fr-FR" sz="3300" u="sng" dirty="0">
+                    <a:solidFill>
+                      <a:schemeClr val="dk1"/>
+                    </a:solidFill>
+                  </a:rPr>
+                  <a:t>Procédé de récupération en fonction de l’objet:</a:t>
+                </a:r>
+                <a:endParaRPr sz="3300" u="sng" dirty="0">
+                  <a:solidFill>
+                    <a:schemeClr val="dk1"/>
+                  </a:solidFill>
+                </a:endParaRPr>
+              </a:p>
+              <a:p>
+                <a:pPr marL="0" lvl="0" indent="0" algn="just" rtl="0">
+                  <a:spcBef>
+                    <a:spcPts val="0"/>
+                  </a:spcBef>
+                  <a:spcAft>
+                    <a:spcPts val="0"/>
+                  </a:spcAft>
+                  <a:buNone/>
+                </a:pPr>
+                <a:endParaRPr sz="2900" u="sng" dirty="0">
+                  <a:solidFill>
+                    <a:schemeClr val="dk1"/>
+                  </a:solidFill>
+                </a:endParaRPr>
+              </a:p>
+              <a:p>
+                <a:pPr marL="3240000" lvl="0" indent="-381000" algn="just" rtl="0">
+                  <a:spcBef>
+                    <a:spcPts val="0"/>
+                  </a:spcBef>
+                  <a:spcAft>
+                    <a:spcPts val="0"/>
+                  </a:spcAft>
+                  <a:buClr>
+                    <a:schemeClr val="dk1"/>
+                  </a:buClr>
+                  <a:buSzPts val="2400"/>
+                  <a:buChar char="-"/>
+                </a:pPr>
+                <a:r>
+                  <a:rPr lang="fr-FR" sz="2400" b="1" u="sng" dirty="0">
+                    <a:solidFill>
+                      <a:schemeClr val="dk1"/>
+                    </a:solidFill>
+                  </a:rPr>
+                  <a:t>Câble électrique</a:t>
+                </a:r>
+                <a:r>
+                  <a:rPr lang="fr-FR" sz="2400" dirty="0">
+                    <a:solidFill>
+                      <a:schemeClr val="dk1"/>
+                    </a:solidFill>
+                  </a:rPr>
+                  <a:t> :  granulation, tamisages et fonderie</a:t>
+                </a:r>
+                <a:endParaRPr sz="2400" dirty="0">
+                  <a:solidFill>
+                    <a:schemeClr val="dk1"/>
+                  </a:solidFill>
+                </a:endParaRPr>
+              </a:p>
+              <a:p>
+                <a:pPr marL="0" lvl="0" indent="0" algn="just" rtl="0">
+                  <a:spcBef>
+                    <a:spcPts val="0"/>
+                  </a:spcBef>
+                  <a:spcAft>
+                    <a:spcPts val="0"/>
+                  </a:spcAft>
+                  <a:buNone/>
+                </a:pPr>
+                <a:endParaRPr sz="2400" dirty="0">
+                  <a:solidFill>
+                    <a:schemeClr val="dk1"/>
+                  </a:solidFill>
+                </a:endParaRPr>
+              </a:p>
+              <a:p>
+                <a:pPr marL="3240000" lvl="0" indent="-381000" algn="just" rtl="0">
+                  <a:spcBef>
+                    <a:spcPts val="0"/>
+                  </a:spcBef>
+                  <a:spcAft>
+                    <a:spcPts val="0"/>
+                  </a:spcAft>
+                  <a:buClr>
+                    <a:schemeClr val="dk1"/>
+                  </a:buClr>
+                  <a:buSzPts val="2400"/>
+                  <a:buChar char="-"/>
+                </a:pPr>
+                <a:r>
+                  <a:rPr lang="fr-FR" sz="2400" b="1" u="sng" dirty="0">
+                    <a:solidFill>
+                      <a:schemeClr val="dk1"/>
+                    </a:solidFill>
+                  </a:rPr>
+                  <a:t>Carte électronique</a:t>
+                </a:r>
+                <a:r>
+                  <a:rPr lang="fr-FR" sz="2400" u="sng" dirty="0">
+                    <a:solidFill>
+                      <a:schemeClr val="dk1"/>
+                    </a:solidFill>
+                  </a:rPr>
+                  <a:t> :</a:t>
+                </a:r>
+                <a:r>
+                  <a:rPr lang="fr-FR" sz="2400" dirty="0">
+                    <a:solidFill>
+                      <a:schemeClr val="dk1"/>
+                    </a:solidFill>
+                  </a:rPr>
+                  <a:t> </a:t>
+                </a:r>
+                <a:endParaRPr sz="2400" dirty="0">
+                  <a:solidFill>
+                    <a:schemeClr val="dk1"/>
+                  </a:solidFill>
+                </a:endParaRPr>
+              </a:p>
+              <a:p>
+                <a:pPr marL="3240000" lvl="0" indent="-228600" algn="just" rtl="0">
+                  <a:spcBef>
+                    <a:spcPts val="0"/>
+                  </a:spcBef>
+                  <a:spcAft>
+                    <a:spcPts val="0"/>
+                  </a:spcAft>
+                  <a:buClr>
+                    <a:schemeClr val="dk1"/>
+                  </a:buClr>
+                  <a:buSzPts val="1100"/>
+                  <a:buFont typeface="Arial"/>
+                  <a:buNone/>
+                </a:pPr>
+                <a:r>
+                  <a:rPr lang="fr-FR" sz="2400" dirty="0" err="1">
+                    <a:solidFill>
+                      <a:schemeClr val="dk1"/>
+                    </a:solidFill>
+                  </a:rPr>
+                  <a:t>Pyro-métallurgie</a:t>
+                </a:r>
+                <a:r>
+                  <a:rPr lang="fr-FR" sz="2400" dirty="0">
+                    <a:solidFill>
+                      <a:schemeClr val="dk1"/>
+                    </a:solidFill>
+                  </a:rPr>
+                  <a:t> : broyage et pyrolyse⇒ très consommatrice en énergie (fours chauffés à 500 degrés)</a:t>
+                </a:r>
+                <a:endParaRPr sz="2400" dirty="0">
+                  <a:solidFill>
+                    <a:schemeClr val="dk1"/>
+                  </a:solidFill>
+                </a:endParaRPr>
+              </a:p>
+              <a:p>
+                <a:pPr marL="3240000" lvl="0" indent="-228600" algn="just" rtl="0">
+                  <a:spcBef>
+                    <a:spcPts val="0"/>
+                  </a:spcBef>
+                  <a:spcAft>
+                    <a:spcPts val="0"/>
+                  </a:spcAft>
+                  <a:buClr>
+                    <a:schemeClr val="dk1"/>
+                  </a:buClr>
+                  <a:buSzPts val="1100"/>
+                  <a:buFont typeface="Arial"/>
+                  <a:buNone/>
+                </a:pPr>
+                <a:r>
+                  <a:rPr lang="fr-FR" sz="2400" dirty="0">
+                    <a:solidFill>
+                      <a:schemeClr val="dk1"/>
+                    </a:solidFill>
+                  </a:rPr>
+                  <a:t>Hydrométallurgie : dissolution avec acides ⇒ dégage dioxines et furanes, des </a:t>
+                </a:r>
+                <a:r>
+                  <a:rPr lang="fr-FR" sz="2400" dirty="0" err="1">
+                    <a:solidFill>
+                      <a:schemeClr val="dk1"/>
+                    </a:solidFill>
+                  </a:rPr>
+                  <a:t>gazs</a:t>
+                </a:r>
+                <a:r>
+                  <a:rPr lang="fr-FR" sz="2400" dirty="0">
+                    <a:solidFill>
+                      <a:schemeClr val="dk1"/>
+                    </a:solidFill>
+                  </a:rPr>
+                  <a:t> nocifs pour l'environnement</a:t>
+                </a:r>
+                <a:endParaRPr sz="2400" dirty="0">
+                  <a:solidFill>
+                    <a:schemeClr val="dk1"/>
+                  </a:solidFill>
+                </a:endParaRPr>
+              </a:p>
+              <a:p>
+                <a:pPr marL="3011400" lvl="0" indent="0" algn="just" rtl="0">
+                  <a:spcBef>
+                    <a:spcPts val="0"/>
+                  </a:spcBef>
+                  <a:spcAft>
+                    <a:spcPts val="0"/>
+                  </a:spcAft>
+                  <a:buNone/>
+                </a:pPr>
+                <a:r>
+                  <a:rPr lang="fr-FR" sz="2400" dirty="0">
+                    <a:solidFill>
+                      <a:schemeClr val="dk1"/>
+                    </a:solidFill>
+                  </a:rPr>
+                  <a:t>Micronisation : broyage puis séparation par granulométrie ⇒ ne récupère que 90% des métaux contre 98% avec les 2 autres méthodes </a:t>
+                </a:r>
+                <a:endParaRPr sz="2400" dirty="0">
+                  <a:solidFill>
+                    <a:srgbClr val="0000FF"/>
+                  </a:solidFill>
+                </a:endParaRPr>
+              </a:p>
+              <a:p>
+                <a:pPr marL="3240000" lvl="0" indent="-228600" algn="just" rtl="0">
+                  <a:spcBef>
+                    <a:spcPts val="0"/>
+                  </a:spcBef>
+                  <a:spcAft>
+                    <a:spcPts val="0"/>
+                  </a:spcAft>
+                  <a:buClr>
+                    <a:schemeClr val="dk1"/>
+                  </a:buClr>
+                  <a:buSzPts val="1100"/>
+                  <a:buFont typeface="Arial"/>
+                  <a:buNone/>
+                </a:pPr>
+                <a:endParaRPr sz="2400" dirty="0">
+                  <a:solidFill>
+                    <a:srgbClr val="0000FF"/>
+                  </a:solidFill>
+                </a:endParaRPr>
+              </a:p>
+              <a:p>
+                <a:pPr marL="3240000" lvl="0" indent="-381000" algn="just" rtl="0">
+                  <a:spcBef>
+                    <a:spcPts val="0"/>
+                  </a:spcBef>
+                  <a:spcAft>
+                    <a:spcPts val="0"/>
+                  </a:spcAft>
+                  <a:buClr>
+                    <a:schemeClr val="dk1"/>
+                  </a:buClr>
+                  <a:buSzPts val="2400"/>
+                  <a:buChar char="-"/>
+                </a:pPr>
+                <a:r>
+                  <a:rPr lang="fr-FR" sz="2400" u="sng" dirty="0" err="1">
+                    <a:solidFill>
+                      <a:schemeClr val="dk1"/>
+                    </a:solidFill>
+                  </a:rPr>
+                  <a:t>Nanofil</a:t>
+                </a:r>
+                <a:r>
+                  <a:rPr lang="fr-FR" sz="2400" u="sng" dirty="0">
+                    <a:solidFill>
+                      <a:schemeClr val="dk1"/>
+                    </a:solidFill>
+                  </a:rPr>
+                  <a:t> de cuivre dans les </a:t>
+                </a:r>
+                <a:r>
+                  <a:rPr lang="fr-FR" sz="2400" b="1" u="sng" dirty="0">
+                    <a:solidFill>
+                      <a:schemeClr val="dk1"/>
+                    </a:solidFill>
+                  </a:rPr>
+                  <a:t>chaussettes</a:t>
+                </a:r>
+                <a:r>
+                  <a:rPr lang="fr-FR" sz="2400" u="sng" dirty="0">
+                    <a:solidFill>
+                      <a:schemeClr val="dk1"/>
+                    </a:solidFill>
+                  </a:rPr>
+                  <a:t> :</a:t>
+                </a:r>
+                <a:r>
+                  <a:rPr lang="fr-FR" sz="2400" dirty="0">
+                    <a:solidFill>
+                      <a:schemeClr val="dk1"/>
+                    </a:solidFill>
+                  </a:rPr>
+                  <a:t> pour limiter le développement de bactéries, nous sommes dans un usage dispersif dans lequel </a:t>
+                </a:r>
+                <a:r>
+                  <a:rPr lang="fr-FR" sz="2400" b="1" dirty="0">
+                    <a:solidFill>
+                      <a:schemeClr val="dk1"/>
+                    </a:solidFill>
+                  </a:rPr>
+                  <a:t>le cuivre ne peut pas être récupéré</a:t>
+                </a:r>
+                <a:endParaRPr sz="2400" b="1" dirty="0">
+                  <a:solidFill>
+                    <a:schemeClr val="dk1"/>
+                  </a:solidFill>
+                </a:endParaRPr>
+              </a:p>
+              <a:p>
+                <a:pPr marL="457200" lvl="0" indent="0" algn="just" rtl="0">
+                  <a:spcBef>
+                    <a:spcPts val="0"/>
+                  </a:spcBef>
+                  <a:spcAft>
+                    <a:spcPts val="0"/>
+                  </a:spcAft>
+                  <a:buNone/>
+                </a:pPr>
+                <a:endParaRPr sz="2400" b="1" dirty="0">
+                  <a:solidFill>
+                    <a:schemeClr val="dk1"/>
+                  </a:solidFill>
+                </a:endParaRPr>
+              </a:p>
+              <a:p>
+                <a:pPr marL="3240000" lvl="0" indent="-228600" algn="just" rtl="0">
+                  <a:spcBef>
+                    <a:spcPts val="0"/>
+                  </a:spcBef>
+                  <a:spcAft>
+                    <a:spcPts val="0"/>
+                  </a:spcAft>
+                  <a:buClr>
+                    <a:schemeClr val="dk1"/>
+                  </a:buClr>
+                  <a:buSzPts val="1100"/>
+                  <a:buFont typeface="Arial"/>
+                  <a:buNone/>
+                </a:pPr>
+                <a:r>
+                  <a:rPr lang="fr-FR" sz="2400" dirty="0">
+                    <a:solidFill>
+                      <a:schemeClr val="dk1"/>
+                    </a:solidFill>
+                  </a:rPr>
+                  <a:t>⇒ différence de recyclabilité selon les produits (usage dispersif ou non)</a:t>
+                </a:r>
+                <a:endParaRPr dirty="0"/>
+              </a:p>
+            </p:txBody>
+          </p:sp>
+          <p:sp>
+            <p:nvSpPr>
+              <p:cNvPr id="71" name="Google Shape;129;p1">
+                <a:extLst>
+                  <a:ext uri="{FF2B5EF4-FFF2-40B4-BE49-F238E27FC236}">
+                    <a16:creationId xmlns:a16="http://schemas.microsoft.com/office/drawing/2014/main" id="{70E34AB3-1A85-485B-B09F-B69BEFAB19E2}"/>
+                  </a:ext>
+                </a:extLst>
+              </p:cNvPr>
+              <p:cNvSpPr txBox="1"/>
+              <p:nvPr/>
+            </p:nvSpPr>
+            <p:spPr>
+              <a:xfrm>
+                <a:off x="19686650" y="15050035"/>
+                <a:ext cx="7897800" cy="1026000"/>
+              </a:xfrm>
+              <a:prstGeom prst="rect">
+                <a:avLst/>
+              </a:prstGeom>
+              <a:noFill/>
+              <a:ln>
+                <a:noFill/>
+              </a:ln>
+            </p:spPr>
+            <p:txBody>
+              <a:bodyPr spcFirstLastPara="1" wrap="square" lIns="91425" tIns="91425" rIns="91425" bIns="91425" anchor="t" anchorCtr="0">
+                <a:noAutofit/>
+              </a:bodyPr>
+              <a:lstStyle/>
+              <a:p>
+                <a:pPr marL="0" lvl="0" indent="0" algn="l" rtl="0">
+                  <a:spcBef>
+                    <a:spcPts val="0"/>
+                  </a:spcBef>
+                  <a:spcAft>
+                    <a:spcPts val="0"/>
+                  </a:spcAft>
+                  <a:buNone/>
+                </a:pPr>
+                <a:r>
+                  <a:rPr lang="fr-FR" sz="4100" b="1">
+                    <a:latin typeface="Lora"/>
+                    <a:ea typeface="Lora"/>
+                    <a:cs typeface="Lora"/>
+                    <a:sym typeface="Lora"/>
+                  </a:rPr>
+                  <a:t>C’est pas si simple ...</a:t>
+                </a:r>
+                <a:endParaRPr sz="4100" b="1">
+                  <a:latin typeface="Lora"/>
+                  <a:ea typeface="Lora"/>
+                  <a:cs typeface="Lora"/>
+                  <a:sym typeface="Lora"/>
+                </a:endParaRPr>
+              </a:p>
+            </p:txBody>
+          </p:sp>
+        </p:grpSp>
+        <p:pic>
+          <p:nvPicPr>
+            <p:cNvPr id="67" name="Google Shape;130;p1">
+              <a:extLst>
+                <a:ext uri="{FF2B5EF4-FFF2-40B4-BE49-F238E27FC236}">
+                  <a16:creationId xmlns:a16="http://schemas.microsoft.com/office/drawing/2014/main" id="{AA5CF9FF-3A38-4DB9-AE6C-B3D5FFCF4DF3}"/>
+                </a:ext>
+              </a:extLst>
+            </p:cNvPr>
+            <p:cNvPicPr preferRelativeResize="0"/>
+            <p:nvPr/>
+          </p:nvPicPr>
+          <p:blipFill rotWithShape="1">
+            <a:blip r:embed="rId16">
+              <a:alphaModFix/>
+            </a:blip>
+            <a:srcRect l="11676" t="25975"/>
+            <a:stretch/>
+          </p:blipFill>
+          <p:spPr>
+            <a:xfrm>
+              <a:off x="17846300" y="16622138"/>
+              <a:ext cx="2944500" cy="2467800"/>
+            </a:xfrm>
+            <a:prstGeom prst="ellipse">
+              <a:avLst/>
+            </a:prstGeom>
+            <a:noFill/>
+            <a:ln>
+              <a:noFill/>
+            </a:ln>
+          </p:spPr>
+        </p:pic>
+        <p:pic>
+          <p:nvPicPr>
+            <p:cNvPr id="68" name="Google Shape;131;p1">
+              <a:extLst>
+                <a:ext uri="{FF2B5EF4-FFF2-40B4-BE49-F238E27FC236}">
+                  <a16:creationId xmlns:a16="http://schemas.microsoft.com/office/drawing/2014/main" id="{D3AC067F-DBEE-44C8-B1A5-549128CAF2F8}"/>
+                </a:ext>
+              </a:extLst>
+            </p:cNvPr>
+            <p:cNvPicPr preferRelativeResize="0"/>
+            <p:nvPr/>
+          </p:nvPicPr>
+          <p:blipFill rotWithShape="1">
+            <a:blip r:embed="rId17">
+              <a:alphaModFix/>
+            </a:blip>
+            <a:srcRect l="13764" t="12194" r="14919" b="17723"/>
+            <a:stretch/>
+          </p:blipFill>
+          <p:spPr>
+            <a:xfrm>
+              <a:off x="17766501" y="19302575"/>
+              <a:ext cx="3104100" cy="2287800"/>
+            </a:xfrm>
+            <a:prstGeom prst="roundRect">
+              <a:avLst>
+                <a:gd name="adj" fmla="val 16667"/>
+              </a:avLst>
+            </a:prstGeom>
+            <a:noFill/>
+            <a:ln>
+              <a:noFill/>
+            </a:ln>
+          </p:spPr>
+        </p:pic>
+        <p:pic>
+          <p:nvPicPr>
+            <p:cNvPr id="69" name="Google Shape;132;p1">
+              <a:extLst>
+                <a:ext uri="{FF2B5EF4-FFF2-40B4-BE49-F238E27FC236}">
+                  <a16:creationId xmlns:a16="http://schemas.microsoft.com/office/drawing/2014/main" id="{A1A330DD-3E4A-46BC-924B-A871A1F2A08F}"/>
+                </a:ext>
+              </a:extLst>
+            </p:cNvPr>
+            <p:cNvPicPr preferRelativeResize="0"/>
+            <p:nvPr/>
+          </p:nvPicPr>
+          <p:blipFill rotWithShape="1">
+            <a:blip r:embed="rId18">
+              <a:alphaModFix/>
+            </a:blip>
+            <a:srcRect/>
+            <a:stretch/>
+          </p:blipFill>
+          <p:spPr>
+            <a:xfrm>
+              <a:off x="18725387" y="22055975"/>
+              <a:ext cx="1848600" cy="2467800"/>
+            </a:xfrm>
+            <a:prstGeom prst="round2DiagRect">
+              <a:avLst>
+                <a:gd name="adj1" fmla="val 16667"/>
+                <a:gd name="adj2" fmla="val 0"/>
+              </a:avLst>
+            </a:prstGeom>
+            <a:noFill/>
+            <a:ln>
+              <a:noFill/>
+            </a:ln>
+          </p:spPr>
+        </p:pic>
+      </p:grpSp>
+      <p:grpSp>
+        <p:nvGrpSpPr>
+          <p:cNvPr id="72" name="Google Shape;133;p1">
+            <a:extLst>
+              <a:ext uri="{FF2B5EF4-FFF2-40B4-BE49-F238E27FC236}">
+                <a16:creationId xmlns:a16="http://schemas.microsoft.com/office/drawing/2014/main" id="{4C83786D-BCFF-422E-9D5D-F5A1EBE7C0C9}"/>
+              </a:ext>
+            </a:extLst>
+          </p:cNvPr>
+          <p:cNvGrpSpPr/>
+          <p:nvPr/>
+        </p:nvGrpSpPr>
+        <p:grpSpPr>
+          <a:xfrm>
+            <a:off x="21620700" y="11669022"/>
+            <a:ext cx="8616300" cy="8101500"/>
+            <a:chOff x="1527850" y="27798988"/>
+            <a:chExt cx="8616300" cy="8101500"/>
+          </a:xfrm>
+        </p:grpSpPr>
+        <p:sp>
+          <p:nvSpPr>
+            <p:cNvPr id="73" name="Google Shape;134;p1">
+              <a:extLst>
+                <a:ext uri="{FF2B5EF4-FFF2-40B4-BE49-F238E27FC236}">
+                  <a16:creationId xmlns:a16="http://schemas.microsoft.com/office/drawing/2014/main" id="{FE08E256-979B-4972-B2E8-EA6303A7B267}"/>
+                </a:ext>
+              </a:extLst>
+            </p:cNvPr>
+            <p:cNvSpPr/>
+            <p:nvPr/>
+          </p:nvSpPr>
+          <p:spPr>
+            <a:xfrm>
+              <a:off x="1527850" y="27798988"/>
+              <a:ext cx="8616300" cy="8101500"/>
+            </a:xfrm>
+            <a:prstGeom prst="roundRect">
+              <a:avLst>
+                <a:gd name="adj" fmla="val 16667"/>
+              </a:avLst>
+            </a:prstGeom>
+            <a:gradFill>
+              <a:gsLst>
+                <a:gs pos="0">
+                  <a:srgbClr val="FDECDB"/>
+                </a:gs>
+                <a:gs pos="100000">
+                  <a:srgbClr val="F0A963"/>
+                </a:gs>
+              </a:gsLst>
+              <a:path path="circle">
+                <a:fillToRect l="50000" t="50000" r="50000" b="50000"/>
+              </a:path>
+              <a:tileRect/>
+            </a:gradFill>
+            <a:ln w="9525" cap="flat" cmpd="sng">
+              <a:solidFill>
+                <a:schemeClr val="dk2"/>
+              </a:solidFill>
+              <a:prstDash val="solid"/>
+              <a:round/>
+              <a:headEnd type="none" w="sm" len="sm"/>
+              <a:tailEnd type="none" w="sm" len="sm"/>
+            </a:ln>
+          </p:spPr>
+          <p:txBody>
+            <a:bodyPr spcFirstLastPara="1" wrap="square" lIns="91425" tIns="91425" rIns="91425" bIns="91425" anchor="ctr" anchorCtr="0">
+              <a:noAutofit/>
+            </a:bodyPr>
+            <a:lstStyle/>
+            <a:p>
+              <a:pPr marL="0" lvl="0" indent="0" algn="l" rtl="0">
+                <a:spcBef>
+                  <a:spcPts val="0"/>
+                </a:spcBef>
+                <a:spcAft>
+                  <a:spcPts val="0"/>
+                </a:spcAft>
+                <a:buNone/>
+              </a:pPr>
+              <a:endParaRPr sz="2400"/>
+            </a:p>
+            <a:p>
+              <a:pPr marL="0" lvl="0" indent="0" algn="just" rtl="0">
+                <a:lnSpc>
+                  <a:spcPct val="115000"/>
+                </a:lnSpc>
+                <a:spcBef>
+                  <a:spcPts val="1200"/>
+                </a:spcBef>
+                <a:spcAft>
+                  <a:spcPts val="0"/>
+                </a:spcAft>
+                <a:buNone/>
+              </a:pPr>
+              <a:endParaRPr sz="2400" b="1">
+                <a:solidFill>
+                  <a:srgbClr val="222222"/>
+                </a:solidFill>
+              </a:endParaRPr>
+            </a:p>
+            <a:p>
+              <a:pPr marL="457200" lvl="0" indent="-381000" algn="just" rtl="0">
+                <a:lnSpc>
+                  <a:spcPct val="115000"/>
+                </a:lnSpc>
+                <a:spcBef>
+                  <a:spcPts val="1200"/>
+                </a:spcBef>
+                <a:spcAft>
+                  <a:spcPts val="0"/>
+                </a:spcAft>
+                <a:buClr>
+                  <a:srgbClr val="222222"/>
+                </a:buClr>
+                <a:buSzPts val="2400"/>
+                <a:buChar char="➔"/>
+              </a:pPr>
+              <a:r>
+                <a:rPr lang="fr-FR" sz="2400" b="1">
+                  <a:solidFill>
+                    <a:srgbClr val="222222"/>
+                  </a:solidFill>
+                </a:rPr>
+                <a:t>Économie de 31 m</a:t>
+              </a:r>
+              <a:r>
+                <a:rPr lang="fr-FR" sz="2400" b="1" baseline="30000">
+                  <a:solidFill>
+                    <a:srgbClr val="222222"/>
+                  </a:solidFill>
+                </a:rPr>
+                <a:t>3</a:t>
+              </a:r>
+              <a:r>
+                <a:rPr lang="fr-FR" sz="2400" b="1">
+                  <a:solidFill>
+                    <a:srgbClr val="222222"/>
+                  </a:solidFill>
+                </a:rPr>
+                <a:t> d’eau</a:t>
+              </a:r>
+              <a:r>
+                <a:rPr lang="fr-FR" sz="2400">
+                  <a:solidFill>
+                    <a:srgbClr val="222222"/>
+                  </a:solidFill>
+                </a:rPr>
+                <a:t> et de 300 kg CO2 eq par tonne de cuivre recyclé (soit environ </a:t>
+              </a:r>
+              <a:r>
+                <a:rPr lang="fr-FR" sz="2400" b="1">
+                  <a:solidFill>
+                    <a:srgbClr val="222222"/>
+                  </a:solidFill>
+                </a:rPr>
+                <a:t>40 millions de tonnes de CO2 par an dans le monde</a:t>
+              </a:r>
+              <a:r>
+                <a:rPr lang="fr-FR" sz="2400">
+                  <a:solidFill>
+                    <a:srgbClr val="222222"/>
+                  </a:solidFill>
+                </a:rPr>
+                <a:t>)</a:t>
+              </a:r>
+              <a:endParaRPr sz="2400">
+                <a:solidFill>
+                  <a:srgbClr val="222222"/>
+                </a:solidFill>
+              </a:endParaRPr>
+            </a:p>
+            <a:p>
+              <a:pPr marL="457200" lvl="0" indent="-381000" algn="just" rtl="0">
+                <a:lnSpc>
+                  <a:spcPct val="115000"/>
+                </a:lnSpc>
+                <a:spcBef>
+                  <a:spcPts val="0"/>
+                </a:spcBef>
+                <a:spcAft>
+                  <a:spcPts val="0"/>
+                </a:spcAft>
+                <a:buClr>
+                  <a:srgbClr val="222222"/>
+                </a:buClr>
+                <a:buSzPts val="2400"/>
+                <a:buChar char="➔"/>
+              </a:pPr>
+              <a:r>
+                <a:rPr lang="fr-FR" sz="2400">
+                  <a:solidFill>
+                    <a:srgbClr val="222222"/>
+                  </a:solidFill>
+                </a:rPr>
+                <a:t>Recyclage du cuivre nécessite jusqu’à 85 % moins d’énergie que la production primaire ➩</a:t>
+              </a:r>
+              <a:r>
+                <a:rPr lang="fr-FR" sz="2400" b="1">
+                  <a:solidFill>
+                    <a:srgbClr val="222222"/>
+                  </a:solidFill>
+                </a:rPr>
+                <a:t> économie de 100 millions de MWh d’énergie électrique </a:t>
+              </a:r>
+              <a:endParaRPr sz="2400" b="1">
+                <a:solidFill>
+                  <a:srgbClr val="222222"/>
+                </a:solidFill>
+              </a:endParaRPr>
+            </a:p>
+            <a:p>
+              <a:pPr marL="457200" lvl="0" indent="-381000" algn="just" rtl="0">
+                <a:lnSpc>
+                  <a:spcPct val="115000"/>
+                </a:lnSpc>
+                <a:spcBef>
+                  <a:spcPts val="0"/>
+                </a:spcBef>
+                <a:spcAft>
+                  <a:spcPts val="0"/>
+                </a:spcAft>
+                <a:buClr>
+                  <a:srgbClr val="222222"/>
+                </a:buClr>
+                <a:buSzPts val="2400"/>
+                <a:buChar char="➔"/>
+              </a:pPr>
+              <a:r>
+                <a:rPr lang="fr-FR" sz="2400">
+                  <a:solidFill>
+                    <a:srgbClr val="222222"/>
+                  </a:solidFill>
+                </a:rPr>
+                <a:t>Finitude des ressources: en fonction des modélisations, le </a:t>
+              </a:r>
+              <a:r>
+                <a:rPr lang="fr-FR" sz="2400" b="1">
+                  <a:solidFill>
+                    <a:srgbClr val="222222"/>
+                  </a:solidFill>
+                </a:rPr>
+                <a:t>pic d’extraction serait atteint avant la fin du siècle</a:t>
+              </a:r>
+              <a:endParaRPr sz="2400" b="1">
+                <a:solidFill>
+                  <a:srgbClr val="222222"/>
+                </a:solidFill>
+              </a:endParaRPr>
+            </a:p>
+            <a:p>
+              <a:pPr marL="457200" lvl="0" indent="-381000" algn="just" rtl="0">
+                <a:lnSpc>
+                  <a:spcPct val="115000"/>
+                </a:lnSpc>
+                <a:spcBef>
+                  <a:spcPts val="0"/>
+                </a:spcBef>
+                <a:spcAft>
+                  <a:spcPts val="0"/>
+                </a:spcAft>
+                <a:buClr>
+                  <a:srgbClr val="222222"/>
+                </a:buClr>
+                <a:buSzPts val="2400"/>
+                <a:buChar char="➔"/>
+              </a:pPr>
+              <a:r>
+                <a:rPr lang="fr-FR" sz="2400">
+                  <a:solidFill>
+                    <a:srgbClr val="222222"/>
+                  </a:solidFill>
+                </a:rPr>
+                <a:t>Il existe une relation d’exponentielle inverse entre la concentration de cuivre et l’impact environnemental lié à son extraction: </a:t>
+              </a:r>
+              <a:r>
+                <a:rPr lang="fr-FR" sz="2400" b="1">
+                  <a:solidFill>
+                    <a:srgbClr val="222222"/>
+                  </a:solidFill>
+                </a:rPr>
+                <a:t>dans l’avenir l’extraction traditionnelle sera de plus en plus coûteuse en énergie</a:t>
+              </a:r>
+              <a:r>
+                <a:rPr lang="fr-FR" sz="2400" b="1"/>
+                <a:t>.</a:t>
+              </a:r>
+              <a:endParaRPr sz="2400"/>
+            </a:p>
+          </p:txBody>
+        </p:sp>
+        <p:sp>
+          <p:nvSpPr>
+            <p:cNvPr id="74" name="Google Shape;135;p1">
+              <a:extLst>
+                <a:ext uri="{FF2B5EF4-FFF2-40B4-BE49-F238E27FC236}">
+                  <a16:creationId xmlns:a16="http://schemas.microsoft.com/office/drawing/2014/main" id="{3FE5CE31-6DAB-4BAC-BDF8-E1271117F73A}"/>
+                </a:ext>
+              </a:extLst>
+            </p:cNvPr>
+            <p:cNvSpPr txBox="1"/>
+            <p:nvPr/>
+          </p:nvSpPr>
+          <p:spPr>
+            <a:xfrm>
+              <a:off x="2418075" y="27881788"/>
+              <a:ext cx="7246800" cy="1615200"/>
+            </a:xfrm>
+            <a:prstGeom prst="rect">
+              <a:avLst/>
+            </a:prstGeom>
+            <a:noFill/>
+            <a:ln>
+              <a:noFill/>
+            </a:ln>
+          </p:spPr>
+          <p:txBody>
+            <a:bodyPr spcFirstLastPara="1" wrap="square" lIns="91425" tIns="91425" rIns="91425" bIns="91425" anchor="t" anchorCtr="0">
+              <a:noAutofit/>
+            </a:bodyPr>
+            <a:lstStyle/>
+            <a:p>
+              <a:pPr marL="0" lvl="0" indent="0" algn="l" rtl="0">
+                <a:spcBef>
+                  <a:spcPts val="0"/>
+                </a:spcBef>
+                <a:spcAft>
+                  <a:spcPts val="0"/>
+                </a:spcAft>
+                <a:buNone/>
+              </a:pPr>
+              <a:r>
+                <a:rPr lang="fr-FR" sz="4000" b="1">
+                  <a:latin typeface="Lora"/>
+                  <a:ea typeface="Lora"/>
+                  <a:cs typeface="Lora"/>
+                  <a:sym typeface="Lora"/>
+                </a:rPr>
+                <a:t>Pourquoi recycler le cuivre en particulier ?</a:t>
+              </a:r>
+              <a:endParaRPr sz="4000" b="1">
+                <a:latin typeface="Lora"/>
+                <a:ea typeface="Lora"/>
+                <a:cs typeface="Lora"/>
+                <a:sym typeface="Lora"/>
+              </a:endParaRPr>
+            </a:p>
+            <a:p>
+              <a:pPr marL="0" lvl="0" indent="0" algn="l" rtl="0">
+                <a:spcBef>
+                  <a:spcPts val="0"/>
+                </a:spcBef>
+                <a:spcAft>
+                  <a:spcPts val="0"/>
+                </a:spcAft>
+                <a:buNone/>
+              </a:pPr>
+              <a:endParaRPr/>
+            </a:p>
+          </p:txBody>
+        </p:sp>
+      </p:grpSp>
     </p:spTree>
     <p:extLst>
       <p:ext uri="{BB962C8B-B14F-4D97-AF65-F5344CB8AC3E}">
@@ -11536,13 +13786,6 @@
   <p:clrMapOvr>
     <a:masterClrMapping/>
   </p:clrMapOvr>
-  <p:timing>
-    <p:tnLst>
-      <p:par>
-        <p:cTn id="1" dur="indefinite" restart="never" nodeType="tmRoot"/>
-      </p:par>
-    </p:tnLst>
-  </p:timing>
 </p:sld>
 </file>
 

</xml_diff>

<commit_message>
Ajusté par E & L
</commit_message>
<xml_diff>
--- a/UE14-poster-sujet14.pptx
+++ b/UE14-poster-sujet14.pptx
@@ -1027,9 +1027,10 @@
         <a:bodyPr/>
         <a:lstStyle/>
         <a:p>
+          <a:pPr algn="just"/>
           <a:r>
             <a:rPr lang="fr-FR" dirty="0">
-              <a:latin typeface="Berlin Sans FB Demi" panose="020E0802020502020306" pitchFamily="34" charset="0"/>
+              <a:latin typeface="+mn-lt"/>
             </a:rPr>
             <a:t>Diminuer le temps de vie d’un objet réintègre son cuivre plus vite dans la production… mais l’expose plus souvent à des pertes (taux de collecte et de recyclage) </a:t>
           </a:r>
@@ -1065,9 +1066,10 @@
         <a:bodyPr/>
         <a:lstStyle/>
         <a:p>
+          <a:pPr algn="just"/>
           <a:r>
             <a:rPr lang="fr-FR" dirty="0">
-              <a:latin typeface="Berlin Sans FB Demi" panose="020E0802020502020306" pitchFamily="34" charset="0"/>
+              <a:latin typeface="+mn-lt"/>
             </a:rPr>
             <a:t>Augmenter le temps de vie d’un objet empêche de le récupérer rapidement… mais diminue les pertes</a:t>
           </a:r>
@@ -1105,13 +1107,6 @@
         </dgm:presLayoutVars>
       </dgm:prSet>
       <dgm:spPr/>
-      <dgm:t>
-        <a:bodyPr/>
-        <a:lstStyle/>
-        <a:p>
-          <a:endParaRPr lang="fr-FR"/>
-        </a:p>
-      </dgm:t>
     </dgm:pt>
     <dgm:pt modelId="{2D99AE35-4FB4-4D7D-98F5-32707679D85C}" type="pres">
       <dgm:prSet presAssocID="{E0C05CFD-A0F4-4469-80A1-D3C82E738803}" presName="upArrow" presStyleLbl="node1" presStyleIdx="0" presStyleCnt="2"/>
@@ -1125,13 +1120,6 @@
         </dgm:presLayoutVars>
       </dgm:prSet>
       <dgm:spPr/>
-      <dgm:t>
-        <a:bodyPr/>
-        <a:lstStyle/>
-        <a:p>
-          <a:endParaRPr lang="fr-FR"/>
-        </a:p>
-      </dgm:t>
     </dgm:pt>
     <dgm:pt modelId="{F19A29E1-E739-4CD4-BCD6-86B4881388E5}" type="pres">
       <dgm:prSet presAssocID="{17BBD623-3721-4BE3-B5FF-A77E851E6C3A}" presName="downArrow" presStyleLbl="node1" presStyleIdx="1" presStyleCnt="2"/>
@@ -1145,21 +1133,14 @@
         </dgm:presLayoutVars>
       </dgm:prSet>
       <dgm:spPr/>
-      <dgm:t>
-        <a:bodyPr/>
-        <a:lstStyle/>
-        <a:p>
-          <a:endParaRPr lang="fr-FR"/>
-        </a:p>
-      </dgm:t>
     </dgm:pt>
   </dgm:ptLst>
   <dgm:cxnLst>
-    <dgm:cxn modelId="{9F93F595-404B-417B-9B5C-8EEC8250C40D}" srcId="{62283C60-3109-4813-B877-13E1614CDC93}" destId="{E0C05CFD-A0F4-4469-80A1-D3C82E738803}" srcOrd="0" destOrd="0" parTransId="{D7FBCCD6-7AB3-4158-89FA-121B2FC05415}" sibTransId="{B627ABA9-4BDA-4297-9FAC-496080351108}"/>
+    <dgm:cxn modelId="{C5489E2D-8BB1-440A-A12A-64B5F996DFA9}" srcId="{62283C60-3109-4813-B877-13E1614CDC93}" destId="{17BBD623-3721-4BE3-B5FF-A77E851E6C3A}" srcOrd="1" destOrd="0" parTransId="{325CCC3D-332C-4DE6-AB10-163FF393F513}" sibTransId="{F5113C04-32F2-4C70-B297-10FE83FD3990}"/>
+    <dgm:cxn modelId="{2D6CA433-2A32-43C9-BD15-14B82591FCDB}" type="presOf" srcId="{E0C05CFD-A0F4-4469-80A1-D3C82E738803}" destId="{B7F1DF16-F3B8-4818-87F6-0E05AF45A2C7}" srcOrd="0" destOrd="0" presId="urn:microsoft.com/office/officeart/2005/8/layout/arrow4"/>
     <dgm:cxn modelId="{8E820344-BBFA-4455-A55B-A2E3B52E6C66}" type="presOf" srcId="{17BBD623-3721-4BE3-B5FF-A77E851E6C3A}" destId="{F3542F7E-34C6-4CCA-B44D-663D3A574EF0}" srcOrd="0" destOrd="0" presId="urn:microsoft.com/office/officeart/2005/8/layout/arrow4"/>
     <dgm:cxn modelId="{19630F6B-1AA5-4421-B2C3-BC00822E03AE}" type="presOf" srcId="{62283C60-3109-4813-B877-13E1614CDC93}" destId="{2F932DFC-8D37-483E-A0D8-A2CDC6234D5A}" srcOrd="0" destOrd="0" presId="urn:microsoft.com/office/officeart/2005/8/layout/arrow4"/>
-    <dgm:cxn modelId="{C5489E2D-8BB1-440A-A12A-64B5F996DFA9}" srcId="{62283C60-3109-4813-B877-13E1614CDC93}" destId="{17BBD623-3721-4BE3-B5FF-A77E851E6C3A}" srcOrd="1" destOrd="0" parTransId="{325CCC3D-332C-4DE6-AB10-163FF393F513}" sibTransId="{F5113C04-32F2-4C70-B297-10FE83FD3990}"/>
-    <dgm:cxn modelId="{2D6CA433-2A32-43C9-BD15-14B82591FCDB}" type="presOf" srcId="{E0C05CFD-A0F4-4469-80A1-D3C82E738803}" destId="{B7F1DF16-F3B8-4818-87F6-0E05AF45A2C7}" srcOrd="0" destOrd="0" presId="urn:microsoft.com/office/officeart/2005/8/layout/arrow4"/>
+    <dgm:cxn modelId="{9F93F595-404B-417B-9B5C-8EEC8250C40D}" srcId="{62283C60-3109-4813-B877-13E1614CDC93}" destId="{E0C05CFD-A0F4-4469-80A1-D3C82E738803}" srcOrd="0" destOrd="0" parTransId="{D7FBCCD6-7AB3-4158-89FA-121B2FC05415}" sibTransId="{B627ABA9-4BDA-4297-9FAC-496080351108}"/>
     <dgm:cxn modelId="{8D6EDFC7-32D9-40DF-BC54-8AD0E201BB9B}" type="presParOf" srcId="{2F932DFC-8D37-483E-A0D8-A2CDC6234D5A}" destId="{2D99AE35-4FB4-4D7D-98F5-32707679D85C}" srcOrd="0" destOrd="0" presId="urn:microsoft.com/office/officeart/2005/8/layout/arrow4"/>
     <dgm:cxn modelId="{06BE6F60-0356-421A-B37B-CF72DFA04755}" type="presParOf" srcId="{2F932DFC-8D37-483E-A0D8-A2CDC6234D5A}" destId="{B7F1DF16-F3B8-4818-87F6-0E05AF45A2C7}" srcOrd="1" destOrd="0" presId="urn:microsoft.com/office/officeart/2005/8/layout/arrow4"/>
     <dgm:cxn modelId="{ECB84A54-727D-4257-BE2E-0734579BDFC8}" type="presParOf" srcId="{2F932DFC-8D37-483E-A0D8-A2CDC6234D5A}" destId="{F19A29E1-E739-4CD4-BCD6-86B4881388E5}" srcOrd="2" destOrd="0" presId="urn:microsoft.com/office/officeart/2005/8/layout/arrow4"/>
@@ -1274,7 +1255,7 @@
         </a:bodyPr>
         <a:lstStyle/>
         <a:p>
-          <a:pPr lvl="0" algn="l" defTabSz="1022350">
+          <a:pPr marL="0" lvl="0" indent="0" algn="just" defTabSz="1022350">
             <a:lnSpc>
               <a:spcPct val="90000"/>
             </a:lnSpc>
@@ -1284,10 +1265,11 @@
             <a:spcAft>
               <a:spcPct val="35000"/>
             </a:spcAft>
+            <a:buNone/>
           </a:pPr>
           <a:r>
             <a:rPr lang="fr-FR" sz="2300" kern="1200" dirty="0">
-              <a:latin typeface="Berlin Sans FB Demi" panose="020E0802020502020306" pitchFamily="34" charset="0"/>
+              <a:latin typeface="+mn-lt"/>
             </a:rPr>
             <a:t>Augmenter le temps de vie d’un objet empêche de le récupérer rapidement… mais diminue les pertes</a:t>
           </a:r>
@@ -1385,7 +1367,7 @@
         </a:bodyPr>
         <a:lstStyle/>
         <a:p>
-          <a:pPr lvl="0" algn="l" defTabSz="1022350">
+          <a:pPr marL="0" lvl="0" indent="0" algn="just" defTabSz="1022350">
             <a:lnSpc>
               <a:spcPct val="90000"/>
             </a:lnSpc>
@@ -1395,10 +1377,11 @@
             <a:spcAft>
               <a:spcPct val="35000"/>
             </a:spcAft>
+            <a:buNone/>
           </a:pPr>
           <a:r>
             <a:rPr lang="fr-FR" sz="2300" kern="1200" dirty="0">
-              <a:latin typeface="Berlin Sans FB Demi" panose="020E0802020502020306" pitchFamily="34" charset="0"/>
+              <a:latin typeface="+mn-lt"/>
             </a:rPr>
             <a:t>Diminuer le temps de vie d’un objet réintègre son cuivre plus vite dans la production… mais l’expose plus souvent à des pertes (taux de collecte et de recyclage) </a:t>
           </a:r>
@@ -2794,7 +2777,7 @@
           <a:p>
             <a:fld id="{A401968E-8C69-45DB-A237-BCB9D76C0F09}" type="datetimeFigureOut">
               <a:rPr lang="fr-FR" smtClean="0"/>
-              <a:t>12/12/2020</a:t>
+              <a:t>13/12/2020</a:t>
             </a:fld>
             <a:endParaRPr lang="fr-FR"/>
           </a:p>
@@ -7884,7 +7867,7 @@
         </p:nvSpPr>
         <p:spPr>
           <a:xfrm>
-            <a:off x="0" y="21958235"/>
+            <a:off x="0" y="22262063"/>
             <a:ext cx="15139987" cy="1754326"/>
           </a:xfrm>
           <a:prstGeom prst="rect">
@@ -7898,7 +7881,7 @@
           </a:bodyPr>
           <a:lstStyle/>
           <a:p>
-            <a:pPr algn="just"/>
+            <a:pPr algn="ctr"/>
             <a:r>
               <a:rPr lang="fr-FR" sz="3600" b="1" dirty="0">
                 <a:solidFill>
@@ -7928,7 +7911,7 @@
             </a:r>
           </a:p>
           <a:p>
-            <a:pPr algn="r"/>
+            <a:pPr algn="ctr"/>
             <a:r>
               <a:rPr lang="fr-FR" sz="3600" b="1" dirty="0">
                 <a:solidFill>
@@ -8046,16 +8029,7 @@
                 </a:solidFill>
                 <a:latin typeface="Berlin Sans FB Demi" panose="020E0802020502020306" pitchFamily="34" charset="0"/>
               </a:rPr>
-              <a:t>Pour chacun de ces secteurs, quels facteurs prendre en compte </a:t>
-            </a:r>
-            <a:r>
-              <a:rPr lang="fr-FR" sz="3200" i="1" dirty="0" smtClean="0">
-                <a:solidFill>
-                  <a:srgbClr val="C85C97"/>
-                </a:solidFill>
-                <a:latin typeface="Berlin Sans FB Demi" panose="020E0802020502020306" pitchFamily="34" charset="0"/>
-              </a:rPr>
-              <a:t>?</a:t>
+              <a:t>Pour chacun de ces secteurs, quels facteurs prendre en compte ?</a:t>
             </a:r>
             <a:endParaRPr lang="fr-FR" sz="2800" i="1" dirty="0">
               <a:solidFill>
@@ -8073,7 +8047,7 @@
           <p:nvPr>
             <p:extLst>
               <p:ext uri="{D42A27DB-BD31-4B8C-83A1-F6EECF244321}">
-                <p14:modId xmlns:p14="http://schemas.microsoft.com/office/powerpoint/2010/main" val="1469852293"/>
+                <p14:modId xmlns:p14="http://schemas.microsoft.com/office/powerpoint/2010/main" val="1985887076"/>
               </p:ext>
             </p:extLst>
           </p:nvPr>
@@ -8110,8 +8084,8 @@
         </p:blipFill>
         <p:spPr>
           <a:xfrm>
-            <a:off x="17450773" y="32732161"/>
-            <a:ext cx="9153274" cy="6871905"/>
+            <a:off x="18637940" y="22503226"/>
+            <a:ext cx="8524651" cy="6389868"/>
           </a:xfrm>
           <a:prstGeom prst="rect">
             <a:avLst/>
@@ -8136,8 +8110,8 @@
         </p:nvGrpSpPr>
         <p:grpSpPr>
           <a:xfrm>
-            <a:off x="267800" y="6138566"/>
-            <a:ext cx="9876600" cy="4197600"/>
+            <a:off x="267800" y="6138565"/>
+            <a:ext cx="9876600" cy="3429147"/>
             <a:chOff x="267800" y="7023250"/>
             <a:chExt cx="9876600" cy="4197600"/>
           </a:xfrm>
@@ -8217,13 +8191,21 @@
                 <a:spcAft>
                   <a:spcPts val="0"/>
                 </a:spcAft>
+                <a:buClr>
+                  <a:schemeClr val="dk1"/>
+                </a:buClr>
+                <a:buSzPts val="1100"/>
+                <a:buFont typeface="Arial"/>
                 <a:buNone/>
               </a:pPr>
-              <a:endParaRPr sz="2400" dirty="0">
-                <a:solidFill>
-                  <a:schemeClr val="dk1"/>
-                </a:solidFill>
-              </a:endParaRPr>
+              <a:r>
+                <a:rPr lang="fr-FR" sz="2400" dirty="0">
+                  <a:solidFill>
+                    <a:schemeClr val="dk1"/>
+                  </a:solidFill>
+                </a:rPr>
+                <a:t>Le recyclage est un procédé de traitement des déchets et de réintroduction des matériaux dans le cycle de production d'autres produits. </a:t>
+              </a:r>
             </a:p>
             <a:p>
               <a:pPr marL="0" lvl="0" indent="0" algn="just" rtl="0">
@@ -8246,38 +8228,9 @@
                     <a:schemeClr val="dk1"/>
                   </a:solidFill>
                 </a:rPr>
-                <a:t>Le recyclage est un procédé de traitement des déchets et de réintroduction des matériaux qui en sont issus dans le cycle de production d'autres produits équivalents ou différents. Le recyclage permet de réduire les volumes de déchets, et donc leur pollution, et de préserver les ressources naturelles en réutilisant des matières premières déjà extraites.</a:t>
+                <a:t>Trois problèmes principaux apparaissent: l’usage dispersif, l’accessibilité aux déchets et le rendement lors du processus de recyclage.</a:t>
               </a:r>
-              <a:endParaRPr sz="2400" dirty="0">
-                <a:solidFill>
-                  <a:schemeClr val="dk1"/>
-                </a:solidFill>
-              </a:endParaRPr>
-            </a:p>
-            <a:p>
-              <a:pPr marL="0" lvl="0" indent="0" algn="just" rtl="0">
-                <a:spcBef>
-                  <a:spcPts val="0"/>
-                </a:spcBef>
-                <a:spcAft>
-                  <a:spcPts val="0"/>
-                </a:spcAft>
-                <a:buClr>
-                  <a:schemeClr val="dk1"/>
-                </a:buClr>
-                <a:buSzPts val="1100"/>
-                <a:buFont typeface="Arial"/>
-                <a:buNone/>
-              </a:pPr>
-              <a:r>
-                <a:rPr lang="fr-FR" sz="2400" dirty="0">
-                  <a:solidFill>
-                    <a:schemeClr val="dk1"/>
-                  </a:solidFill>
-                </a:rPr>
-                <a:t>Deux problèmes principaux apparaissent: la dispersion et le rendement.</a:t>
-              </a:r>
-              <a:endParaRPr dirty="0"/>
+              <a:endParaRPr lang="fr-FR" dirty="0"/>
             </a:p>
           </p:txBody>
         </p:sp>
@@ -8322,7 +8275,7 @@
                 <a:buNone/>
               </a:pPr>
               <a:r>
-                <a:rPr lang="fr-FR" sz="4100" b="1">
+                <a:rPr lang="fr-FR" sz="4000" b="1" dirty="0">
                   <a:latin typeface="Lora"/>
                   <a:ea typeface="Lora"/>
                   <a:cs typeface="Lora"/>
@@ -8330,7 +8283,7 @@
                 </a:rPr>
                 <a:t>Parlons recyclage !</a:t>
               </a:r>
-              <a:endParaRPr sz="4100" b="1">
+              <a:endParaRPr sz="4000" b="1" dirty="0">
                 <a:latin typeface="Lora"/>
                 <a:ea typeface="Lora"/>
                 <a:cs typeface="Lora"/>
@@ -8355,9 +8308,9 @@
         <p:grpSpPr>
           <a:xfrm>
             <a:off x="10432595" y="6164105"/>
-            <a:ext cx="8248197" cy="3856742"/>
+            <a:ext cx="8236145" cy="3856742"/>
             <a:chOff x="21480553" y="6973132"/>
-            <a:chExt cx="8248197" cy="3856742"/>
+            <a:chExt cx="8236145" cy="3856742"/>
           </a:xfrm>
         </p:grpSpPr>
         <p:sp>
@@ -8440,82 +8393,6 @@
                 </a:spcAft>
                 <a:buNone/>
               </a:pPr>
-              <a:endParaRPr sz="2800" u="sng" dirty="0">
-                <a:solidFill>
-                  <a:schemeClr val="dk1"/>
-                </a:solidFill>
-              </a:endParaRPr>
-            </a:p>
-            <a:p>
-              <a:pPr marL="0" lvl="0" indent="0" algn="just" rtl="0">
-                <a:lnSpc>
-                  <a:spcPct val="115000"/>
-                </a:lnSpc>
-                <a:spcBef>
-                  <a:spcPts val="0"/>
-                </a:spcBef>
-                <a:spcAft>
-                  <a:spcPts val="0"/>
-                </a:spcAft>
-                <a:buNone/>
-              </a:pPr>
-              <a:endParaRPr sz="2800" u="sng" dirty="0">
-                <a:solidFill>
-                  <a:schemeClr val="dk1"/>
-                </a:solidFill>
-              </a:endParaRPr>
-            </a:p>
-            <a:p>
-              <a:pPr marL="0" lvl="0" indent="0" algn="just" rtl="0">
-                <a:lnSpc>
-                  <a:spcPct val="115000"/>
-                </a:lnSpc>
-                <a:spcBef>
-                  <a:spcPts val="0"/>
-                </a:spcBef>
-                <a:spcAft>
-                  <a:spcPts val="0"/>
-                </a:spcAft>
-                <a:buNone/>
-              </a:pPr>
-              <a:endParaRPr lang="fr-FR" sz="2800" u="sng" dirty="0">
-                <a:solidFill>
-                  <a:schemeClr val="dk1"/>
-                </a:solidFill>
-              </a:endParaRPr>
-            </a:p>
-            <a:p>
-              <a:pPr marL="0" lvl="0" indent="0" algn="just" rtl="0">
-                <a:lnSpc>
-                  <a:spcPct val="115000"/>
-                </a:lnSpc>
-                <a:spcBef>
-                  <a:spcPts val="0"/>
-                </a:spcBef>
-                <a:spcAft>
-                  <a:spcPts val="0"/>
-                </a:spcAft>
-                <a:buNone/>
-              </a:pPr>
-              <a:endParaRPr lang="fr-FR" sz="2800" u="sng" dirty="0">
-                <a:solidFill>
-                  <a:schemeClr val="dk1"/>
-                </a:solidFill>
-              </a:endParaRPr>
-            </a:p>
-            <a:p>
-              <a:pPr marL="0" lvl="0" indent="0" algn="just" rtl="0">
-                <a:lnSpc>
-                  <a:spcPct val="115000"/>
-                </a:lnSpc>
-                <a:spcBef>
-                  <a:spcPts val="0"/>
-                </a:spcBef>
-                <a:spcAft>
-                  <a:spcPts val="0"/>
-                </a:spcAft>
-                <a:buNone/>
-              </a:pPr>
               <a:r>
                 <a:rPr lang="fr-FR" sz="2800" u="sng" dirty="0">
                   <a:solidFill>
@@ -8524,7 +8401,7 @@
                 </a:rPr>
                 <a:t>Avantages du recyclage du cuivre:</a:t>
               </a:r>
-              <a:endParaRPr sz="2800" u="sng" dirty="0">
+              <a:endParaRPr lang="fr-FR" sz="2800" u="sng" dirty="0">
                 <a:solidFill>
                   <a:srgbClr val="222222"/>
                 </a:solidFill>
@@ -8546,7 +8423,7 @@
                 </a:spcAft>
                 <a:buNone/>
               </a:pPr>
-              <a:endParaRPr sz="2400" dirty="0">
+              <a:endParaRPr sz="800" dirty="0">
                 <a:solidFill>
                   <a:srgbClr val="222222"/>
                 </a:solidFill>
@@ -8554,6 +8431,32 @@
                   <a:schemeClr val="lt1"/>
                 </a:highlight>
               </a:endParaRPr>
+            </a:p>
+            <a:p>
+              <a:pPr marL="457200" lvl="0" indent="-381000" algn="just" rtl="0">
+                <a:lnSpc>
+                  <a:spcPct val="150000"/>
+                </a:lnSpc>
+                <a:spcBef>
+                  <a:spcPts val="0"/>
+                </a:spcBef>
+                <a:spcAft>
+                  <a:spcPts val="0"/>
+                </a:spcAft>
+                <a:buClr>
+                  <a:schemeClr val="dk1"/>
+                </a:buClr>
+                <a:buSzPts val="2400"/>
+                <a:buChar char="➔"/>
+              </a:pPr>
+              <a:r>
+                <a:rPr lang="fr-FR" sz="2400" dirty="0">
+                  <a:solidFill>
+                    <a:schemeClr val="dk1"/>
+                  </a:solidFill>
+                </a:rPr>
+                <a:t>Réduire l’impact environnemental de l’extraction </a:t>
+              </a:r>
             </a:p>
             <a:p>
               <a:pPr marL="457200" lvl="0" indent="-381000" algn="just" rtl="0">
@@ -8611,11 +8514,6 @@
                 </a:rPr>
                 <a:t>Créer des emplois localement</a:t>
               </a:r>
-              <a:endParaRPr sz="2400" dirty="0">
-                <a:solidFill>
-                  <a:schemeClr val="dk1"/>
-                </a:solidFill>
-              </a:endParaRPr>
             </a:p>
             <a:p>
               <a:pPr marL="457200" lvl="0" indent="-381000" algn="just" rtl="0">
@@ -8640,28 +8538,13 @@
                     <a:schemeClr val="dk1"/>
                   </a:solidFill>
                 </a:rPr>
-                <a:t>Eviter la mise en décharge</a:t>
+                <a:t>Réduire le volume des déchets et leur pollution</a:t>
               </a:r>
               <a:endParaRPr sz="2400" dirty="0">
                 <a:solidFill>
                   <a:schemeClr val="dk1"/>
                 </a:solidFill>
               </a:endParaRPr>
-            </a:p>
-            <a:p>
-              <a:pPr marL="914400" lvl="0" indent="0" algn="just" rtl="0">
-                <a:lnSpc>
-                  <a:spcPct val="115000"/>
-                </a:lnSpc>
-                <a:spcBef>
-                  <a:spcPts val="1200"/>
-                </a:spcBef>
-                <a:spcAft>
-                  <a:spcPts val="1200"/>
-                </a:spcAft>
-                <a:buNone/>
-              </a:pPr>
-              <a:endParaRPr dirty="0"/>
             </a:p>
           </p:txBody>
         </p:sp>
@@ -8679,8 +8562,8 @@
           </p:nvSpPr>
           <p:spPr>
             <a:xfrm>
-              <a:off x="21953590" y="7154735"/>
-              <a:ext cx="7775160" cy="1446300"/>
+              <a:off x="21941538" y="7008245"/>
+              <a:ext cx="7775160" cy="866919"/>
             </a:xfrm>
             <a:prstGeom prst="rect">
               <a:avLst/>
@@ -8738,10 +8621,10 @@
         </p:nvGrpSpPr>
         <p:grpSpPr>
           <a:xfrm>
-            <a:off x="18680792" y="6140405"/>
-            <a:ext cx="11274900" cy="5132573"/>
-            <a:chOff x="10232128" y="6871304"/>
-            <a:chExt cx="11274900" cy="5132573"/>
+            <a:off x="18680792" y="6129291"/>
+            <a:ext cx="11274900" cy="5373275"/>
+            <a:chOff x="10232128" y="6860190"/>
+            <a:chExt cx="11274900" cy="5143687"/>
           </a:xfrm>
         </p:grpSpPr>
         <p:sp>
@@ -8766,16 +8649,29 @@
                 <a:gd name="adj" fmla="val 16667"/>
               </a:avLst>
             </a:prstGeom>
-            <a:gradFill>
+            <a:gradFill flip="none" rotWithShape="1">
               <a:gsLst>
                 <a:gs pos="0">
-                  <a:srgbClr val="DCECD5"/>
+                  <a:srgbClr val="9F9F1D">
+                    <a:tint val="66000"/>
+                    <a:satMod val="160000"/>
+                  </a:srgbClr>
+                </a:gs>
+                <a:gs pos="50000">
+                  <a:srgbClr val="9F9F1D">
+                    <a:tint val="44500"/>
+                    <a:satMod val="160000"/>
+                  </a:srgbClr>
                 </a:gs>
                 <a:gs pos="100000">
-                  <a:srgbClr val="93BC81"/>
+                  <a:srgbClr val="9F9F1D">
+                    <a:tint val="23500"/>
+                    <a:satMod val="160000"/>
+                  </a:srgbClr>
                 </a:gs>
               </a:gsLst>
-              <a:lin ang="5400012" scaled="0"/>
+              <a:lin ang="2700000" scaled="1"/>
+              <a:tileRect/>
             </a:gradFill>
             <a:ln w="9525" cap="flat" cmpd="sng">
               <a:solidFill>
@@ -8824,7 +8720,7 @@
                     <a:schemeClr val="dk1"/>
                   </a:solidFill>
                 </a:rPr>
-                <a:t>Il existe 2 procédés … les métaux comme le cuivre : </a:t>
+                <a:t>Il existe 2 procédés de transformation des métaux comme le cuivre : </a:t>
               </a:r>
               <a:endParaRPr sz="2400" dirty="0">
                 <a:solidFill>
@@ -8974,7 +8870,7 @@
               </a:endParaRPr>
             </a:p>
             <a:p>
-              <a:pPr marL="0" lvl="0" indent="0" algn="l" rtl="0">
+              <a:pPr marL="0" lvl="0" indent="0" algn="just" rtl="0">
                 <a:spcBef>
                   <a:spcPts val="0"/>
                 </a:spcBef>
@@ -8995,7 +8891,7 @@
               </a:endParaRPr>
             </a:p>
             <a:p>
-              <a:pPr marL="0" lvl="0" indent="0" algn="l" rtl="0">
+              <a:pPr marL="0" lvl="0" indent="0" algn="just" rtl="0">
                 <a:spcBef>
                   <a:spcPts val="0"/>
                 </a:spcBef>
@@ -9015,7 +8911,7 @@
                     <a:schemeClr val="dk1"/>
                   </a:solidFill>
                 </a:rPr>
-                <a:t>⇒ les exportations de déchets métalliques sont plus importantes que les importations correspondantes :179 kt versus 55 kt pour le cuivre en 2019 </a:t>
+                <a:t>L’utilisation de ces procédés pour le recyclage n’a pas toujours une valeur ajoutée intéressante en France ⇒ les exportations de déchets métalliques sont plus importantes que les importations correspondantes :179 kt versus 55 kt pour le cuivre en 2019 </a:t>
               </a:r>
               <a:endParaRPr dirty="0"/>
             </a:p>
@@ -9035,8 +8931,8 @@
           </p:nvSpPr>
           <p:spPr>
             <a:xfrm>
-              <a:off x="11355338" y="7023250"/>
-              <a:ext cx="7569300" cy="1093200"/>
+              <a:off x="11341118" y="6860190"/>
+              <a:ext cx="8737804" cy="773786"/>
             </a:xfrm>
             <a:prstGeom prst="rect">
               <a:avLst/>
@@ -9062,15 +8958,33 @@
                 <a:buNone/>
               </a:pPr>
               <a:r>
-                <a:rPr lang="fr-FR" sz="4100" b="1" dirty="0">
+                <a:rPr lang="fr-FR" sz="4000" b="1" dirty="0">
                   <a:latin typeface="Lora"/>
                   <a:ea typeface="Lora"/>
                   <a:cs typeface="Lora"/>
                   <a:sym typeface="Lora"/>
                 </a:rPr>
-                <a:t>Comment</a:t>
+                <a:t>Comment </a:t>
               </a:r>
-              <a:endParaRPr sz="4100" b="1" dirty="0">
+              <a:r>
+                <a:rPr lang="fr-FR" sz="4000" b="1" dirty="0" err="1">
+                  <a:latin typeface="Lora"/>
+                  <a:ea typeface="Lora"/>
+                  <a:cs typeface="Lora"/>
+                  <a:sym typeface="Lora"/>
+                </a:rPr>
+                <a:t>rend-on</a:t>
+              </a:r>
+              <a:r>
+                <a:rPr lang="fr-FR" sz="4000" b="1" dirty="0">
+                  <a:latin typeface="Lora"/>
+                  <a:ea typeface="Lora"/>
+                  <a:cs typeface="Lora"/>
+                  <a:sym typeface="Lora"/>
+                </a:rPr>
+                <a:t> le cuivre utilisable ? </a:t>
+              </a:r>
+              <a:endParaRPr sz="4000" b="1" dirty="0">
                 <a:latin typeface="Lora"/>
                 <a:ea typeface="Lora"/>
                 <a:cs typeface="Lora"/>
@@ -9094,10 +9008,10 @@
         </p:nvGrpSpPr>
         <p:grpSpPr>
           <a:xfrm>
-            <a:off x="355528" y="12014975"/>
-            <a:ext cx="10366875" cy="9030300"/>
+            <a:off x="251294" y="11633873"/>
+            <a:ext cx="10326504" cy="8466012"/>
             <a:chOff x="8010000" y="17212713"/>
-            <a:chExt cx="10366875" cy="9030300"/>
+            <a:chExt cx="10955919" cy="8707490"/>
           </a:xfrm>
         </p:grpSpPr>
         <p:sp>
@@ -9115,7 +9029,7 @@
           <p:spPr>
             <a:xfrm>
               <a:off x="8010000" y="17212713"/>
-              <a:ext cx="8909400" cy="9030300"/>
+              <a:ext cx="8909400" cy="8707490"/>
             </a:xfrm>
             <a:prstGeom prst="roundRect">
               <a:avLst>
@@ -9175,13 +9089,33 @@
                 <a:buSzPts val="2400"/>
                 <a:buChar char="●"/>
               </a:pPr>
+              <a:endParaRPr lang="fr-FR" sz="2400" dirty="0">
+                <a:solidFill>
+                  <a:schemeClr val="dk1"/>
+                </a:solidFill>
+              </a:endParaRPr>
+            </a:p>
+            <a:p>
+              <a:pPr marL="457200" lvl="0" indent="-381000" algn="just" rtl="0">
+                <a:spcBef>
+                  <a:spcPts val="0"/>
+                </a:spcBef>
+                <a:spcAft>
+                  <a:spcPts val="0"/>
+                </a:spcAft>
+                <a:buClr>
+                  <a:schemeClr val="dk1"/>
+                </a:buClr>
+                <a:buSzPts val="2400"/>
+                <a:buChar char="●"/>
+              </a:pPr>
               <a:r>
                 <a:rPr lang="fr-FR" sz="2400" dirty="0">
                   <a:solidFill>
                     <a:schemeClr val="dk1"/>
                   </a:solidFill>
                 </a:rPr>
-                <a:t>Production minière de cuivre dans le monde en 2019 : 20 Mt</a:t>
+                <a:t>Production minière de cuivre dans le monde en 2019 : 20,5 Mt</a:t>
               </a:r>
               <a:endParaRPr sz="2400" dirty="0">
                 <a:solidFill>
@@ -9230,7 +9164,7 @@
                     <a:schemeClr val="dk1"/>
                   </a:solidFill>
                 </a:rPr>
-                <a:t>Réserves actuelles (gisements découverts et jugés rentables en 2017) : environ 720 millions de tonnes</a:t>
+                <a:t>Réserves actuelles (gisements découverts et jugés rentables en 2019) : environ 830 Mt</a:t>
               </a:r>
               <a:endParaRPr sz="2400" dirty="0">
                 <a:solidFill>
@@ -9269,21 +9203,12 @@
                 <a:buChar char="●"/>
               </a:pPr>
               <a:r>
-                <a:rPr lang="fr-FR" sz="2400" dirty="0">
-                  <a:solidFill>
-                    <a:schemeClr val="dk1"/>
-                  </a:solidFill>
-                </a:rPr>
-                <a:t>Ressources globales (réserves + gisements potentiels pas encore exploités) : plus de 5 milliards de tonnes </a:t>
+                <a:rPr lang="fr-FR" sz="2400" dirty="0"/>
+                <a:t>Ressources mondiales (réserves + gisements potentiels pas encore exploités en 2019) : 2 000 Mt </a:t>
               </a:r>
-              <a:endParaRPr sz="2400" i="1" dirty="0">
-                <a:solidFill>
-                  <a:srgbClr val="0000FF"/>
-                </a:solidFill>
-              </a:endParaRPr>
             </a:p>
             <a:p>
-              <a:pPr marL="457200" lvl="0" indent="0" algn="just" rtl="0">
+              <a:pPr marL="457200" lvl="0" indent="-381000" algn="just" rtl="0">
                 <a:spcBef>
                   <a:spcPts val="0"/>
                 </a:spcBef>
@@ -9293,29 +9218,12 @@
                 <a:buClr>
                   <a:schemeClr val="dk1"/>
                 </a:buClr>
-                <a:buSzPts val="1100"/>
-                <a:buFont typeface="Arial"/>
-                <a:buNone/>
+                <a:buSzPts val="2400"/>
+                <a:buChar char="●"/>
               </a:pPr>
-              <a:r>
-                <a:rPr lang="fr-FR" sz="2400" i="1" dirty="0">
-                  <a:solidFill>
-                    <a:schemeClr val="dk1"/>
-                  </a:solidFill>
-                </a:rPr>
-                <a:t>2 milliards </a:t>
-              </a:r>
-              <a:r>
-                <a:rPr lang="fr-FR" sz="2400" i="1" dirty="0" err="1">
-                  <a:solidFill>
-                    <a:schemeClr val="dk1"/>
-                  </a:solidFill>
-                </a:rPr>
-                <a:t>usgs</a:t>
-              </a:r>
-              <a:endParaRPr sz="2400" i="1" dirty="0">
+              <a:endParaRPr lang="fr-FR" sz="2400" dirty="0">
                 <a:solidFill>
-                  <a:schemeClr val="dk1"/>
+                  <a:srgbClr val="FF0000"/>
                 </a:solidFill>
               </a:endParaRPr>
             </a:p>
@@ -9341,11 +9249,6 @@
                 </a:rPr>
                 <a:t>⅔  des 550 millions de tonnes de cuivre produites depuis 1900 sont encore utilisées</a:t>
               </a:r>
-              <a:endParaRPr sz="2400" dirty="0">
-                <a:solidFill>
-                  <a:schemeClr val="dk1"/>
-                </a:solidFill>
-              </a:endParaRPr>
             </a:p>
             <a:p>
               <a:pPr marL="457200" lvl="0" indent="0" algn="just" rtl="0">
@@ -9457,7 +9360,7 @@
           </p:nvSpPr>
           <p:spPr>
             <a:xfrm>
-              <a:off x="8321775" y="17515900"/>
+              <a:off x="8910819" y="17383075"/>
               <a:ext cx="10055100" cy="1093200"/>
             </a:xfrm>
             <a:prstGeom prst="rect">
@@ -9484,7 +9387,7 @@
                 <a:buNone/>
               </a:pPr>
               <a:r>
-                <a:rPr lang="fr-FR" sz="4500" b="1" dirty="0">
+                <a:rPr lang="fr-FR" sz="4000" b="1" dirty="0">
                   <a:latin typeface="Lora"/>
                   <a:ea typeface="Lora"/>
                   <a:cs typeface="Lora"/>
@@ -9492,7 +9395,7 @@
                 </a:rPr>
                 <a:t>Le cuivre en quelques chiffres</a:t>
               </a:r>
-              <a:endParaRPr sz="4500" b="1" dirty="0">
+              <a:endParaRPr sz="4000" b="1" dirty="0">
                 <a:latin typeface="Lora"/>
                 <a:ea typeface="Lora"/>
                 <a:cs typeface="Lora"/>
@@ -9523,7 +9426,7 @@
         </p:blipFill>
         <p:spPr>
           <a:xfrm>
-            <a:off x="11522100" y="17385490"/>
+            <a:off x="10412896" y="17634283"/>
             <a:ext cx="6307489" cy="4114399"/>
           </a:xfrm>
           <a:prstGeom prst="rect">
@@ -9549,9 +9452,9 @@
         </p:nvGrpSpPr>
         <p:grpSpPr>
           <a:xfrm>
-            <a:off x="18757875" y="11685108"/>
+            <a:off x="18637940" y="11746752"/>
             <a:ext cx="11522100" cy="10405500"/>
-            <a:chOff x="17693480" y="14778636"/>
+            <a:chOff x="17573545" y="14840280"/>
             <a:chExt cx="11522100" cy="10405500"/>
           </a:xfrm>
         </p:grpSpPr>
@@ -9569,9 +9472,9 @@
           </p:nvGrpSpPr>
           <p:grpSpPr>
             <a:xfrm>
-              <a:off x="17693480" y="14778636"/>
+              <a:off x="17573545" y="14840280"/>
               <a:ext cx="11522100" cy="10405500"/>
-              <a:chOff x="17693480" y="14778636"/>
+              <a:chOff x="17573545" y="14840280"/>
               <a:chExt cx="11522100" cy="10405500"/>
             </a:xfrm>
           </p:grpSpPr>
@@ -9589,7 +9492,7 @@
             </p:nvSpPr>
             <p:spPr>
               <a:xfrm>
-                <a:off x="17693480" y="14778636"/>
+                <a:off x="17573545" y="14840280"/>
                 <a:ext cx="11522100" cy="10405500"/>
               </a:xfrm>
               <a:prstGeom prst="roundRect">
@@ -9814,14 +9717,9 @@
                   </a:rPr>
                   <a:t> </a:t>
                 </a:r>
-                <a:endParaRPr sz="2400" dirty="0">
-                  <a:solidFill>
-                    <a:schemeClr val="dk1"/>
-                  </a:solidFill>
-                </a:endParaRPr>
               </a:p>
               <a:p>
-                <a:pPr marL="3240000" lvl="0" indent="-228600" algn="just" rtl="0">
+                <a:pPr marL="2859000" lvl="0" algn="just" rtl="0">
                   <a:spcBef>
                     <a:spcPts val="0"/>
                   </a:spcBef>
@@ -9831,12 +9729,10 @@
                   <a:buClr>
                     <a:schemeClr val="dk1"/>
                   </a:buClr>
-                  <a:buSzPts val="1100"/>
-                  <a:buFont typeface="Arial"/>
-                  <a:buNone/>
+                  <a:buSzPts val="2400"/>
                 </a:pPr>
                 <a:r>
-                  <a:rPr lang="fr-FR" sz="2400" dirty="0" err="1">
+                  <a:rPr lang="fr-FR" sz="2400" i="1" dirty="0" err="1">
                     <a:solidFill>
                       <a:schemeClr val="dk1"/>
                     </a:solidFill>
@@ -9851,14 +9747,9 @@
                   </a:rPr>
                   <a:t> : broyage et pyrolyse⇒ très consommatrice en énergie (fours chauffés à 500 degrés)</a:t>
                 </a:r>
-                <a:endParaRPr sz="2400" dirty="0">
-                  <a:solidFill>
-                    <a:schemeClr val="dk1"/>
-                  </a:solidFill>
-                </a:endParaRPr>
               </a:p>
               <a:p>
-                <a:pPr marL="3240000" lvl="0" indent="-228600" algn="just" rtl="0">
+                <a:pPr marL="2859000" lvl="0" algn="just" rtl="0">
                   <a:spcBef>
                     <a:spcPts val="0"/>
                   </a:spcBef>
@@ -9868,17 +9759,23 @@
                   <a:buClr>
                     <a:schemeClr val="dk1"/>
                   </a:buClr>
-                  <a:buSzPts val="1100"/>
-                  <a:buFont typeface="Arial"/>
-                  <a:buNone/>
+                  <a:buSzPts val="2400"/>
                 </a:pPr>
+                <a:r>
+                  <a:rPr lang="fr-FR" sz="2400" i="1" dirty="0">
+                    <a:solidFill>
+                      <a:schemeClr val="dk1"/>
+                    </a:solidFill>
+                  </a:rPr>
+                  <a:t>Hydrométallurgie</a:t>
+                </a:r>
                 <a:r>
                   <a:rPr lang="fr-FR" sz="2400" dirty="0">
                     <a:solidFill>
                       <a:schemeClr val="dk1"/>
                     </a:solidFill>
                   </a:rPr>
-                  <a:t>Hydrométallurgie : dissolution avec acides ⇒ dégage dioxines et furanes, des </a:t>
+                  <a:t> : dissolution avec acides ⇒ dégage dioxines et furanes, des </a:t>
                 </a:r>
                 <a:r>
                   <a:rPr lang="fr-FR" sz="2400" dirty="0" err="1">
@@ -9896,29 +9793,35 @@
                   </a:rPr>
                   <a:t> nocifs pour l'environnement</a:t>
                 </a:r>
-                <a:endParaRPr sz="2400" dirty="0">
-                  <a:solidFill>
-                    <a:schemeClr val="dk1"/>
-                  </a:solidFill>
-                </a:endParaRPr>
               </a:p>
               <a:p>
-                <a:pPr marL="3011400" lvl="0" indent="0" algn="just" rtl="0">
+                <a:pPr marL="2859000" lvl="0" algn="just" rtl="0">
                   <a:spcBef>
                     <a:spcPts val="0"/>
                   </a:spcBef>
                   <a:spcAft>
                     <a:spcPts val="0"/>
                   </a:spcAft>
-                  <a:buNone/>
+                  <a:buClr>
+                    <a:schemeClr val="dk1"/>
+                  </a:buClr>
+                  <a:buSzPts val="2400"/>
                 </a:pPr>
+                <a:r>
+                  <a:rPr lang="fr-FR" sz="2400" i="1" dirty="0">
+                    <a:solidFill>
+                      <a:schemeClr val="dk1"/>
+                    </a:solidFill>
+                  </a:rPr>
+                  <a:t>Micronisation</a:t>
+                </a:r>
                 <a:r>
                   <a:rPr lang="fr-FR" sz="2400" dirty="0">
                     <a:solidFill>
                       <a:schemeClr val="dk1"/>
                     </a:solidFill>
                   </a:rPr>
-                  <a:t>Micronisation : broyage puis séparation par granulométrie ⇒ ne récupère que 90% des métaux contre 98% avec les 2 autres méthodes </a:t>
+                  <a:t> : broyage puis séparation par granulométrie ⇒ ne récupère que 90% des métaux contre 98% avec les 2 autres méthodes </a:t>
                 </a:r>
                 <a:endParaRPr sz="2400" dirty="0">
                   <a:solidFill>
@@ -10099,7 +10002,7 @@
                   <a:buNone/>
                 </a:pPr>
                 <a:r>
-                  <a:rPr lang="fr-FR" sz="4100" b="1" dirty="0">
+                  <a:rPr lang="fr-FR" sz="4000" b="1" dirty="0">
                     <a:latin typeface="Lora"/>
                     <a:ea typeface="Lora"/>
                     <a:cs typeface="Lora"/>
@@ -10107,7 +10010,7 @@
                   </a:rPr>
                   <a:t>C’est pas si simple ...</a:t>
                 </a:r>
-                <a:endParaRPr sz="4100" b="1" dirty="0">
+                <a:endParaRPr sz="4000" b="1" dirty="0">
                   <a:latin typeface="Lora"/>
                   <a:ea typeface="Lora"/>
                   <a:cs typeface="Lora"/>
@@ -10236,9 +10139,9 @@
         </p:nvGrpSpPr>
         <p:grpSpPr>
           <a:xfrm>
-            <a:off x="9545393" y="10366053"/>
-            <a:ext cx="9058989" cy="6871059"/>
-            <a:chOff x="1527850" y="27798988"/>
+            <a:off x="8832476" y="10322380"/>
+            <a:ext cx="9690655" cy="7421781"/>
+            <a:chOff x="1353961" y="27384247"/>
             <a:chExt cx="8616300" cy="7783371"/>
           </a:xfrm>
         </p:grpSpPr>
@@ -10256,7 +10159,7 @@
           </p:nvSpPr>
           <p:spPr>
             <a:xfrm>
-              <a:off x="1527850" y="27798988"/>
+              <a:off x="1353961" y="27384247"/>
               <a:ext cx="8616300" cy="7783371"/>
             </a:xfrm>
             <a:prstGeom prst="roundRect">
@@ -10303,18 +10206,6 @@
               <a:noAutofit/>
             </a:bodyPr>
             <a:lstStyle/>
-            <a:p>
-              <a:pPr marL="0" lvl="0" indent="0" algn="l" rtl="0">
-                <a:spcBef>
-                  <a:spcPts val="0"/>
-                </a:spcBef>
-                <a:spcAft>
-                  <a:spcPts val="0"/>
-                </a:spcAft>
-                <a:buNone/>
-              </a:pPr>
-              <a:endParaRPr sz="2400" dirty="0"/>
-            </a:p>
             <a:p>
               <a:pPr marL="0" lvl="0" indent="0" algn="just" rtl="0">
                 <a:lnSpc>
@@ -10506,7 +10397,7 @@
                     <a:srgbClr val="222222"/>
                   </a:solidFill>
                 </a:rPr>
-                <a:t>Il existe une relation d’exponentielle inverse entre la concentration de cuivre et l’impact environnemental lié à son extraction: </a:t>
+                <a:t>Relation d’exponentielle inverse entre la concentration de cuivre et l’impact environnemental lié à son extraction: </a:t>
               </a:r>
               <a:r>
                 <a:rPr lang="fr-FR" sz="2400" b="1" dirty="0">
@@ -10519,6 +10410,32 @@
               <a:r>
                 <a:rPr lang="fr-FR" sz="2400" b="1" dirty="0"/>
                 <a:t>.</a:t>
+              </a:r>
+            </a:p>
+            <a:p>
+              <a:pPr marL="457200" lvl="0" indent="-381000" algn="just" rtl="0">
+                <a:lnSpc>
+                  <a:spcPct val="115000"/>
+                </a:lnSpc>
+                <a:spcBef>
+                  <a:spcPts val="0"/>
+                </a:spcBef>
+                <a:spcAft>
+                  <a:spcPts val="0"/>
+                </a:spcAft>
+                <a:buClr>
+                  <a:srgbClr val="222222"/>
+                </a:buClr>
+                <a:buSzPts val="2400"/>
+                <a:buChar char="➔"/>
+              </a:pPr>
+              <a:r>
+                <a:rPr lang="fr-FR" sz="2400" dirty="0"/>
+                <a:t>Transition énergétique entraînera un </a:t>
+              </a:r>
+              <a:r>
+                <a:rPr lang="fr-FR" sz="2400" b="1" dirty="0"/>
+                <a:t>besoin croissant de cuivre</a:t>
               </a:r>
               <a:endParaRPr sz="2400" dirty="0"/>
             </a:p>
@@ -10538,8 +10455,8 @@
           </p:nvSpPr>
           <p:spPr>
             <a:xfrm>
-              <a:off x="2418075" y="27881788"/>
-              <a:ext cx="7246800" cy="1615200"/>
+              <a:off x="1757450" y="27667704"/>
+              <a:ext cx="8078717" cy="916480"/>
             </a:xfrm>
             <a:prstGeom prst="rect">
               <a:avLst/>
@@ -10571,7 +10488,7 @@
                   <a:cs typeface="Lora"/>
                   <a:sym typeface="Lora"/>
                 </a:rPr>
-                <a:t>Pourquoi recycler le cuivre en particulier ?</a:t>
+                <a:t>Pourquoi recycler le cuivre en particulier</a:t>
               </a:r>
               <a:endParaRPr sz="4000" b="1" dirty="0">
                 <a:latin typeface="Lora"/>
@@ -10579,18 +10496,6 @@
                 <a:cs typeface="Lora"/>
                 <a:sym typeface="Lora"/>
               </a:endParaRPr>
-            </a:p>
-            <a:p>
-              <a:pPr marL="0" lvl="0" indent="0" algn="l" rtl="0">
-                <a:spcBef>
-                  <a:spcPts val="0"/>
-                </a:spcBef>
-                <a:spcAft>
-                  <a:spcPts val="0"/>
-                </a:spcAft>
-                <a:buNone/>
-              </a:pPr>
-              <a:endParaRPr dirty="0"/>
             </a:p>
           </p:txBody>
         </p:sp>
@@ -10609,8 +10514,8 @@
         </p:nvSpPr>
         <p:spPr>
           <a:xfrm>
-            <a:off x="267800" y="23907588"/>
-            <a:ext cx="14583346" cy="2389589"/>
+            <a:off x="330346" y="24261204"/>
+            <a:ext cx="14583346" cy="2139853"/>
           </a:xfrm>
           <a:prstGeom prst="roundRect">
             <a:avLst>
@@ -10790,7 +10695,7 @@
               <a:t> </a:t>
             </a:r>
             <a:r>
-              <a:rPr lang="fr-FR" sz="2800" b="1" dirty="0" smtClean="0">
+              <a:rPr lang="fr-FR" sz="2800" b="1" dirty="0">
                 <a:solidFill>
                   <a:schemeClr val="accent6">
                     <a:lumMod val="60000"/>
@@ -10802,19 +10707,7 @@
             </a:r>
             <a:r>
               <a:rPr lang="fr-FR" sz="2800" dirty="0"/>
-              <a:t>u</a:t>
-            </a:r>
-            <a:r>
-              <a:rPr lang="fr-FR" sz="2800" dirty="0" smtClean="0"/>
-              <a:t>n </a:t>
-            </a:r>
-            <a:r>
-              <a:rPr lang="fr-FR" sz="2800" dirty="0"/>
-              <a:t>objet en fin de vie n’est pas nécessairement récupéré pour être recyclé</a:t>
-            </a:r>
-            <a:r>
-              <a:rPr lang="fr-FR" sz="2800" dirty="0" smtClean="0"/>
-              <a:t>.</a:t>
+              <a:t>un objet en fin de vie n’est pas nécessairement récupéré pour être recyclé.</a:t>
             </a:r>
             <a:endParaRPr lang="fr-FR" sz="2800" baseline="30000" dirty="0"/>
           </a:p>
@@ -10884,7 +10777,7 @@
           <a:p>
             <a:pPr algn="just"/>
             <a:r>
-              <a:rPr lang="fr-FR" sz="2800" b="1" u="sng" dirty="0" smtClean="0">
+              <a:rPr lang="fr-FR" sz="2800" b="1" u="sng" dirty="0">
                 <a:solidFill>
                   <a:srgbClr val="7030A0"/>
                 </a:solidFill>
@@ -10892,7 +10785,7 @@
               <a:t>Le taux de recyclage</a:t>
             </a:r>
             <a:r>
-              <a:rPr lang="fr-FR" sz="2800" b="1" dirty="0" smtClean="0">
+              <a:rPr lang="fr-FR" sz="2800" b="1" dirty="0">
                 <a:solidFill>
                   <a:srgbClr val="7030A0"/>
                 </a:solidFill>
@@ -10900,7 +10793,7 @@
               <a:t> </a:t>
             </a:r>
             <a:r>
-              <a:rPr lang="fr-FR" sz="2800" b="1" dirty="0" smtClean="0">
+              <a:rPr lang="fr-FR" sz="2800" b="1" dirty="0">
                 <a:solidFill>
                   <a:schemeClr val="accent6">
                     <a:lumMod val="60000"/>
@@ -10911,12 +10804,8 @@
               <a:t>: </a:t>
             </a:r>
             <a:r>
-              <a:rPr lang="fr-FR" sz="2800" dirty="0" smtClean="0"/>
-              <a:t>m</a:t>
-            </a:r>
-            <a:r>
-              <a:rPr lang="fr-FR" sz="2800" dirty="0" smtClean="0"/>
-              <a:t>ême si un objet est recyclé, on ne peut pas récupérer la totalité du cuivre qu’il contient.</a:t>
+              <a:rPr lang="fr-FR" sz="2800" dirty="0"/>
+              <a:t>même si un objet est recyclé, on ne peut pas récupérer la totalité du cuivre qu’il contient.</a:t>
             </a:r>
             <a:endParaRPr lang="fr-FR" sz="2800" baseline="30000" dirty="0"/>
           </a:p>
@@ -10994,7 +10883,7 @@
               <a:t>Le temps de vie de l’objet </a:t>
             </a:r>
             <a:r>
-              <a:rPr lang="fr-FR" sz="2800" b="1" dirty="0" smtClean="0">
+              <a:rPr lang="fr-FR" sz="2800" b="1" dirty="0">
                 <a:solidFill>
                   <a:srgbClr val="7030A0"/>
                 </a:solidFill>
@@ -11002,15 +10891,15 @@
               <a:t>: </a:t>
             </a:r>
             <a:r>
-              <a:rPr lang="fr-FR" sz="2800" dirty="0" smtClean="0"/>
+              <a:rPr lang="fr-FR" sz="2800" dirty="0"/>
               <a:t>quantifie la </a:t>
             </a:r>
             <a:r>
-              <a:rPr lang="fr-FR" sz="2800" b="1" dirty="0" smtClean="0"/>
+              <a:rPr lang="fr-FR" sz="2800" b="1" dirty="0"/>
               <a:t>vitesse de retour </a:t>
             </a:r>
             <a:r>
-              <a:rPr lang="fr-FR" sz="2800" dirty="0" smtClean="0"/>
+              <a:rPr lang="fr-FR" sz="2800" dirty="0"/>
               <a:t>du cuivre dans la production</a:t>
             </a:r>
             <a:endParaRPr lang="fr-FR" sz="2800" dirty="0">
@@ -11053,7 +10942,7 @@
         </p:nvSpPr>
         <p:spPr>
           <a:xfrm>
-            <a:off x="866656" y="10776862"/>
+            <a:off x="570248" y="10215699"/>
             <a:ext cx="8346344" cy="1107996"/>
           </a:xfrm>
           <a:prstGeom prst="rect">
@@ -11105,8 +10994,8 @@
         </p:blipFill>
         <p:spPr bwMode="auto">
           <a:xfrm>
-            <a:off x="17219079" y="22995837"/>
-            <a:ext cx="11563676" cy="8672757"/>
+            <a:off x="17413108" y="29181126"/>
+            <a:ext cx="11192375" cy="8394281"/>
           </a:xfrm>
           <a:prstGeom prst="rect">
             <a:avLst/>
@@ -11414,14 +11303,11 @@
           <a:lstStyle/>
           <a:p>
             <a:r>
-              <a:rPr lang="fr-FR" sz="3200" dirty="0" smtClean="0">
+              <a:rPr lang="fr-FR" sz="3200" dirty="0">
                 <a:latin typeface="Berlin Sans FB" panose="020E0602020502020306" pitchFamily="34" charset="0"/>
               </a:rPr>
               <a:t>Bâtiments</a:t>
             </a:r>
-            <a:endParaRPr lang="fr-FR" sz="3200" dirty="0">
-              <a:latin typeface="Berlin Sans FB" panose="020E0602020502020306" pitchFamily="34" charset="0"/>
-            </a:endParaRPr>
           </a:p>
         </p:txBody>
       </p:sp>
@@ -11448,14 +11334,11 @@
           <a:lstStyle/>
           <a:p>
             <a:r>
-              <a:rPr lang="fr-FR" sz="3200" dirty="0" smtClean="0">
+              <a:rPr lang="fr-FR" sz="3200" dirty="0">
                 <a:latin typeface="Berlin Sans FB" panose="020E0602020502020306" pitchFamily="34" charset="0"/>
               </a:rPr>
               <a:t>Véhicules</a:t>
             </a:r>
-            <a:endParaRPr lang="fr-FR" sz="3200" dirty="0">
-              <a:latin typeface="Berlin Sans FB" panose="020E0602020502020306" pitchFamily="34" charset="0"/>
-            </a:endParaRPr>
           </a:p>
         </p:txBody>
       </p:sp>
@@ -11550,7 +11433,7 @@
           <a:p>
             <a:pPr algn="ctr"/>
             <a:r>
-              <a:rPr lang="fr-FR" sz="3200" dirty="0" smtClean="0">
+              <a:rPr lang="fr-FR" sz="3200" dirty="0">
                 <a:latin typeface="Berlin Sans FB" panose="020E0602020502020306" pitchFamily="34" charset="0"/>
               </a:rPr>
               <a:t>Equipement</a:t>
@@ -11558,14 +11441,11 @@
           </a:p>
           <a:p>
             <a:r>
-              <a:rPr lang="fr-FR" sz="3200" dirty="0" smtClean="0">
+              <a:rPr lang="fr-FR" sz="3200" dirty="0">
                 <a:latin typeface="Berlin Sans FB" panose="020E0602020502020306" pitchFamily="34" charset="0"/>
               </a:rPr>
               <a:t>électroménager</a:t>
             </a:r>
-            <a:endParaRPr lang="fr-FR" sz="3200" dirty="0">
-              <a:latin typeface="Berlin Sans FB" panose="020E0602020502020306" pitchFamily="34" charset="0"/>
-            </a:endParaRPr>
           </a:p>
         </p:txBody>
       </p:sp>
@@ -11593,7 +11473,7 @@
           <a:p>
             <a:pPr algn="ctr"/>
             <a:r>
-              <a:rPr lang="fr-FR" sz="3200" dirty="0" smtClean="0">
+              <a:rPr lang="fr-FR" sz="3200" dirty="0">
                 <a:latin typeface="Berlin Sans FB" panose="020E0602020502020306" pitchFamily="34" charset="0"/>
               </a:rPr>
               <a:t>Appareils électroniques</a:t>
@@ -11624,14 +11504,11 @@
           <a:lstStyle/>
           <a:p>
             <a:r>
-              <a:rPr lang="fr-FR" sz="3200" dirty="0" smtClean="0">
+              <a:rPr lang="fr-FR" sz="3200" dirty="0">
                 <a:latin typeface="Berlin Sans FB" panose="020E0602020502020306" pitchFamily="34" charset="0"/>
               </a:rPr>
               <a:t>20 000</a:t>
             </a:r>
-            <a:endParaRPr lang="fr-FR" sz="3200" dirty="0">
-              <a:latin typeface="Berlin Sans FB" panose="020E0602020502020306" pitchFamily="34" charset="0"/>
-            </a:endParaRPr>
           </a:p>
         </p:txBody>
       </p:sp>
@@ -11658,14 +11535,11 @@
           <a:lstStyle/>
           <a:p>
             <a:r>
-              <a:rPr lang="fr-FR" sz="3200" dirty="0" smtClean="0">
+              <a:rPr lang="fr-FR" sz="3200" dirty="0">
                 <a:latin typeface="Berlin Sans FB" panose="020E0602020502020306" pitchFamily="34" charset="0"/>
               </a:rPr>
               <a:t>1 000</a:t>
             </a:r>
-            <a:endParaRPr lang="fr-FR" sz="3200" dirty="0">
-              <a:latin typeface="Berlin Sans FB" panose="020E0602020502020306" pitchFamily="34" charset="0"/>
-            </a:endParaRPr>
           </a:p>
         </p:txBody>
       </p:sp>
@@ -11692,14 +11566,11 @@
           <a:lstStyle/>
           <a:p>
             <a:r>
-              <a:rPr lang="fr-FR" sz="3200" dirty="0" smtClean="0">
+              <a:rPr lang="fr-FR" sz="3200" dirty="0">
                 <a:latin typeface="Berlin Sans FB" panose="020E0602020502020306" pitchFamily="34" charset="0"/>
               </a:rPr>
               <a:t>225</a:t>
             </a:r>
-            <a:endParaRPr lang="fr-FR" sz="3200" dirty="0">
-              <a:latin typeface="Berlin Sans FB" panose="020E0602020502020306" pitchFamily="34" charset="0"/>
-            </a:endParaRPr>
           </a:p>
         </p:txBody>
       </p:sp>
@@ -11726,14 +11597,11 @@
           <a:lstStyle/>
           <a:p>
             <a:r>
-              <a:rPr lang="fr-FR" sz="3200" dirty="0" smtClean="0">
+              <a:rPr lang="fr-FR" sz="3200" dirty="0">
                 <a:latin typeface="Berlin Sans FB" panose="020E0602020502020306" pitchFamily="34" charset="0"/>
               </a:rPr>
               <a:t>10</a:t>
             </a:r>
-            <a:endParaRPr lang="fr-FR" sz="3200" dirty="0">
-              <a:latin typeface="Berlin Sans FB" panose="020E0602020502020306" pitchFamily="34" charset="0"/>
-            </a:endParaRPr>
           </a:p>
         </p:txBody>
       </p:sp>
@@ -11760,14 +11628,11 @@
           <a:lstStyle/>
           <a:p>
             <a:r>
-              <a:rPr lang="fr-FR" sz="3200" dirty="0" smtClean="0">
+              <a:rPr lang="fr-FR" sz="3200" dirty="0">
                 <a:latin typeface="Berlin Sans FB" panose="020E0602020502020306" pitchFamily="34" charset="0"/>
               </a:rPr>
               <a:t>Bâtiments</a:t>
             </a:r>
-            <a:endParaRPr lang="fr-FR" sz="3200" dirty="0">
-              <a:latin typeface="Berlin Sans FB" panose="020E0602020502020306" pitchFamily="34" charset="0"/>
-            </a:endParaRPr>
           </a:p>
         </p:txBody>
       </p:sp>
@@ -11794,14 +11659,11 @@
           <a:lstStyle/>
           <a:p>
             <a:r>
-              <a:rPr lang="fr-FR" sz="3200" dirty="0" smtClean="0">
+              <a:rPr lang="fr-FR" sz="3200" dirty="0">
                 <a:latin typeface="Berlin Sans FB" panose="020E0602020502020306" pitchFamily="34" charset="0"/>
               </a:rPr>
               <a:t>Véhicules</a:t>
             </a:r>
-            <a:endParaRPr lang="fr-FR" sz="3200" dirty="0">
-              <a:latin typeface="Berlin Sans FB" panose="020E0602020502020306" pitchFamily="34" charset="0"/>
-            </a:endParaRPr>
           </a:p>
         </p:txBody>
       </p:sp>
@@ -11829,7 +11691,7 @@
           <a:p>
             <a:pPr algn="ctr"/>
             <a:r>
-              <a:rPr lang="fr-FR" sz="3200" dirty="0" smtClean="0">
+              <a:rPr lang="fr-FR" sz="3200" dirty="0">
                 <a:latin typeface="Berlin Sans FB" panose="020E0602020502020306" pitchFamily="34" charset="0"/>
               </a:rPr>
               <a:t>Equipement</a:t>
@@ -11837,14 +11699,11 @@
           </a:p>
           <a:p>
             <a:r>
-              <a:rPr lang="fr-FR" sz="3200" dirty="0" smtClean="0">
+              <a:rPr lang="fr-FR" sz="3200" dirty="0">
                 <a:latin typeface="Berlin Sans FB" panose="020E0602020502020306" pitchFamily="34" charset="0"/>
               </a:rPr>
               <a:t>électroménager</a:t>
             </a:r>
-            <a:endParaRPr lang="fr-FR" sz="3200" dirty="0">
-              <a:latin typeface="Berlin Sans FB" panose="020E0602020502020306" pitchFamily="34" charset="0"/>
-            </a:endParaRPr>
           </a:p>
         </p:txBody>
       </p:sp>
@@ -11872,7 +11731,7 @@
           <a:p>
             <a:pPr algn="ctr"/>
             <a:r>
-              <a:rPr lang="fr-FR" sz="3200" dirty="0" smtClean="0">
+              <a:rPr lang="fr-FR" sz="3200" dirty="0">
                 <a:latin typeface="Berlin Sans FB" panose="020E0602020502020306" pitchFamily="34" charset="0"/>
               </a:rPr>
               <a:t>Appareils électroniques</a:t>
@@ -11903,14 +11762,11 @@
           <a:lstStyle/>
           <a:p>
             <a:r>
-              <a:rPr lang="fr-FR" sz="3200" dirty="0" smtClean="0">
+              <a:rPr lang="fr-FR" sz="3200" dirty="0">
                 <a:latin typeface="Berlin Sans FB" panose="020E0602020502020306" pitchFamily="34" charset="0"/>
               </a:rPr>
               <a:t>50</a:t>
             </a:r>
-            <a:endParaRPr lang="fr-FR" sz="3200" dirty="0">
-              <a:latin typeface="Berlin Sans FB" panose="020E0602020502020306" pitchFamily="34" charset="0"/>
-            </a:endParaRPr>
           </a:p>
         </p:txBody>
       </p:sp>
@@ -12071,14 +11927,11 @@
           <a:lstStyle/>
           <a:p>
             <a:r>
-              <a:rPr lang="fr-FR" sz="3200" dirty="0" smtClean="0">
+              <a:rPr lang="fr-FR" sz="3200" dirty="0">
                 <a:latin typeface="Berlin Sans FB" panose="020E0602020502020306" pitchFamily="34" charset="0"/>
               </a:rPr>
               <a:t>10</a:t>
             </a:r>
-            <a:endParaRPr lang="fr-FR" sz="3200" dirty="0">
-              <a:latin typeface="Berlin Sans FB" panose="020E0602020502020306" pitchFamily="34" charset="0"/>
-            </a:endParaRPr>
           </a:p>
         </p:txBody>
       </p:sp>
@@ -12172,14 +12025,11 @@
           <a:lstStyle/>
           <a:p>
             <a:r>
-              <a:rPr lang="fr-FR" sz="3200" dirty="0" smtClean="0">
+              <a:rPr lang="fr-FR" sz="3200" dirty="0">
                 <a:latin typeface="Berlin Sans FB" panose="020E0602020502020306" pitchFamily="34" charset="0"/>
               </a:rPr>
               <a:t>10</a:t>
             </a:r>
-            <a:endParaRPr lang="fr-FR" sz="3200" dirty="0">
-              <a:latin typeface="Berlin Sans FB" panose="020E0602020502020306" pitchFamily="34" charset="0"/>
-            </a:endParaRPr>
           </a:p>
         </p:txBody>
       </p:sp>
@@ -12206,14 +12056,11 @@
           <a:lstStyle/>
           <a:p>
             <a:r>
-              <a:rPr lang="fr-FR" sz="3200" dirty="0" smtClean="0">
+              <a:rPr lang="fr-FR" sz="3200" dirty="0">
                 <a:latin typeface="Berlin Sans FB" panose="020E0602020502020306" pitchFamily="34" charset="0"/>
               </a:rPr>
               <a:t>3</a:t>
             </a:r>
-            <a:endParaRPr lang="fr-FR" sz="3200" dirty="0">
-              <a:latin typeface="Berlin Sans FB" panose="020E0602020502020306" pitchFamily="34" charset="0"/>
-            </a:endParaRPr>
           </a:p>
         </p:txBody>
       </p:sp>
@@ -12240,10 +12087,9 @@
           <a:lstStyle/>
           <a:p>
             <a:r>
-              <a:rPr lang="fr-FR" sz="2000" dirty="0" smtClean="0"/>
+              <a:rPr lang="fr-FR" sz="2000" dirty="0"/>
               <a:t>(en milliers de tonnes)</a:t>
             </a:r>
-            <a:endParaRPr lang="fr-FR" sz="2000" dirty="0"/>
           </a:p>
         </p:txBody>
       </p:sp>
@@ -12270,10 +12116,9 @@
           <a:lstStyle/>
           <a:p>
             <a:r>
-              <a:rPr lang="fr-FR" sz="2000" dirty="0" smtClean="0"/>
+              <a:rPr lang="fr-FR" sz="2000" dirty="0"/>
               <a:t>(en années)</a:t>
             </a:r>
-            <a:endParaRPr lang="fr-FR" sz="2000" dirty="0"/>
           </a:p>
         </p:txBody>
       </p:sp>
@@ -12350,6 +12195,233 @@
           </a:p>
         </p:txBody>
       </p:sp>
+      <p:sp>
+        <p:nvSpPr>
+          <p:cNvPr id="7" name="ZoneTexte 6">
+            <a:extLst>
+              <a:ext uri="{FF2B5EF4-FFF2-40B4-BE49-F238E27FC236}">
+                <a16:creationId xmlns:a16="http://schemas.microsoft.com/office/drawing/2014/main" id="{10EE5C45-9095-42C3-AC5D-F6A5A8D5ACC8}"/>
+              </a:ext>
+            </a:extLst>
+          </p:cNvPr>
+          <p:cNvSpPr txBox="1"/>
+          <p:nvPr/>
+        </p:nvSpPr>
+        <p:spPr>
+          <a:xfrm>
+            <a:off x="18665899" y="28298446"/>
+            <a:ext cx="8825449" cy="738664"/>
+          </a:xfrm>
+          <a:prstGeom prst="rect">
+            <a:avLst/>
+          </a:prstGeom>
+          <a:noFill/>
+        </p:spPr>
+        <p:txBody>
+          <a:bodyPr wrap="square" rtlCol="0">
+            <a:spAutoFit/>
+          </a:bodyPr>
+          <a:lstStyle/>
+          <a:p>
+            <a:pPr algn="ctr"/>
+            <a:r>
+              <a:rPr lang="fr-FR" sz="2400" dirty="0"/>
+              <a:t>L’économie circulaire du cuivre en 2018 (en Mt)</a:t>
+            </a:r>
+          </a:p>
+          <a:p>
+            <a:r>
+              <a:rPr lang="fr-FR" sz="1800" dirty="0"/>
+              <a:t>Schéma simplifié d’après « The World Copper </a:t>
+            </a:r>
+            <a:r>
+              <a:rPr lang="fr-FR" sz="1800" dirty="0" err="1"/>
+              <a:t>Factbook</a:t>
+            </a:r>
+            <a:r>
+              <a:rPr lang="fr-FR" sz="1800" dirty="0"/>
+              <a:t> 2020 », document de l’ICSG</a:t>
+            </a:r>
+          </a:p>
+        </p:txBody>
+      </p:sp>
+      <p:sp>
+        <p:nvSpPr>
+          <p:cNvPr id="10" name="ZoneTexte 9">
+            <a:extLst>
+              <a:ext uri="{FF2B5EF4-FFF2-40B4-BE49-F238E27FC236}">
+                <a16:creationId xmlns:a16="http://schemas.microsoft.com/office/drawing/2014/main" id="{51F40174-04FB-40D9-9946-3834B16F92A3}"/>
+              </a:ext>
+            </a:extLst>
+          </p:cNvPr>
+          <p:cNvSpPr txBox="1"/>
+          <p:nvPr/>
+        </p:nvSpPr>
+        <p:spPr>
+          <a:xfrm>
+            <a:off x="9644557" y="21494029"/>
+            <a:ext cx="8273340" cy="523220"/>
+          </a:xfrm>
+          <a:prstGeom prst="rect">
+            <a:avLst/>
+          </a:prstGeom>
+          <a:noFill/>
+        </p:spPr>
+        <p:txBody>
+          <a:bodyPr wrap="square" rtlCol="0">
+            <a:spAutoFit/>
+          </a:bodyPr>
+          <a:lstStyle/>
+          <a:p>
+            <a:r>
+              <a:rPr lang="en-US" sz="1400" b="0" i="0" dirty="0">
+                <a:solidFill>
+                  <a:srgbClr val="222222"/>
+                </a:solidFill>
+                <a:effectLst/>
+                <a:latin typeface="AvenirNextLTPro"/>
+              </a:rPr>
+              <a:t>Northey, S., et al. « Modelling Future Copper Ore Grade Decline Based on a Detailed Assessment of Copper Resources and Mining ». </a:t>
+            </a:r>
+            <a:r>
+              <a:rPr lang="en-US" sz="1400" b="0" i="1" dirty="0">
+                <a:solidFill>
+                  <a:srgbClr val="222222"/>
+                </a:solidFill>
+                <a:effectLst/>
+                <a:latin typeface="AvenirNextLTPro"/>
+              </a:rPr>
+              <a:t>Resources, Conservation and Recycling</a:t>
+            </a:r>
+            <a:r>
+              <a:rPr lang="en-US" sz="1400" b="0" i="0" dirty="0">
+                <a:solidFill>
+                  <a:srgbClr val="222222"/>
+                </a:solidFill>
+                <a:effectLst/>
+                <a:latin typeface="AvenirNextLTPro"/>
+              </a:rPr>
+              <a:t>, vol. 83, </a:t>
+            </a:r>
+            <a:r>
+              <a:rPr lang="en-US" sz="1400" b="0" i="0" dirty="0" err="1">
+                <a:solidFill>
+                  <a:srgbClr val="222222"/>
+                </a:solidFill>
+                <a:effectLst/>
+                <a:latin typeface="AvenirNextLTPro"/>
+              </a:rPr>
+              <a:t>février</a:t>
+            </a:r>
+            <a:r>
+              <a:rPr lang="en-US" sz="1400" b="0" i="0" dirty="0">
+                <a:solidFill>
+                  <a:srgbClr val="222222"/>
+                </a:solidFill>
+                <a:effectLst/>
+                <a:latin typeface="AvenirNextLTPro"/>
+              </a:rPr>
+              <a:t> 2014, p. 190‑201. </a:t>
+            </a:r>
+            <a:r>
+              <a:rPr lang="en-US" sz="1400" b="0" i="1" dirty="0">
+                <a:solidFill>
+                  <a:srgbClr val="222222"/>
+                </a:solidFill>
+                <a:effectLst/>
+                <a:latin typeface="AvenirNextLTPro"/>
+              </a:rPr>
+              <a:t>ScienceDirect</a:t>
+            </a:r>
+            <a:endParaRPr lang="fr-FR" sz="1800" dirty="0"/>
+          </a:p>
+        </p:txBody>
+      </p:sp>
+      <p:sp>
+        <p:nvSpPr>
+          <p:cNvPr id="89" name="Google Shape;122;p1">
+            <a:extLst>
+              <a:ext uri="{FF2B5EF4-FFF2-40B4-BE49-F238E27FC236}">
+                <a16:creationId xmlns:a16="http://schemas.microsoft.com/office/drawing/2014/main" id="{BA20BB82-CF62-4D9B-B2EF-33B6233F9C34}"/>
+              </a:ext>
+            </a:extLst>
+          </p:cNvPr>
+          <p:cNvSpPr/>
+          <p:nvPr/>
+        </p:nvSpPr>
+        <p:spPr>
+          <a:xfrm>
+            <a:off x="16361004" y="37705792"/>
+            <a:ext cx="13464454" cy="3046017"/>
+          </a:xfrm>
+          <a:prstGeom prst="roundRect">
+            <a:avLst>
+              <a:gd name="adj" fmla="val 16667"/>
+            </a:avLst>
+          </a:prstGeom>
+          <a:gradFill flip="none" rotWithShape="1">
+            <a:gsLst>
+              <a:gs pos="0">
+                <a:srgbClr val="C00000">
+                  <a:tint val="66000"/>
+                  <a:satMod val="160000"/>
+                </a:srgbClr>
+              </a:gs>
+              <a:gs pos="50000">
+                <a:srgbClr val="C00000">
+                  <a:tint val="44500"/>
+                  <a:satMod val="160000"/>
+                </a:srgbClr>
+              </a:gs>
+              <a:gs pos="100000">
+                <a:srgbClr val="C00000">
+                  <a:tint val="23500"/>
+                  <a:satMod val="160000"/>
+                </a:srgbClr>
+              </a:gs>
+            </a:gsLst>
+            <a:lin ang="2700000" scaled="1"/>
+            <a:tileRect/>
+          </a:gradFill>
+          <a:ln w="9525" cap="flat" cmpd="sng">
+            <a:solidFill>
+              <a:schemeClr val="dk2"/>
+            </a:solidFill>
+            <a:prstDash val="solid"/>
+            <a:round/>
+            <a:headEnd type="none" w="sm" len="sm"/>
+            <a:tailEnd type="none" w="sm" len="sm"/>
+          </a:ln>
+        </p:spPr>
+        <p:txBody>
+          <a:bodyPr spcFirstLastPara="1" wrap="square" lIns="91425" tIns="91425" rIns="91425" bIns="91425" anchor="ctr" anchorCtr="0">
+            <a:noAutofit/>
+          </a:bodyPr>
+          <a:lstStyle/>
+          <a:p>
+            <a:pPr algn="just"/>
+            <a:r>
+              <a:rPr lang="fr-FR" sz="2400" dirty="0"/>
+              <a:t>La plus grande marge de manœuvre se trouve dans le taux de collecte de produits qui ne représentent pas la part la plus importante des réserves de cuivre recyclable (</a:t>
+            </a:r>
+            <a:r>
+              <a:rPr lang="fr-FR" sz="2400" u="sng" dirty="0"/>
+              <a:t>ex :</a:t>
+            </a:r>
+            <a:r>
+              <a:rPr lang="fr-FR" sz="2400" dirty="0"/>
+              <a:t> appareils électroniques). </a:t>
+            </a:r>
+          </a:p>
+          <a:p>
+            <a:pPr algn="just"/>
+            <a:r>
+              <a:rPr lang="fr-FR" sz="2400" dirty="0"/>
+              <a:t>Même dans le cas le plus optimiste, le cuivre recyclé ne parviendra pas à satisfaire la demande en France. Cependant, les choix en terme de consommation et de recyclage pourront aboutir à un écart décroissant entre la demande et l’approvisionnement en recyclage ce qui permettra de s’adapter à une diminution de la quantité de cuivre extractible.</a:t>
+            </a:r>
+          </a:p>
+        </p:txBody>
+      </p:sp>
     </p:spTree>
     <p:extLst>
       <p:ext uri="{BB962C8B-B14F-4D97-AF65-F5344CB8AC3E}">
@@ -12360,13 +12432,6 @@
   <p:clrMapOvr>
     <a:masterClrMapping/>
   </p:clrMapOvr>
-  <p:timing>
-    <p:tnLst>
-      <p:par>
-        <p:cTn id="1" dur="indefinite" restart="never" nodeType="tmRoot"/>
-      </p:par>
-    </p:tnLst>
-  </p:timing>
 </p:sld>
 </file>
 

</xml_diff>

<commit_message>
Ajout partie LJ presque finale + refactor par César
</commit_message>
<xml_diff>
--- a/UE14-poster-sujet14.pptx
+++ b/UE14-poster-sujet14.pptx
@@ -110,12 +110,12 @@
   <p:extLst>
     <p:ext uri="{EFAFB233-063F-42B5-8137-9DF3F51BA10A}">
       <p15:sldGuideLst xmlns:p15="http://schemas.microsoft.com/office/powerpoint/2012/main">
-        <p15:guide id="1" orient="horz" pos="13483">
+        <p15:guide id="1" orient="horz" pos="21512" userDrawn="1">
           <p15:clr>
             <a:srgbClr val="A4A3A4"/>
           </p15:clr>
         </p15:guide>
-        <p15:guide id="2" pos="9537">
+        <p15:guide id="2" pos="8970" userDrawn="1">
           <p15:clr>
             <a:srgbClr val="A4A3A4"/>
           </p15:clr>
@@ -1040,7 +1040,7 @@
               <a:latin typeface="Calibri" panose="020F0502020204030204" pitchFamily="34" charset="0"/>
               <a:cs typeface="Calibri" panose="020F0502020204030204" pitchFamily="34" charset="0"/>
             </a:rPr>
-            <a:t>l’expose plus souvent à des pertes</a:t>
+            <a:t>expose plus souvent à des pertes</a:t>
           </a:r>
           <a:r>
             <a:rPr lang="fr-FR" sz="2400" u="none" dirty="0">
@@ -1054,7 +1054,7 @@
               <a:latin typeface="Calibri" panose="020F0502020204030204" pitchFamily="34" charset="0"/>
               <a:cs typeface="Calibri" panose="020F0502020204030204" pitchFamily="34" charset="0"/>
             </a:rPr>
-            <a:t>(taux de collecte et de recyclage) </a:t>
+            <a:t>(taux de collecte et de recyclage, énergie pour le recyclage) </a:t>
           </a:r>
         </a:p>
       </dgm:t>
@@ -1151,13 +1151,6 @@
         </dgm:presLayoutVars>
       </dgm:prSet>
       <dgm:spPr/>
-      <dgm:t>
-        <a:bodyPr/>
-        <a:lstStyle/>
-        <a:p>
-          <a:endParaRPr lang="fr-FR"/>
-        </a:p>
-      </dgm:t>
     </dgm:pt>
     <dgm:pt modelId="{2D99AE35-4FB4-4D7D-98F5-32707679D85C}" type="pres">
       <dgm:prSet presAssocID="{E0C05CFD-A0F4-4469-80A1-D3C82E738803}" presName="upArrow" presStyleLbl="node1" presStyleIdx="0" presStyleCnt="2"/>
@@ -1171,13 +1164,6 @@
         </dgm:presLayoutVars>
       </dgm:prSet>
       <dgm:spPr/>
-      <dgm:t>
-        <a:bodyPr/>
-        <a:lstStyle/>
-        <a:p>
-          <a:endParaRPr lang="fr-FR"/>
-        </a:p>
-      </dgm:t>
     </dgm:pt>
     <dgm:pt modelId="{F19A29E1-E739-4CD4-BCD6-86B4881388E5}" type="pres">
       <dgm:prSet presAssocID="{17BBD623-3721-4BE3-B5FF-A77E851E6C3A}" presName="downArrow" presStyleLbl="node1" presStyleIdx="1" presStyleCnt="2"/>
@@ -1191,21 +1177,14 @@
         </dgm:presLayoutVars>
       </dgm:prSet>
       <dgm:spPr/>
-      <dgm:t>
-        <a:bodyPr/>
-        <a:lstStyle/>
-        <a:p>
-          <a:endParaRPr lang="fr-FR"/>
-        </a:p>
-      </dgm:t>
     </dgm:pt>
   </dgm:ptLst>
   <dgm:cxnLst>
+    <dgm:cxn modelId="{C5489E2D-8BB1-440A-A12A-64B5F996DFA9}" srcId="{62283C60-3109-4813-B877-13E1614CDC93}" destId="{17BBD623-3721-4BE3-B5FF-A77E851E6C3A}" srcOrd="1" destOrd="0" parTransId="{325CCC3D-332C-4DE6-AB10-163FF393F513}" sibTransId="{F5113C04-32F2-4C70-B297-10FE83FD3990}"/>
+    <dgm:cxn modelId="{2D6CA433-2A32-43C9-BD15-14B82591FCDB}" type="presOf" srcId="{E0C05CFD-A0F4-4469-80A1-D3C82E738803}" destId="{B7F1DF16-F3B8-4818-87F6-0E05AF45A2C7}" srcOrd="0" destOrd="0" presId="urn:microsoft.com/office/officeart/2005/8/layout/arrow4"/>
+    <dgm:cxn modelId="{8E820344-BBFA-4455-A55B-A2E3B52E6C66}" type="presOf" srcId="{17BBD623-3721-4BE3-B5FF-A77E851E6C3A}" destId="{F3542F7E-34C6-4CCA-B44D-663D3A574EF0}" srcOrd="0" destOrd="0" presId="urn:microsoft.com/office/officeart/2005/8/layout/arrow4"/>
+    <dgm:cxn modelId="{19630F6B-1AA5-4421-B2C3-BC00822E03AE}" type="presOf" srcId="{62283C60-3109-4813-B877-13E1614CDC93}" destId="{2F932DFC-8D37-483E-A0D8-A2CDC6234D5A}" srcOrd="0" destOrd="0" presId="urn:microsoft.com/office/officeart/2005/8/layout/arrow4"/>
     <dgm:cxn modelId="{9F93F595-404B-417B-9B5C-8EEC8250C40D}" srcId="{62283C60-3109-4813-B877-13E1614CDC93}" destId="{E0C05CFD-A0F4-4469-80A1-D3C82E738803}" srcOrd="0" destOrd="0" parTransId="{D7FBCCD6-7AB3-4158-89FA-121B2FC05415}" sibTransId="{B627ABA9-4BDA-4297-9FAC-496080351108}"/>
-    <dgm:cxn modelId="{2D6CA433-2A32-43C9-BD15-14B82591FCDB}" type="presOf" srcId="{E0C05CFD-A0F4-4469-80A1-D3C82E738803}" destId="{B7F1DF16-F3B8-4818-87F6-0E05AF45A2C7}" srcOrd="0" destOrd="0" presId="urn:microsoft.com/office/officeart/2005/8/layout/arrow4"/>
-    <dgm:cxn modelId="{C5489E2D-8BB1-440A-A12A-64B5F996DFA9}" srcId="{62283C60-3109-4813-B877-13E1614CDC93}" destId="{17BBD623-3721-4BE3-B5FF-A77E851E6C3A}" srcOrd="1" destOrd="0" parTransId="{325CCC3D-332C-4DE6-AB10-163FF393F513}" sibTransId="{F5113C04-32F2-4C70-B297-10FE83FD3990}"/>
-    <dgm:cxn modelId="{19630F6B-1AA5-4421-B2C3-BC00822E03AE}" type="presOf" srcId="{62283C60-3109-4813-B877-13E1614CDC93}" destId="{2F932DFC-8D37-483E-A0D8-A2CDC6234D5A}" srcOrd="0" destOrd="0" presId="urn:microsoft.com/office/officeart/2005/8/layout/arrow4"/>
-    <dgm:cxn modelId="{8E820344-BBFA-4455-A55B-A2E3B52E6C66}" type="presOf" srcId="{17BBD623-3721-4BE3-B5FF-A77E851E6C3A}" destId="{F3542F7E-34C6-4CCA-B44D-663D3A574EF0}" srcOrd="0" destOrd="0" presId="urn:microsoft.com/office/officeart/2005/8/layout/arrow4"/>
     <dgm:cxn modelId="{8D6EDFC7-32D9-40DF-BC54-8AD0E201BB9B}" type="presParOf" srcId="{2F932DFC-8D37-483E-A0D8-A2CDC6234D5A}" destId="{2D99AE35-4FB4-4D7D-98F5-32707679D85C}" srcOrd="0" destOrd="0" presId="urn:microsoft.com/office/officeart/2005/8/layout/arrow4"/>
     <dgm:cxn modelId="{06BE6F60-0356-421A-B37B-CF72DFA04755}" type="presParOf" srcId="{2F932DFC-8D37-483E-A0D8-A2CDC6234D5A}" destId="{B7F1DF16-F3B8-4818-87F6-0E05AF45A2C7}" srcOrd="1" destOrd="0" presId="urn:microsoft.com/office/officeart/2005/8/layout/arrow4"/>
     <dgm:cxn modelId="{ECB84A54-727D-4257-BE2E-0734579BDFC8}" type="presParOf" srcId="{2F932DFC-8D37-483E-A0D8-A2CDC6234D5A}" destId="{F19A29E1-E739-4CD4-BCD6-86B4881388E5}" srcOrd="2" destOrd="0" presId="urn:microsoft.com/office/officeart/2005/8/layout/arrow4"/>
@@ -1320,7 +1299,7 @@
         </a:bodyPr>
         <a:lstStyle/>
         <a:p>
-          <a:pPr lvl="0" algn="just" defTabSz="1066800">
+          <a:pPr marL="0" lvl="0" indent="0" algn="just" defTabSz="1066800">
             <a:lnSpc>
               <a:spcPct val="90000"/>
             </a:lnSpc>
@@ -1330,6 +1309,7 @@
             <a:spcAft>
               <a:spcPct val="35000"/>
             </a:spcAft>
+            <a:buNone/>
           </a:pPr>
           <a:r>
             <a:rPr lang="fr-FR" sz="2400" kern="1200" dirty="0">
@@ -1453,7 +1433,7 @@
         </a:bodyPr>
         <a:lstStyle/>
         <a:p>
-          <a:pPr lvl="0" algn="just" defTabSz="1066800">
+          <a:pPr marL="0" lvl="0" indent="0" algn="just" defTabSz="1066800">
             <a:lnSpc>
               <a:spcPct val="90000"/>
             </a:lnSpc>
@@ -1463,6 +1443,7 @@
             <a:spcAft>
               <a:spcPct val="35000"/>
             </a:spcAft>
+            <a:buNone/>
           </a:pPr>
           <a:r>
             <a:rPr lang="fr-FR" sz="2400" kern="1200" dirty="0">
@@ -1476,7 +1457,7 @@
               <a:latin typeface="Calibri" panose="020F0502020204030204" pitchFamily="34" charset="0"/>
               <a:cs typeface="Calibri" panose="020F0502020204030204" pitchFamily="34" charset="0"/>
             </a:rPr>
-            <a:t>l’expose plus souvent à des pertes</a:t>
+            <a:t>expose plus souvent à des pertes</a:t>
           </a:r>
           <a:r>
             <a:rPr lang="fr-FR" sz="2400" u="none" kern="1200" dirty="0">
@@ -1490,7 +1471,7 @@
               <a:latin typeface="Calibri" panose="020F0502020204030204" pitchFamily="34" charset="0"/>
               <a:cs typeface="Calibri" panose="020F0502020204030204" pitchFamily="34" charset="0"/>
             </a:rPr>
-            <a:t>(taux de collecte et de recyclage) </a:t>
+            <a:t>(taux de collecte et de recyclage, énergie pour le recyclage) </a:t>
           </a:r>
         </a:p>
       </dsp:txBody>
@@ -7489,7 +7470,7 @@
               </a:spcAft>
             </a:pPr>
             <a:r>
-              <a:rPr lang="fr-FR" sz="2900" dirty="0" err="1">
+              <a:rPr lang="fr-FR" sz="2900" dirty="0">
                 <a:solidFill>
                   <a:srgbClr val="6D505B"/>
                 </a:solidFill>
@@ -7497,12 +7478,6 @@
               </a:rPr>
               <a:t>www.mines-paristech.fr</a:t>
             </a:r>
-            <a:endParaRPr lang="fr-FR" sz="2900" dirty="0">
-              <a:solidFill>
-                <a:srgbClr val="6D505B"/>
-              </a:solidFill>
-              <a:cs typeface="Arial" charset="0"/>
-            </a:endParaRPr>
           </a:p>
         </p:txBody>
       </p:sp>
@@ -7708,51 +7683,7 @@
                   </a:srgbClr>
                 </a:solidFill>
               </a:rPr>
-              <a:t>Laure </a:t>
-            </a:r>
-            <a:r>
-              <a:rPr lang="fr-FR" sz="4600" kern="0" dirty="0" err="1">
-                <a:solidFill>
-                  <a:srgbClr val="000000">
-                    <a:lumMod val="50000"/>
-                    <a:lumOff val="50000"/>
-                  </a:srgbClr>
-                </a:solidFill>
-              </a:rPr>
-              <a:t>Bourguelle</a:t>
-            </a:r>
-            <a:r>
-              <a:rPr lang="fr-FR" sz="4600" kern="0" dirty="0">
-                <a:solidFill>
-                  <a:srgbClr val="000000">
-                    <a:lumMod val="50000"/>
-                    <a:lumOff val="50000"/>
-                  </a:srgbClr>
-                </a:solidFill>
-              </a:rPr>
-              <a:t>, Enol Alvarez, César </a:t>
-            </a:r>
-            <a:r>
-              <a:rPr lang="fr-FR" sz="4600" kern="0" dirty="0" err="1">
-                <a:solidFill>
-                  <a:srgbClr val="000000">
-                    <a:lumMod val="50000"/>
-                    <a:lumOff val="50000"/>
-                  </a:srgbClr>
-                </a:solidFill>
-              </a:rPr>
-              <a:t>Almecija</a:t>
-            </a:r>
-            <a:r>
-              <a:rPr lang="fr-FR" sz="4600" kern="0" dirty="0">
-                <a:solidFill>
-                  <a:srgbClr val="000000">
-                    <a:lumMod val="50000"/>
-                    <a:lumOff val="50000"/>
-                  </a:srgbClr>
-                </a:solidFill>
-              </a:rPr>
-              <a:t>, Louis-Justin Tallot</a:t>
+              <a:t>Laure Bourguelle, Enol Álvarez, César Almecija, Louis-Justin Tallot</a:t>
             </a:r>
           </a:p>
         </p:txBody>
@@ -8035,7 +7966,7 @@
                 </a:solidFill>
                 <a:latin typeface="Lora"/>
               </a:rPr>
-              <a:t>autonome</a:t>
+              <a:t>autarcique</a:t>
             </a:r>
             <a:r>
               <a:rPr lang="fr-FR" sz="3600" b="1" dirty="0">
@@ -8154,7 +8085,7 @@
           <p:nvPr>
             <p:extLst>
               <p:ext uri="{D42A27DB-BD31-4B8C-83A1-F6EECF244321}">
-                <p14:modId xmlns:p14="http://schemas.microsoft.com/office/powerpoint/2010/main" val="802538704"/>
+                <p14:modId xmlns:p14="http://schemas.microsoft.com/office/powerpoint/2010/main" val="4111935568"/>
               </p:ext>
             </p:extLst>
           </p:nvPr>
@@ -8181,18 +8112,17 @@
           <p:cNvPicPr preferRelativeResize="0"/>
           <p:nvPr/>
         </p:nvPicPr>
-        <p:blipFill>
+        <p:blipFill rotWithShape="1">
           <a:blip r:embed="rId11">
             <a:alphaModFix/>
           </a:blip>
-          <a:stretch>
-            <a:fillRect/>
-          </a:stretch>
+          <a:srcRect l="6586" b="6149"/>
+          <a:stretch/>
         </p:blipFill>
         <p:spPr>
           <a:xfrm>
-            <a:off x="18637940" y="22503226"/>
-            <a:ext cx="8524651" cy="6389868"/>
+            <a:off x="15541328" y="22595492"/>
+            <a:ext cx="7963246" cy="5997004"/>
           </a:xfrm>
           <a:prstGeom prst="rect">
             <a:avLst/>
@@ -8355,25 +8285,8 @@
                   <a:latin typeface="Calibri" panose="020F0502020204030204" pitchFamily="34" charset="0"/>
                   <a:cs typeface="Calibri" panose="020F0502020204030204" pitchFamily="34" charset="0"/>
                 </a:rPr>
-                <a:t>d'autres produits</a:t>
+                <a:t>d'autres produits.</a:t>
               </a:r>
-              <a:r>
-                <a:rPr lang="fr-FR" sz="2800" dirty="0" smtClean="0">
-                  <a:solidFill>
-                    <a:schemeClr val="dk1"/>
-                  </a:solidFill>
-                  <a:latin typeface="Calibri" panose="020F0502020204030204" pitchFamily="34" charset="0"/>
-                  <a:cs typeface="Calibri" panose="020F0502020204030204" pitchFamily="34" charset="0"/>
-                </a:rPr>
-                <a:t>.</a:t>
-              </a:r>
-              <a:endParaRPr lang="fr-FR" sz="2800" dirty="0">
-                <a:solidFill>
-                  <a:schemeClr val="dk1"/>
-                </a:solidFill>
-                <a:latin typeface="Calibri" panose="020F0502020204030204" pitchFamily="34" charset="0"/>
-                <a:cs typeface="Calibri" panose="020F0502020204030204" pitchFamily="34" charset="0"/>
-              </a:endParaRPr>
             </a:p>
             <a:p>
               <a:pPr marL="0" lvl="0" indent="0" algn="just" rtl="0">
@@ -8421,7 +8334,7 @@
                 <a:t>, </a:t>
               </a:r>
               <a:r>
-                <a:rPr lang="fr-FR" sz="2800" b="1" dirty="0" smtClean="0">
+                <a:rPr lang="fr-FR" sz="2800" b="1" dirty="0">
                   <a:solidFill>
                     <a:schemeClr val="dk1"/>
                   </a:solidFill>
@@ -8431,16 +8344,6 @@
                 <a:t>l’accessibilité</a:t>
               </a:r>
               <a:r>
-                <a:rPr lang="fr-FR" sz="2800" dirty="0" smtClean="0">
-                  <a:solidFill>
-                    <a:schemeClr val="dk1"/>
-                  </a:solidFill>
-                  <a:latin typeface="Calibri" panose="020F0502020204030204" pitchFamily="34" charset="0"/>
-                  <a:cs typeface="Calibri" panose="020F0502020204030204" pitchFamily="34" charset="0"/>
-                </a:rPr>
-                <a:t> aux </a:t>
-              </a:r>
-              <a:r>
                 <a:rPr lang="fr-FR" sz="2800" dirty="0">
                   <a:solidFill>
                     <a:schemeClr val="dk1"/>
@@ -8448,7 +8351,7 @@
                   <a:latin typeface="Calibri" panose="020F0502020204030204" pitchFamily="34" charset="0"/>
                   <a:cs typeface="Calibri" panose="020F0502020204030204" pitchFamily="34" charset="0"/>
                 </a:rPr>
-                <a:t>déchets et le </a:t>
+                <a:t> aux déchets et le </a:t>
               </a:r>
               <a:r>
                 <a:rPr lang="fr-FR" sz="2800" b="1" dirty="0">
@@ -8527,31 +8430,7 @@
                   <a:cs typeface="Lora"/>
                   <a:sym typeface="Lora"/>
                 </a:rPr>
-                <a:t>Parlons </a:t>
-              </a:r>
-              <a:r>
-                <a:rPr lang="fr-FR" sz="3600" b="1" dirty="0" smtClean="0">
-                  <a:solidFill>
-                    <a:srgbClr val="336600"/>
-                  </a:solidFill>
-                  <a:latin typeface="Lora"/>
-                  <a:ea typeface="Lora"/>
-                  <a:cs typeface="Lora"/>
-                  <a:sym typeface="Lora"/>
-                </a:rPr>
-                <a:t>recyclage </a:t>
-              </a:r>
-              <a:r>
-                <a:rPr lang="fr-FR" sz="3600" b="1" dirty="0">
-                  <a:solidFill>
-                    <a:srgbClr val="336600"/>
-                  </a:solidFill>
-                  <a:latin typeface="Lora"/>
-                  <a:ea typeface="Lora"/>
-                  <a:cs typeface="Lora"/>
-                  <a:sym typeface="Lora"/>
-                </a:rPr>
-                <a:t>!</a:t>
+                <a:t>Parlons recyclage !</a:t>
               </a:r>
               <a:endParaRPr sz="3600" b="1" dirty="0">
                 <a:solidFill>
@@ -8581,9 +8460,9 @@
         <p:grpSpPr>
           <a:xfrm>
             <a:off x="10430389" y="6104899"/>
-            <a:ext cx="8168105" cy="3856742"/>
+            <a:ext cx="8600153" cy="3856742"/>
             <a:chOff x="21478347" y="6913926"/>
-            <a:chExt cx="8168105" cy="3856742"/>
+            <a:chExt cx="8600153" cy="3856742"/>
           </a:xfrm>
         </p:grpSpPr>
         <p:sp>
@@ -8676,20 +8555,10 @@
                   <a:latin typeface="Calibri" panose="020F0502020204030204" pitchFamily="34" charset="0"/>
                   <a:cs typeface="Calibri" panose="020F0502020204030204" pitchFamily="34" charset="0"/>
                 </a:rPr>
-                <a:t>Avantages du recyclage du </a:t>
+                <a:t>Avantages du recyclage des métaux</a:t>
               </a:r>
               <a:r>
-                <a:rPr lang="fr-FR" sz="2800" b="1" dirty="0" smtClean="0">
-                  <a:solidFill>
-                    <a:schemeClr val="dk1"/>
-                  </a:solidFill>
-                  <a:latin typeface="Calibri" panose="020F0502020204030204" pitchFamily="34" charset="0"/>
-                  <a:cs typeface="Calibri" panose="020F0502020204030204" pitchFamily="34" charset="0"/>
-                </a:rPr>
-                <a:t>cuivre </a:t>
-              </a:r>
-              <a:r>
-                <a:rPr lang="fr-FR" sz="2800" dirty="0" smtClean="0">
+                <a:rPr lang="fr-FR" sz="2800" dirty="0">
                   <a:solidFill>
                     <a:schemeClr val="dk1"/>
                   </a:solidFill>
@@ -8935,7 +8804,7 @@
           </p:nvSpPr>
           <p:spPr>
             <a:xfrm>
-              <a:off x="21651441" y="6951873"/>
+              <a:off x="22083489" y="6926936"/>
               <a:ext cx="7995011" cy="866919"/>
             </a:xfrm>
             <a:prstGeom prst="rect">
@@ -8971,31 +8840,7 @@
                   <a:cs typeface="Lora"/>
                   <a:sym typeface="Lora"/>
                 </a:rPr>
-                <a:t>Mais voyons, à quoi bon </a:t>
-              </a:r>
-              <a:r>
-                <a:rPr lang="fr-FR" sz="3600" b="1" dirty="0">
-                  <a:solidFill>
-                    <a:srgbClr val="336600"/>
-                  </a:solidFill>
-                  <a:latin typeface="Lora"/>
-                  <a:ea typeface="Lora"/>
-                  <a:cs typeface="Lora"/>
-                  <a:sym typeface="Lora"/>
-                </a:rPr>
-                <a:t>recycler </a:t>
-              </a:r>
-              <a:r>
-                <a:rPr lang="fr-FR" sz="3600" b="1" dirty="0">
-                  <a:solidFill>
-                    <a:srgbClr val="336600"/>
-                  </a:solidFill>
-                  <a:latin typeface="Lora"/>
-                  <a:ea typeface="Lora"/>
-                  <a:cs typeface="Lora"/>
-                  <a:sym typeface="Lora"/>
-                </a:rPr>
-                <a:t>?</a:t>
+                <a:t>Mais voyons, à quoi bon recycler ?</a:t>
               </a:r>
               <a:endParaRPr sz="3600" b="1" dirty="0">
                 <a:solidFill>
@@ -9024,10 +8869,10 @@
         </p:nvGrpSpPr>
         <p:grpSpPr>
           <a:xfrm>
-            <a:off x="18665899" y="6091001"/>
-            <a:ext cx="11274900" cy="5361665"/>
-            <a:chOff x="10217235" y="6823536"/>
-            <a:chExt cx="11274900" cy="5132573"/>
+            <a:off x="18665898" y="6056083"/>
+            <a:ext cx="12079390" cy="5396583"/>
+            <a:chOff x="10217234" y="6790110"/>
+            <a:chExt cx="12079390" cy="5165999"/>
           </a:xfrm>
         </p:grpSpPr>
         <p:sp>
@@ -9044,8 +8889,8 @@
           </p:nvSpPr>
           <p:spPr>
             <a:xfrm>
-              <a:off x="10217235" y="6823536"/>
-              <a:ext cx="11274900" cy="5132573"/>
+              <a:off x="10217234" y="6823536"/>
+              <a:ext cx="11494141" cy="5132573"/>
             </a:xfrm>
             <a:prstGeom prst="roundRect">
               <a:avLst>
@@ -9137,27 +8982,7 @@
                   <a:latin typeface="Calibri" panose="020F0502020204030204" pitchFamily="34" charset="0"/>
                   <a:cs typeface="Calibri" panose="020F0502020204030204" pitchFamily="34" charset="0"/>
                 </a:rPr>
-                <a:t>2 procédés de transformation des </a:t>
-              </a:r>
-              <a:r>
-                <a:rPr lang="fr-FR" sz="2400" b="1" u="sng" dirty="0" smtClean="0">
-                  <a:solidFill>
-                    <a:schemeClr val="dk1"/>
-                  </a:solidFill>
-                  <a:latin typeface="Calibri" panose="020F0502020204030204" pitchFamily="34" charset="0"/>
-                  <a:cs typeface="Calibri" panose="020F0502020204030204" pitchFamily="34" charset="0"/>
-                </a:rPr>
-                <a:t>métaux</a:t>
-              </a:r>
-              <a:r>
-                <a:rPr lang="fr-FR" sz="2400" dirty="0" smtClean="0">
-                  <a:solidFill>
-                    <a:schemeClr val="dk1"/>
-                  </a:solidFill>
-                  <a:latin typeface="Calibri" panose="020F0502020204030204" pitchFamily="34" charset="0"/>
-                  <a:cs typeface="Calibri" panose="020F0502020204030204" pitchFamily="34" charset="0"/>
-                </a:rPr>
-                <a:t>, comme </a:t>
+                <a:t>2 procédés de transformation des métaux</a:t>
               </a:r>
               <a:r>
                 <a:rPr lang="fr-FR" sz="2400" dirty="0">
@@ -9167,27 +8992,7 @@
                   <a:latin typeface="Calibri" panose="020F0502020204030204" pitchFamily="34" charset="0"/>
                   <a:cs typeface="Calibri" panose="020F0502020204030204" pitchFamily="34" charset="0"/>
                 </a:rPr>
-                <a:t>le </a:t>
-              </a:r>
-              <a:r>
-                <a:rPr lang="fr-FR" sz="2400" dirty="0" smtClean="0">
-                  <a:solidFill>
-                    <a:schemeClr val="dk1"/>
-                  </a:solidFill>
-                  <a:latin typeface="Calibri" panose="020F0502020204030204" pitchFamily="34" charset="0"/>
-                  <a:cs typeface="Calibri" panose="020F0502020204030204" pitchFamily="34" charset="0"/>
-                </a:rPr>
-                <a:t>cuivre </a:t>
-              </a:r>
-              <a:r>
-                <a:rPr lang="fr-FR" sz="2400" dirty="0">
-                  <a:solidFill>
-                    <a:schemeClr val="dk1"/>
-                  </a:solidFill>
-                  <a:latin typeface="Calibri" panose="020F0502020204030204" pitchFamily="34" charset="0"/>
-                  <a:cs typeface="Calibri" panose="020F0502020204030204" pitchFamily="34" charset="0"/>
-                </a:rPr>
-                <a:t>: </a:t>
+                <a:t>, comme le cuivre : </a:t>
               </a:r>
               <a:endParaRPr sz="2400" dirty="0">
                 <a:solidFill>
@@ -9266,7 +9071,7 @@
                 <a:t> </a:t>
               </a:r>
               <a:r>
-                <a:rPr lang="fr-FR" sz="2400" dirty="0" smtClean="0">
+                <a:rPr lang="fr-FR" sz="2400" dirty="0">
                   <a:solidFill>
                     <a:schemeClr val="dk1"/>
                   </a:solidFill>
@@ -9276,7 +9081,7 @@
                 <a:t>(« </a:t>
               </a:r>
               <a:r>
-                <a:rPr lang="fr-FR" sz="2400" dirty="0" err="1" smtClean="0">
+                <a:rPr lang="fr-FR" sz="2400" dirty="0" err="1">
                   <a:solidFill>
                     <a:schemeClr val="dk1"/>
                   </a:solidFill>
@@ -9286,26 +9091,6 @@
                 <a:t>refining</a:t>
               </a:r>
               <a:r>
-                <a:rPr lang="fr-FR" sz="2400" dirty="0" smtClean="0">
-                  <a:solidFill>
-                    <a:schemeClr val="dk1"/>
-                  </a:solidFill>
-                  <a:latin typeface="Calibri" panose="020F0502020204030204" pitchFamily="34" charset="0"/>
-                  <a:cs typeface="Calibri" panose="020F0502020204030204" pitchFamily="34" charset="0"/>
-                </a:rPr>
-                <a:t> »</a:t>
-              </a:r>
-              <a:r>
-                <a:rPr lang="fr-FR" sz="2400" dirty="0" smtClean="0">
-                  <a:solidFill>
-                    <a:schemeClr val="dk1"/>
-                  </a:solidFill>
-                  <a:latin typeface="Calibri" panose="020F0502020204030204" pitchFamily="34" charset="0"/>
-                  <a:cs typeface="Calibri" panose="020F0502020204030204" pitchFamily="34" charset="0"/>
-                </a:rPr>
-                <a:t>) </a:t>
-              </a:r>
-              <a:r>
                 <a:rPr lang="fr-FR" sz="2400" dirty="0">
                   <a:solidFill>
                     <a:schemeClr val="dk1"/>
@@ -9313,7 +9098,7 @@
                   <a:latin typeface="Calibri" panose="020F0502020204030204" pitchFamily="34" charset="0"/>
                   <a:cs typeface="Calibri" panose="020F0502020204030204" pitchFamily="34" charset="0"/>
                 </a:rPr>
-                <a:t>: à partir d’un </a:t>
+                <a:t> ») : à partir d’un </a:t>
               </a:r>
               <a:r>
                 <a:rPr lang="fr-FR" sz="2400" b="1" dirty="0">
@@ -9386,20 +9171,10 @@
                   <a:latin typeface="Calibri" panose="020F0502020204030204" pitchFamily="34" charset="0"/>
                   <a:cs typeface="Calibri" panose="020F0502020204030204" pitchFamily="34" charset="0"/>
                 </a:rPr>
-                <a:t> </a:t>
+                <a:t> (« </a:t>
               </a:r>
               <a:r>
-                <a:rPr lang="fr-FR" sz="2400" dirty="0" smtClean="0">
-                  <a:solidFill>
-                    <a:schemeClr val="dk1"/>
-                  </a:solidFill>
-                  <a:latin typeface="Calibri" panose="020F0502020204030204" pitchFamily="34" charset="0"/>
-                  <a:cs typeface="Calibri" panose="020F0502020204030204" pitchFamily="34" charset="0"/>
-                </a:rPr>
-                <a:t>(« </a:t>
-              </a:r>
-              <a:r>
-                <a:rPr lang="fr-FR" sz="2400" dirty="0" err="1" smtClean="0">
+                <a:rPr lang="fr-FR" sz="2400" dirty="0" err="1">
                   <a:solidFill>
                     <a:schemeClr val="dk1"/>
                   </a:solidFill>
@@ -9409,26 +9184,6 @@
                 <a:t>smelting</a:t>
               </a:r>
               <a:r>
-                <a:rPr lang="fr-FR" sz="2400" dirty="0" smtClean="0">
-                  <a:solidFill>
-                    <a:schemeClr val="dk1"/>
-                  </a:solidFill>
-                  <a:latin typeface="Calibri" panose="020F0502020204030204" pitchFamily="34" charset="0"/>
-                  <a:cs typeface="Calibri" panose="020F0502020204030204" pitchFamily="34" charset="0"/>
-                </a:rPr>
-                <a:t> »</a:t>
-              </a:r>
-              <a:r>
-                <a:rPr lang="fr-FR" sz="2400" dirty="0" smtClean="0">
-                  <a:solidFill>
-                    <a:schemeClr val="dk1"/>
-                  </a:solidFill>
-                  <a:latin typeface="Calibri" panose="020F0502020204030204" pitchFamily="34" charset="0"/>
-                  <a:cs typeface="Calibri" panose="020F0502020204030204" pitchFamily="34" charset="0"/>
-                </a:rPr>
-                <a:t>) </a:t>
-              </a:r>
-              <a:r>
                 <a:rPr lang="fr-FR" sz="2400" dirty="0">
                   <a:solidFill>
                     <a:schemeClr val="dk1"/>
@@ -9436,7 +9191,7 @@
                   <a:latin typeface="Calibri" panose="020F0502020204030204" pitchFamily="34" charset="0"/>
                   <a:cs typeface="Calibri" panose="020F0502020204030204" pitchFamily="34" charset="0"/>
                 </a:rPr>
-                <a:t>: à partir de </a:t>
+                <a:t> ») : à partir de </a:t>
               </a:r>
               <a:r>
                 <a:rPr lang="fr-FR" sz="2400" b="1" dirty="0">
@@ -9456,17 +9211,7 @@
                   <a:latin typeface="Calibri" panose="020F0502020204030204" pitchFamily="34" charset="0"/>
                   <a:cs typeface="Calibri" panose="020F0502020204030204" pitchFamily="34" charset="0"/>
                 </a:rPr>
-                <a:t>(cuivre métallique, matière première de recyclage</a:t>
-              </a:r>
-              <a:r>
-                <a:rPr lang="fr-FR" sz="2400" dirty="0" smtClean="0">
-                  <a:solidFill>
-                    <a:schemeClr val="dk1"/>
-                  </a:solidFill>
-                  <a:latin typeface="Calibri" panose="020F0502020204030204" pitchFamily="34" charset="0"/>
-                  <a:cs typeface="Calibri" panose="020F0502020204030204" pitchFamily="34" charset="0"/>
-                </a:rPr>
-                <a:t>)</a:t>
+                <a:t>(cuivre métallique, matière première de recyclage)</a:t>
               </a:r>
             </a:p>
             <a:p>
@@ -9513,17 +9258,7 @@
                   <a:latin typeface="Calibri" panose="020F0502020204030204" pitchFamily="34" charset="0"/>
                   <a:cs typeface="Calibri" panose="020F0502020204030204" pitchFamily="34" charset="0"/>
                 </a:rPr>
-                <a:t>L’utilisation de ces procédés pour le recyclage n’a pas toujours </a:t>
-              </a:r>
-              <a:r>
-                <a:rPr lang="fr-FR" sz="2400" dirty="0" smtClean="0">
-                  <a:solidFill>
-                    <a:schemeClr val="dk1"/>
-                  </a:solidFill>
-                  <a:latin typeface="Calibri" panose="020F0502020204030204" pitchFamily="34" charset="0"/>
-                  <a:cs typeface="Calibri" panose="020F0502020204030204" pitchFamily="34" charset="0"/>
-                </a:rPr>
-                <a:t>de </a:t>
+                <a:t>L’utilisation de ces procédés pour le recyclage n’a pas toujours de </a:t>
               </a:r>
               <a:r>
                 <a:rPr lang="fr-FR" sz="2400" b="1" dirty="0">
@@ -9543,20 +9278,10 @@
                   <a:latin typeface="Calibri" panose="020F0502020204030204" pitchFamily="34" charset="0"/>
                   <a:cs typeface="Calibri" panose="020F0502020204030204" pitchFamily="34" charset="0"/>
                 </a:rPr>
-                <a:t>intéressante en </a:t>
+                <a:t>intéressante en France </a:t>
               </a:r>
               <a:r>
-                <a:rPr lang="fr-FR" sz="2400" dirty="0" smtClean="0">
-                  <a:solidFill>
-                    <a:schemeClr val="dk1"/>
-                  </a:solidFill>
-                  <a:latin typeface="Calibri" panose="020F0502020204030204" pitchFamily="34" charset="0"/>
-                  <a:cs typeface="Calibri" panose="020F0502020204030204" pitchFamily="34" charset="0"/>
-                </a:rPr>
-                <a:t>France </a:t>
-              </a:r>
-              <a:r>
-                <a:rPr lang="fr-FR" sz="2400" dirty="0" smtClean="0">
+                <a:rPr lang="fr-FR" sz="2400" dirty="0">
                   <a:solidFill>
                     <a:schemeClr val="dk1"/>
                   </a:solidFill>
@@ -9567,7 +9292,7 @@
                 <a:t> l</a:t>
               </a:r>
               <a:r>
-                <a:rPr lang="fr-FR" sz="2400" dirty="0" smtClean="0">
+                <a:rPr lang="fr-FR" sz="2400" dirty="0">
                   <a:solidFill>
                     <a:schemeClr val="dk1"/>
                   </a:solidFill>
@@ -9594,57 +9319,7 @@
                   <a:latin typeface="Calibri" panose="020F0502020204030204" pitchFamily="34" charset="0"/>
                   <a:cs typeface="Calibri" panose="020F0502020204030204" pitchFamily="34" charset="0"/>
                 </a:rPr>
-                <a:t>sont plus importantes que les importations correspondantes </a:t>
-              </a:r>
-              <a:r>
-                <a:rPr lang="fr-FR" sz="2400" dirty="0" smtClean="0">
-                  <a:solidFill>
-                    <a:schemeClr val="dk1"/>
-                  </a:solidFill>
-                  <a:latin typeface="Calibri" panose="020F0502020204030204" pitchFamily="34" charset="0"/>
-                  <a:cs typeface="Calibri" panose="020F0502020204030204" pitchFamily="34" charset="0"/>
-                </a:rPr>
-                <a:t>: 179 </a:t>
-              </a:r>
-              <a:r>
-                <a:rPr lang="fr-FR" sz="2400" dirty="0" err="1" smtClean="0">
-                  <a:solidFill>
-                    <a:schemeClr val="dk1"/>
-                  </a:solidFill>
-                  <a:latin typeface="Calibri" panose="020F0502020204030204" pitchFamily="34" charset="0"/>
-                  <a:cs typeface="Calibri" panose="020F0502020204030204" pitchFamily="34" charset="0"/>
-                </a:rPr>
-                <a:t>kt</a:t>
-              </a:r>
-              <a:r>
-                <a:rPr lang="fr-FR" sz="2400" dirty="0" smtClean="0">
-                  <a:solidFill>
-                    <a:schemeClr val="dk1"/>
-                  </a:solidFill>
-                  <a:latin typeface="Calibri" panose="020F0502020204030204" pitchFamily="34" charset="0"/>
-                  <a:cs typeface="Calibri" panose="020F0502020204030204" pitchFamily="34" charset="0"/>
-                </a:rPr>
-                <a:t> vs </a:t>
-              </a:r>
-              <a:r>
-                <a:rPr lang="fr-FR" sz="2400" dirty="0">
-                  <a:solidFill>
-                    <a:schemeClr val="dk1"/>
-                  </a:solidFill>
-                  <a:latin typeface="Calibri" panose="020F0502020204030204" pitchFamily="34" charset="0"/>
-                  <a:cs typeface="Calibri" panose="020F0502020204030204" pitchFamily="34" charset="0"/>
-                </a:rPr>
-                <a:t>55 kt pour le </a:t>
-              </a:r>
-              <a:r>
-                <a:rPr lang="fr-FR" sz="2400" dirty="0" smtClean="0">
-                  <a:solidFill>
-                    <a:schemeClr val="dk1"/>
-                  </a:solidFill>
-                  <a:latin typeface="Calibri" panose="020F0502020204030204" pitchFamily="34" charset="0"/>
-                  <a:cs typeface="Calibri" panose="020F0502020204030204" pitchFamily="34" charset="0"/>
-                </a:rPr>
-                <a:t>cuivre</a:t>
+                <a:t>sont plus importantes que les importations correspondantes : 179 kt contre 55 kt pour le cuivre</a:t>
               </a:r>
               <a:endParaRPr sz="8800" dirty="0">
                 <a:latin typeface="Calibri" panose="020F0502020204030204" pitchFamily="34" charset="0"/>
@@ -9667,7 +9342,7 @@
           </p:nvSpPr>
           <p:spPr>
             <a:xfrm>
-              <a:off x="11341117" y="6860190"/>
+              <a:off x="12472811" y="6790110"/>
               <a:ext cx="9823813" cy="773786"/>
             </a:xfrm>
             <a:prstGeom prst="rect">
@@ -9733,9 +9408,9 @@
         <p:grpSpPr>
           <a:xfrm>
             <a:off x="251294" y="11633873"/>
-            <a:ext cx="10326504" cy="8466012"/>
+            <a:ext cx="10905239" cy="8466012"/>
             <a:chOff x="8010000" y="17212713"/>
-            <a:chExt cx="10955919" cy="8707490"/>
+            <a:chExt cx="11569929" cy="8707490"/>
           </a:xfrm>
         </p:grpSpPr>
         <p:sp>
@@ -9853,27 +9528,7 @@
                   <a:latin typeface="Calibri" panose="020F0502020204030204" pitchFamily="34" charset="0"/>
                   <a:cs typeface="Calibri" panose="020F0502020204030204" pitchFamily="34" charset="0"/>
                 </a:rPr>
-                <a:t> de cuivre dans le monde </a:t>
-              </a:r>
-              <a:r>
-                <a:rPr lang="fr-FR" sz="2400" dirty="0" smtClean="0">
-                  <a:solidFill>
-                    <a:schemeClr val="dk1"/>
-                  </a:solidFill>
-                  <a:latin typeface="Calibri" panose="020F0502020204030204" pitchFamily="34" charset="0"/>
-                  <a:cs typeface="Calibri" panose="020F0502020204030204" pitchFamily="34" charset="0"/>
-                </a:rPr>
-                <a:t>(2019) </a:t>
-              </a:r>
-              <a:r>
-                <a:rPr lang="fr-FR" sz="2400" dirty="0">
-                  <a:solidFill>
-                    <a:schemeClr val="dk1"/>
-                  </a:solidFill>
-                  <a:latin typeface="Calibri" panose="020F0502020204030204" pitchFamily="34" charset="0"/>
-                  <a:cs typeface="Calibri" panose="020F0502020204030204" pitchFamily="34" charset="0"/>
-                </a:rPr>
-                <a:t>: </a:t>
+                <a:t> de cuivre dans le monde (2019) : </a:t>
               </a:r>
               <a:r>
                 <a:rPr lang="fr-FR" sz="2400" b="1" dirty="0">
@@ -9883,19 +9538,9 @@
                   <a:latin typeface="Calibri" panose="020F0502020204030204" pitchFamily="34" charset="0"/>
                   <a:cs typeface="Calibri" panose="020F0502020204030204" pitchFamily="34" charset="0"/>
                 </a:rPr>
-                <a:t>20,5 </a:t>
+                <a:t>20,5 Mt</a:t>
               </a:r>
-              <a:r>
-                <a:rPr lang="fr-FR" sz="2400" b="1" dirty="0" smtClean="0">
-                  <a:solidFill>
-                    <a:schemeClr val="dk1"/>
-                  </a:solidFill>
-                  <a:latin typeface="Calibri" panose="020F0502020204030204" pitchFamily="34" charset="0"/>
-                  <a:cs typeface="Calibri" panose="020F0502020204030204" pitchFamily="34" charset="0"/>
-                </a:rPr>
-                <a:t>Mt</a:t>
-              </a:r>
-              <a:endParaRPr sz="2400" b="1" dirty="0" smtClean="0">
+              <a:endParaRPr sz="2400" b="1" dirty="0">
                 <a:solidFill>
                   <a:schemeClr val="dk1"/>
                 </a:solidFill>
@@ -9918,7 +9563,7 @@
                 <a:buFont typeface="Arial"/>
                 <a:buNone/>
               </a:pPr>
-              <a:endParaRPr sz="2400" dirty="0" smtClean="0">
+              <a:endParaRPr sz="2400" dirty="0">
                 <a:solidFill>
                   <a:schemeClr val="dk1"/>
                 </a:solidFill>
@@ -9941,16 +9586,6 @@
                 <a:buChar char="●"/>
               </a:pPr>
               <a:r>
-                <a:rPr lang="fr-FR" sz="2400" b="1" u="sng" dirty="0" smtClean="0">
-                  <a:solidFill>
-                    <a:schemeClr val="dk1"/>
-                  </a:solidFill>
-                  <a:latin typeface="Calibri" panose="020F0502020204030204" pitchFamily="34" charset="0"/>
-                  <a:cs typeface="Calibri" panose="020F0502020204030204" pitchFamily="34" charset="0"/>
-                </a:rPr>
-                <a:t>Réserves </a:t>
-              </a:r>
-              <a:r>
                 <a:rPr lang="fr-FR" sz="2400" b="1" u="sng" dirty="0">
                   <a:solidFill>
                     <a:schemeClr val="dk1"/>
@@ -9958,7 +9593,7 @@
                   <a:latin typeface="Calibri" panose="020F0502020204030204" pitchFamily="34" charset="0"/>
                   <a:cs typeface="Calibri" panose="020F0502020204030204" pitchFamily="34" charset="0"/>
                 </a:rPr>
-                <a:t>actuelles</a:t>
+                <a:t>Réserves actuelles</a:t>
               </a:r>
               <a:r>
                 <a:rPr lang="fr-FR" sz="2400" b="1" dirty="0">
@@ -9978,27 +9613,7 @@
                   <a:latin typeface="Calibri" panose="020F0502020204030204" pitchFamily="34" charset="0"/>
                   <a:cs typeface="Calibri" panose="020F0502020204030204" pitchFamily="34" charset="0"/>
                 </a:rPr>
-                <a:t>(gisements découverts et jugés </a:t>
-              </a:r>
-              <a:r>
-                <a:rPr lang="fr-FR" sz="2400" dirty="0" smtClean="0">
-                  <a:solidFill>
-                    <a:schemeClr val="dk1"/>
-                  </a:solidFill>
-                  <a:latin typeface="Calibri" panose="020F0502020204030204" pitchFamily="34" charset="0"/>
-                  <a:cs typeface="Calibri" panose="020F0502020204030204" pitchFamily="34" charset="0"/>
-                </a:rPr>
-                <a:t>rentables, </a:t>
-              </a:r>
-              <a:r>
-                <a:rPr lang="fr-FR" sz="2400" dirty="0">
-                  <a:solidFill>
-                    <a:schemeClr val="dk1"/>
-                  </a:solidFill>
-                  <a:latin typeface="Calibri" panose="020F0502020204030204" pitchFamily="34" charset="0"/>
-                  <a:cs typeface="Calibri" panose="020F0502020204030204" pitchFamily="34" charset="0"/>
-                </a:rPr>
-                <a:t>2019) : environ </a:t>
+                <a:t>(gisements découverts et jugés rentables, 2019) : environ </a:t>
               </a:r>
               <a:r>
                 <a:rPr lang="fr-FR" sz="2400" b="1" dirty="0">
@@ -10008,19 +9623,9 @@
                   <a:latin typeface="Calibri" panose="020F0502020204030204" pitchFamily="34" charset="0"/>
                   <a:cs typeface="Calibri" panose="020F0502020204030204" pitchFamily="34" charset="0"/>
                 </a:rPr>
-                <a:t>830 </a:t>
+                <a:t>830 Mt</a:t>
               </a:r>
-              <a:r>
-                <a:rPr lang="fr-FR" sz="2400" b="1" dirty="0" smtClean="0">
-                  <a:solidFill>
-                    <a:schemeClr val="dk1"/>
-                  </a:solidFill>
-                  <a:latin typeface="Calibri" panose="020F0502020204030204" pitchFamily="34" charset="0"/>
-                  <a:cs typeface="Calibri" panose="020F0502020204030204" pitchFamily="34" charset="0"/>
-                </a:rPr>
-                <a:t>Mt</a:t>
-              </a:r>
-              <a:endParaRPr sz="2400" b="1" dirty="0" smtClean="0">
+              <a:endParaRPr sz="2400" b="1" dirty="0">
                 <a:solidFill>
                   <a:schemeClr val="dk1"/>
                 </a:solidFill>
@@ -10038,7 +9643,7 @@
                 </a:spcAft>
                 <a:buNone/>
               </a:pPr>
-              <a:endParaRPr sz="2400" dirty="0" smtClean="0">
+              <a:endParaRPr sz="2400" dirty="0">
                 <a:solidFill>
                   <a:schemeClr val="dk1"/>
                 </a:solidFill>
@@ -10061,18 +9666,11 @@
                 <a:buChar char="●"/>
               </a:pPr>
               <a:r>
-                <a:rPr lang="fr-FR" sz="2400" b="1" u="sng" dirty="0" smtClean="0">
-                  <a:latin typeface="Calibri" panose="020F0502020204030204" pitchFamily="34" charset="0"/>
-                  <a:cs typeface="Calibri" panose="020F0502020204030204" pitchFamily="34" charset="0"/>
-                </a:rPr>
-                <a:t>Ressources </a:t>
-              </a:r>
-              <a:r>
                 <a:rPr lang="fr-FR" sz="2400" b="1" u="sng" dirty="0">
                   <a:latin typeface="Calibri" panose="020F0502020204030204" pitchFamily="34" charset="0"/>
                   <a:cs typeface="Calibri" panose="020F0502020204030204" pitchFamily="34" charset="0"/>
                 </a:rPr>
-                <a:t>mondiales</a:t>
+                <a:t>Ressources mondiales</a:t>
               </a:r>
               <a:r>
                 <a:rPr lang="fr-FR" sz="2400" b="1" dirty="0">
@@ -10086,21 +9684,7 @@
                   <a:latin typeface="Calibri" panose="020F0502020204030204" pitchFamily="34" charset="0"/>
                   <a:cs typeface="Calibri" panose="020F0502020204030204" pitchFamily="34" charset="0"/>
                 </a:rPr>
-                <a:t>(réserves </a:t>
-              </a:r>
-              <a:r>
-                <a:rPr lang="fr-FR" sz="2400" dirty="0" smtClean="0">
-                  <a:latin typeface="Calibri" panose="020F0502020204030204" pitchFamily="34" charset="0"/>
-                  <a:cs typeface="Calibri" panose="020F0502020204030204" pitchFamily="34" charset="0"/>
-                </a:rPr>
-                <a:t>et </a:t>
-              </a:r>
-              <a:r>
-                <a:rPr lang="fr-FR" sz="2400" dirty="0">
-                  <a:latin typeface="Calibri" panose="020F0502020204030204" pitchFamily="34" charset="0"/>
-                  <a:cs typeface="Calibri" panose="020F0502020204030204" pitchFamily="34" charset="0"/>
-                </a:rPr>
-                <a:t>gisements potentiels pas encore exploités en 2019) : </a:t>
+                <a:t>(réserves et gisements potentiels pas encore exploités en 2019) : </a:t>
               </a:r>
               <a:r>
                 <a:rPr lang="fr-FR" sz="2400" b="1" dirty="0">
@@ -10109,10 +9693,6 @@
                 </a:rPr>
                 <a:t>2 000 Mt </a:t>
               </a:r>
-              <a:endParaRPr lang="fr-FR" sz="2400" b="1" dirty="0" smtClean="0">
-                <a:latin typeface="Calibri" panose="020F0502020204030204" pitchFamily="34" charset="0"/>
-                <a:cs typeface="Calibri" panose="020F0502020204030204" pitchFamily="34" charset="0"/>
-              </a:endParaRPr>
             </a:p>
             <a:p>
               <a:pPr marL="457200" lvl="0" indent="-381000" algn="just" rtl="0">
@@ -10151,16 +9731,6 @@
                 <a:buChar char="●"/>
               </a:pPr>
               <a:r>
-                <a:rPr lang="fr-FR" sz="2400" b="1" dirty="0" smtClean="0">
-                  <a:solidFill>
-                    <a:schemeClr val="dk1"/>
-                  </a:solidFill>
-                  <a:latin typeface="Calibri" panose="020F0502020204030204" pitchFamily="34" charset="0"/>
-                  <a:cs typeface="Calibri" panose="020F0502020204030204" pitchFamily="34" charset="0"/>
-                </a:rPr>
-                <a:t>2 / 3 des </a:t>
-              </a:r>
-              <a:r>
                 <a:rPr lang="fr-FR" sz="2400" b="1" dirty="0">
                   <a:solidFill>
                     <a:schemeClr val="dk1"/>
@@ -10168,7 +9738,7 @@
                   <a:latin typeface="Calibri" panose="020F0502020204030204" pitchFamily="34" charset="0"/>
                   <a:cs typeface="Calibri" panose="020F0502020204030204" pitchFamily="34" charset="0"/>
                 </a:rPr>
-                <a:t>550 millions de tonnes de cuivre produites depuis 1900</a:t>
+                <a:t>2/3 des 550 millions de tonnes de cuivre produites depuis 1900</a:t>
               </a:r>
               <a:r>
                 <a:rPr lang="fr-FR" sz="2400" dirty="0">
@@ -10188,17 +9758,7 @@
                   <a:latin typeface="Calibri" panose="020F0502020204030204" pitchFamily="34" charset="0"/>
                   <a:cs typeface="Calibri" panose="020F0502020204030204" pitchFamily="34" charset="0"/>
                 </a:rPr>
-                <a:t>encore </a:t>
-              </a:r>
-              <a:r>
-                <a:rPr lang="fr-FR" sz="2400" b="1" u="sng" dirty="0" smtClean="0">
-                  <a:solidFill>
-                    <a:schemeClr val="dk1"/>
-                  </a:solidFill>
-                  <a:latin typeface="Calibri" panose="020F0502020204030204" pitchFamily="34" charset="0"/>
-                  <a:cs typeface="Calibri" panose="020F0502020204030204" pitchFamily="34" charset="0"/>
-                </a:rPr>
-                <a:t>utilisées</a:t>
+                <a:t>encore utilisées</a:t>
               </a:r>
             </a:p>
             <a:p>
@@ -10216,7 +9776,7 @@
                 <a:buFont typeface="Arial"/>
                 <a:buNone/>
               </a:pPr>
-              <a:endParaRPr sz="2400" dirty="0" smtClean="0">
+              <a:endParaRPr sz="2400" dirty="0">
                 <a:solidFill>
                   <a:schemeClr val="dk1"/>
                 </a:solidFill>
@@ -10276,19 +9836,9 @@
                   <a:latin typeface="Calibri" panose="020F0502020204030204" pitchFamily="34" charset="0"/>
                   <a:cs typeface="Calibri" panose="020F0502020204030204" pitchFamily="34" charset="0"/>
                 </a:rPr>
-                <a:t>depuis 1960 (5 à 18 millions de tonnes</a:t>
+                <a:t>depuis 1960 (5 à 18 millions de tonnes)</a:t>
               </a:r>
-              <a:r>
-                <a:rPr lang="fr-FR" sz="2400" dirty="0" smtClean="0">
-                  <a:solidFill>
-                    <a:schemeClr val="dk1"/>
-                  </a:solidFill>
-                  <a:latin typeface="Calibri" panose="020F0502020204030204" pitchFamily="34" charset="0"/>
-                  <a:cs typeface="Calibri" panose="020F0502020204030204" pitchFamily="34" charset="0"/>
-                </a:rPr>
-                <a:t>)</a:t>
-              </a:r>
-              <a:endParaRPr sz="2400" dirty="0" smtClean="0">
+              <a:endParaRPr sz="2400" dirty="0">
                 <a:solidFill>
                   <a:schemeClr val="dk1"/>
                 </a:solidFill>
@@ -10311,7 +9861,7 @@
                 <a:buFont typeface="Arial"/>
                 <a:buNone/>
               </a:pPr>
-              <a:endParaRPr sz="2400" dirty="0" smtClean="0">
+              <a:endParaRPr sz="2400" dirty="0">
                 <a:solidFill>
                   <a:schemeClr val="dk1"/>
                 </a:solidFill>
@@ -10334,16 +9884,6 @@
                 <a:buChar char="●"/>
               </a:pPr>
               <a:r>
-                <a:rPr lang="fr-FR" sz="2400" b="1" dirty="0" smtClean="0">
-                  <a:solidFill>
-                    <a:schemeClr val="dk1"/>
-                  </a:solidFill>
-                  <a:latin typeface="Calibri" panose="020F0502020204030204" pitchFamily="34" charset="0"/>
-                  <a:cs typeface="Calibri" panose="020F0502020204030204" pitchFamily="34" charset="0"/>
-                </a:rPr>
-                <a:t>41,5</a:t>
-              </a:r>
-              <a:r>
                 <a:rPr lang="fr-FR" sz="2400" b="1" dirty="0">
                   <a:solidFill>
                     <a:schemeClr val="dk1"/>
@@ -10351,7 +9891,7 @@
                   <a:latin typeface="Calibri" panose="020F0502020204030204" pitchFamily="34" charset="0"/>
                   <a:cs typeface="Calibri" panose="020F0502020204030204" pitchFamily="34" charset="0"/>
                 </a:rPr>
-                <a:t>%</a:t>
+                <a:t>41,5%</a:t>
               </a:r>
               <a:r>
                 <a:rPr lang="fr-FR" sz="2400" dirty="0">
@@ -10374,16 +9914,6 @@
                 <a:t>provient du recyclage </a:t>
               </a:r>
               <a:r>
-                <a:rPr lang="fr-FR" sz="2400" dirty="0" smtClean="0">
-                  <a:solidFill>
-                    <a:schemeClr val="dk1"/>
-                  </a:solidFill>
-                  <a:latin typeface="Calibri" panose="020F0502020204030204" pitchFamily="34" charset="0"/>
-                  <a:cs typeface="Calibri" panose="020F0502020204030204" pitchFamily="34" charset="0"/>
-                </a:rPr>
-                <a:t>(ce </a:t>
-              </a:r>
-              <a:r>
                 <a:rPr lang="fr-FR" sz="2400" dirty="0">
                   <a:solidFill>
                     <a:schemeClr val="dk1"/>
@@ -10391,17 +9921,7 @@
                   <a:latin typeface="Calibri" panose="020F0502020204030204" pitchFamily="34" charset="0"/>
                   <a:cs typeface="Calibri" panose="020F0502020204030204" pitchFamily="34" charset="0"/>
                 </a:rPr>
-                <a:t>qui représente entre 2 et 3 millions de </a:t>
-              </a:r>
-              <a:r>
-                <a:rPr lang="fr-FR" sz="2400" dirty="0" smtClean="0">
-                  <a:solidFill>
-                    <a:schemeClr val="dk1"/>
-                  </a:solidFill>
-                  <a:latin typeface="Calibri" panose="020F0502020204030204" pitchFamily="34" charset="0"/>
-                  <a:cs typeface="Calibri" panose="020F0502020204030204" pitchFamily="34" charset="0"/>
-                </a:rPr>
-                <a:t>tonnes)</a:t>
+                <a:t>(ce qui représente entre 2 et 3 millions de tonnes)</a:t>
               </a:r>
               <a:endParaRPr sz="8000" dirty="0">
                 <a:latin typeface="Calibri" panose="020F0502020204030204" pitchFamily="34" charset="0"/>
@@ -10424,7 +9944,7 @@
           </p:nvSpPr>
           <p:spPr>
             <a:xfrm>
-              <a:off x="8910819" y="17383075"/>
+              <a:off x="9524829" y="17382324"/>
               <a:ext cx="10055100" cy="1093200"/>
             </a:xfrm>
             <a:prstGeom prst="rect">
@@ -10607,8 +10127,8 @@
             </p:nvSpPr>
             <p:spPr>
               <a:xfrm>
-                <a:off x="20568702" y="15052271"/>
-                <a:ext cx="7897800" cy="1026000"/>
+                <a:off x="20833190" y="14939305"/>
+                <a:ext cx="4763682" cy="1026000"/>
               </a:xfrm>
               <a:prstGeom prst="rect">
                 <a:avLst/>
@@ -10643,7 +10163,7 @@
                     <a:cs typeface="Lora"/>
                     <a:sym typeface="Lora"/>
                   </a:rPr>
-                  <a:t>C’est pas si simple ...</a:t>
+                  <a:t>Ce n’est pas si simple ...</a:t>
                 </a:r>
                 <a:endParaRPr sz="3600" b="1" dirty="0">
                   <a:solidFill>
@@ -11352,53 +10872,6 @@
           </a:p>
         </p:txBody>
       </p:sp>
-      <p:pic>
-        <p:nvPicPr>
-          <p:cNvPr id="1028" name="Picture 4">
-            <a:extLst>
-              <a:ext uri="{FF2B5EF4-FFF2-40B4-BE49-F238E27FC236}">
-                <a16:creationId xmlns:a16="http://schemas.microsoft.com/office/drawing/2014/main" id="{BF7BF24D-050D-4576-9CF0-724E6AF9042E}"/>
-              </a:ext>
-            </a:extLst>
-          </p:cNvPr>
-          <p:cNvPicPr>
-            <a:picLocks noChangeAspect="1" noChangeArrowheads="1"/>
-          </p:cNvPicPr>
-          <p:nvPr/>
-        </p:nvPicPr>
-        <p:blipFill>
-          <a:blip r:embed="rId15">
-            <a:extLst>
-              <a:ext uri="{28A0092B-C50C-407E-A947-70E740481C1C}">
-                <a14:useLocalDpi xmlns:a14="http://schemas.microsoft.com/office/drawing/2010/main" val="0"/>
-              </a:ext>
-            </a:extLst>
-          </a:blip>
-          <a:srcRect/>
-          <a:stretch>
-            <a:fillRect/>
-          </a:stretch>
-        </p:blipFill>
-        <p:spPr bwMode="auto">
-          <a:xfrm>
-            <a:off x="17413108" y="29181126"/>
-            <a:ext cx="11192375" cy="8394281"/>
-          </a:xfrm>
-          <a:prstGeom prst="rect">
-            <a:avLst/>
-          </a:prstGeom>
-          <a:noFill/>
-          <a:extLst>
-            <a:ext uri="{909E8E84-426E-40DD-AFC4-6F175D3DCCD1}">
-              <a14:hiddenFill xmlns:a14="http://schemas.microsoft.com/office/drawing/2010/main">
-                <a:solidFill>
-                  <a:srgbClr val="FFFFFF"/>
-                </a:solidFill>
-              </a14:hiddenFill>
-            </a:ext>
-          </a:extLst>
-        </p:spPr>
-      </p:pic>
       <p:sp>
         <p:nvSpPr>
           <p:cNvPr id="5" name="Ellipse 4"/>
@@ -11474,8 +10947,8 @@
         </p:nvSpPr>
         <p:spPr bwMode="auto">
           <a:xfrm>
-            <a:off x="4842843" y="27598420"/>
-            <a:ext cx="1685918" cy="1685918"/>
+            <a:off x="4892451" y="27495176"/>
+            <a:ext cx="1390552" cy="1397918"/>
           </a:xfrm>
           <a:prstGeom prst="ellipse">
             <a:avLst/>
@@ -11541,7 +11014,7 @@
         </p:nvSpPr>
         <p:spPr bwMode="auto">
           <a:xfrm>
-            <a:off x="8803283" y="28293440"/>
+            <a:off x="8731275" y="27681920"/>
             <a:ext cx="990898" cy="990898"/>
           </a:xfrm>
           <a:prstGeom prst="ellipse">
@@ -11608,7 +11081,7 @@
         </p:nvSpPr>
         <p:spPr bwMode="auto">
           <a:xfrm>
-            <a:off x="12331675" y="28985098"/>
+            <a:off x="12331675" y="28028998"/>
             <a:ext cx="259463" cy="259463"/>
           </a:xfrm>
           <a:prstGeom prst="ellipse">
@@ -11823,7 +11296,7 @@
               <a:rPr lang="fr-FR" sz="3200" dirty="0">
                 <a:latin typeface="Berlin Sans FB" panose="020E0602020502020306" pitchFamily="34" charset="0"/>
               </a:rPr>
-              <a:t>Equipement</a:t>
+              <a:t>Équipements</a:t>
             </a:r>
           </a:p>
           <a:p>
@@ -11831,7 +11304,7 @@
               <a:rPr lang="fr-FR" sz="3200" dirty="0">
                 <a:latin typeface="Berlin Sans FB" panose="020E0602020502020306" pitchFamily="34" charset="0"/>
               </a:rPr>
-              <a:t>électroménager</a:t>
+              <a:t>électroménagers</a:t>
             </a:r>
           </a:p>
         </p:txBody>
@@ -11876,7 +11349,7 @@
         </p:nvSpPr>
         <p:spPr>
           <a:xfrm>
-            <a:off x="1108305" y="27676127"/>
+            <a:off x="1165785" y="27825472"/>
             <a:ext cx="1614883" cy="584775"/>
           </a:xfrm>
           <a:prstGeom prst="rect">
@@ -11907,7 +11380,7 @@
         </p:nvSpPr>
         <p:spPr>
           <a:xfrm>
-            <a:off x="5202883" y="28124666"/>
+            <a:off x="5058867" y="27884982"/>
             <a:ext cx="1614883" cy="584775"/>
           </a:xfrm>
           <a:prstGeom prst="rect">
@@ -11938,7 +11411,7 @@
         </p:nvSpPr>
         <p:spPr>
           <a:xfrm>
-            <a:off x="8916592" y="28483620"/>
+            <a:off x="8844584" y="27884982"/>
             <a:ext cx="1614883" cy="584775"/>
           </a:xfrm>
           <a:prstGeom prst="rect">
@@ -12081,7 +11554,7 @@
               <a:rPr lang="fr-FR" sz="3200" dirty="0">
                 <a:latin typeface="Berlin Sans FB" panose="020E0602020502020306" pitchFamily="34" charset="0"/>
               </a:rPr>
-              <a:t>Equipement</a:t>
+              <a:t>Équipements</a:t>
             </a:r>
           </a:p>
           <a:p>
@@ -12089,7 +11562,7 @@
               <a:rPr lang="fr-FR" sz="3200" dirty="0">
                 <a:latin typeface="Berlin Sans FB" panose="020E0602020502020306" pitchFamily="34" charset="0"/>
               </a:rPr>
-              <a:t>électroménager</a:t>
+              <a:t>électroménagers</a:t>
             </a:r>
           </a:p>
         </p:txBody>
@@ -12134,7 +11607,7 @@
         </p:nvSpPr>
         <p:spPr>
           <a:xfrm>
-            <a:off x="1524973" y="34140967"/>
+            <a:off x="1458467" y="34284983"/>
             <a:ext cx="1614883" cy="584775"/>
           </a:xfrm>
           <a:prstGeom prst="rect">
@@ -12165,7 +11638,7 @@
         </p:nvSpPr>
         <p:spPr bwMode="auto">
           <a:xfrm>
-            <a:off x="1674491" y="35099625"/>
+            <a:off x="1661593" y="33978307"/>
             <a:ext cx="259463" cy="274189"/>
           </a:xfrm>
           <a:prstGeom prst="ellipse">
@@ -12232,7 +11705,7 @@
         </p:nvSpPr>
         <p:spPr bwMode="auto">
           <a:xfrm>
-            <a:off x="5138080" y="34385378"/>
+            <a:off x="5165857" y="33619953"/>
             <a:ext cx="990898" cy="990898"/>
           </a:xfrm>
           <a:prstGeom prst="ellipse">
@@ -12299,7 +11772,7 @@
         </p:nvSpPr>
         <p:spPr>
           <a:xfrm>
-            <a:off x="5352359" y="34556128"/>
+            <a:off x="5391027" y="33848579"/>
             <a:ext cx="1614883" cy="584775"/>
           </a:xfrm>
           <a:prstGeom prst="rect">
@@ -12330,7 +11803,7 @@
         </p:nvSpPr>
         <p:spPr bwMode="auto">
           <a:xfrm>
-            <a:off x="8820497" y="34385378"/>
+            <a:off x="8855357" y="33624496"/>
             <a:ext cx="990898" cy="990898"/>
           </a:xfrm>
           <a:prstGeom prst="ellipse">
@@ -12397,7 +11870,7 @@
         </p:nvSpPr>
         <p:spPr>
           <a:xfrm>
-            <a:off x="9028046" y="34553827"/>
+            <a:off x="9092171" y="33871076"/>
             <a:ext cx="1614883" cy="584775"/>
           </a:xfrm>
           <a:prstGeom prst="rect">
@@ -12459,7 +11932,7 @@
         </p:nvSpPr>
         <p:spPr>
           <a:xfrm rot="16200000">
-            <a:off x="12876945" y="27957902"/>
+            <a:off x="12894372" y="27978089"/>
             <a:ext cx="2706190" cy="400110"/>
           </a:xfrm>
           <a:prstGeom prst="rect">
@@ -12488,7 +11961,7 @@
         </p:nvSpPr>
         <p:spPr>
           <a:xfrm rot="16200000">
-            <a:off x="13454026" y="34365597"/>
+            <a:off x="13471453" y="34064887"/>
             <a:ext cx="1552028" cy="400110"/>
           </a:xfrm>
           <a:prstGeom prst="rect">
@@ -12596,7 +12069,7 @@
         </p:nvSpPr>
         <p:spPr>
           <a:xfrm>
-            <a:off x="18665899" y="28298446"/>
+            <a:off x="15139430" y="28370454"/>
             <a:ext cx="8825449" cy="738664"/>
           </a:xfrm>
           <a:prstGeom prst="rect">
@@ -12646,8 +12119,8 @@
         </p:nvSpPr>
         <p:spPr>
           <a:xfrm>
-            <a:off x="16361004" y="37705792"/>
-            <a:ext cx="13464454" cy="3046017"/>
+            <a:off x="16402889" y="37705792"/>
+            <a:ext cx="13757150" cy="3046017"/>
           </a:xfrm>
           <a:prstGeom prst="roundRect">
             <a:avLst>
@@ -12707,14 +12180,14 @@
                 <a:latin typeface="Calibri" panose="020F0502020204030204" pitchFamily="34" charset="0"/>
                 <a:cs typeface="Calibri" panose="020F0502020204030204" pitchFamily="34" charset="0"/>
               </a:rPr>
-              <a:t>plus grande marge de manœuvre </a:t>
+              <a:t>plus grande marge de manœuvre</a:t>
             </a:r>
             <a:r>
               <a:rPr lang="fr-FR" sz="2400" dirty="0">
                 <a:latin typeface="Calibri" panose="020F0502020204030204" pitchFamily="34" charset="0"/>
                 <a:cs typeface="Calibri" panose="020F0502020204030204" pitchFamily="34" charset="0"/>
               </a:rPr>
-              <a:t>se trouve dans le </a:t>
+              <a:t> se trouve dans le </a:t>
             </a:r>
             <a:r>
               <a:rPr lang="fr-FR" sz="2400" b="1" u="sng" dirty="0">
@@ -12724,41 +12197,16 @@
               <a:t>taux de collecte</a:t>
             </a:r>
             <a:r>
-              <a:rPr lang="fr-FR" sz="2400" u="sng" dirty="0">
-                <a:latin typeface="Calibri" panose="020F0502020204030204" pitchFamily="34" charset="0"/>
-                <a:cs typeface="Calibri" panose="020F0502020204030204" pitchFamily="34" charset="0"/>
-              </a:rPr>
-              <a:t> </a:t>
-            </a:r>
-            <a:r>
               <a:rPr lang="fr-FR" sz="2400" dirty="0">
                 <a:latin typeface="Calibri" panose="020F0502020204030204" pitchFamily="34" charset="0"/>
                 <a:cs typeface="Calibri" panose="020F0502020204030204" pitchFamily="34" charset="0"/>
               </a:rPr>
-              <a:t>de produits qui ne représentent pas la part la plus importante des réserves de cuivre recyclable </a:t>
-            </a:r>
-            <a:r>
-              <a:rPr lang="fr-FR" sz="2400" dirty="0" smtClean="0">
-                <a:latin typeface="Calibri" panose="020F0502020204030204" pitchFamily="34" charset="0"/>
-                <a:cs typeface="Calibri" panose="020F0502020204030204" pitchFamily="34" charset="0"/>
-              </a:rPr>
-              <a:t>(par exemple, les appareils </a:t>
-            </a:r>
-            <a:r>
-              <a:rPr lang="fr-FR" sz="2400" dirty="0">
-                <a:latin typeface="Calibri" panose="020F0502020204030204" pitchFamily="34" charset="0"/>
-                <a:cs typeface="Calibri" panose="020F0502020204030204" pitchFamily="34" charset="0"/>
-              </a:rPr>
-              <a:t>électroniques</a:t>
-            </a:r>
-            <a:r>
-              <a:rPr lang="fr-FR" sz="2400" dirty="0" smtClean="0">
-                <a:latin typeface="Calibri" panose="020F0502020204030204" pitchFamily="34" charset="0"/>
-                <a:cs typeface="Calibri" panose="020F0502020204030204" pitchFamily="34" charset="0"/>
-              </a:rPr>
-              <a:t>).</a:t>
-            </a:r>
-            <a:endParaRPr lang="fr-FR" sz="2400" dirty="0">
+              <a:t> de produits qui ne représentent pas la part la plus importante des réserves de cuivre recyclable (par exemple, les appareils électroniques).</a:t>
+            </a:r>
+          </a:p>
+          <a:p>
+            <a:pPr algn="just"/>
+            <a:endParaRPr lang="fr-FR" sz="400" dirty="0">
               <a:latin typeface="Calibri" panose="020F0502020204030204" pitchFamily="34" charset="0"/>
               <a:cs typeface="Calibri" panose="020F0502020204030204" pitchFamily="34" charset="0"/>
             </a:endParaRPr>
@@ -12777,17 +12225,10 @@
                 <a:latin typeface="Calibri" panose="020F0502020204030204" pitchFamily="34" charset="0"/>
                 <a:cs typeface="Calibri" panose="020F0502020204030204" pitchFamily="34" charset="0"/>
               </a:rPr>
-              <a:t>le cuivre recyclé ne parviendra pas à satisfaire la demande en </a:t>
-            </a:r>
-            <a:r>
-              <a:rPr lang="fr-FR" sz="2400" b="1" u="sng" dirty="0" smtClean="0">
-                <a:latin typeface="Calibri" panose="020F0502020204030204" pitchFamily="34" charset="0"/>
-                <a:cs typeface="Calibri" panose="020F0502020204030204" pitchFamily="34" charset="0"/>
-              </a:rPr>
-              <a:t>France</a:t>
-            </a:r>
-            <a:r>
-              <a:rPr lang="fr-FR" sz="2400" dirty="0" smtClean="0">
+              <a:t>le cuivre recyclé ne pourra pas satisfaire la demande en France</a:t>
+            </a:r>
+            <a:r>
+              <a:rPr lang="fr-FR" sz="2400" dirty="0">
                 <a:latin typeface="Calibri" panose="020F0502020204030204" pitchFamily="34" charset="0"/>
                 <a:cs typeface="Calibri" panose="020F0502020204030204" pitchFamily="34" charset="0"/>
               </a:rPr>
@@ -12796,47 +12237,33 @@
           </a:p>
           <a:p>
             <a:pPr algn="just"/>
-            <a:r>
-              <a:rPr lang="fr-FR" sz="2400" dirty="0" smtClean="0">
-                <a:latin typeface="Calibri" panose="020F0502020204030204" pitchFamily="34" charset="0"/>
-                <a:cs typeface="Calibri" panose="020F0502020204030204" pitchFamily="34" charset="0"/>
-              </a:rPr>
-              <a:t>Cependant</a:t>
-            </a:r>
+            <a:endParaRPr lang="fr-FR" sz="900" dirty="0">
+              <a:latin typeface="Calibri" panose="020F0502020204030204" pitchFamily="34" charset="0"/>
+              <a:cs typeface="Calibri" panose="020F0502020204030204" pitchFamily="34" charset="0"/>
+            </a:endParaRPr>
+          </a:p>
+          <a:p>
+            <a:pPr algn="just"/>
             <a:r>
               <a:rPr lang="fr-FR" sz="2400" dirty="0">
                 <a:latin typeface="Calibri" panose="020F0502020204030204" pitchFamily="34" charset="0"/>
                 <a:cs typeface="Calibri" panose="020F0502020204030204" pitchFamily="34" charset="0"/>
               </a:rPr>
-              <a:t>, les choix en terme de consommation et de recyclage pourront aboutir à un </a:t>
+              <a:t>Cependant, les choix en termes de consommation et de recyclage pourront aboutir à une </a:t>
             </a:r>
             <a:r>
               <a:rPr lang="fr-FR" sz="2400" b="1" u="sng" dirty="0">
                 <a:latin typeface="Calibri" panose="020F0502020204030204" pitchFamily="34" charset="0"/>
                 <a:cs typeface="Calibri" panose="020F0502020204030204" pitchFamily="34" charset="0"/>
               </a:rPr>
-              <a:t>écart décroissant entre la demande et l’approvisionnement en </a:t>
-            </a:r>
-            <a:r>
-              <a:rPr lang="fr-FR" sz="2400" b="1" u="sng" dirty="0" smtClean="0">
-                <a:latin typeface="Calibri" panose="020F0502020204030204" pitchFamily="34" charset="0"/>
-                <a:cs typeface="Calibri" panose="020F0502020204030204" pitchFamily="34" charset="0"/>
-              </a:rPr>
-              <a:t>recyclage</a:t>
-            </a:r>
-            <a:r>
-              <a:rPr lang="fr-FR" sz="2400" dirty="0" smtClean="0">
-                <a:latin typeface="Calibri" panose="020F0502020204030204" pitchFamily="34" charset="0"/>
-                <a:cs typeface="Calibri" panose="020F0502020204030204" pitchFamily="34" charset="0"/>
-              </a:rPr>
-              <a:t>, </a:t>
+              <a:t>diminution de l’écart entre la demande en cuivre et l’approvisionnement par le recyclage</a:t>
             </a:r>
             <a:r>
               <a:rPr lang="fr-FR" sz="2400" dirty="0">
                 <a:latin typeface="Calibri" panose="020F0502020204030204" pitchFamily="34" charset="0"/>
                 <a:cs typeface="Calibri" panose="020F0502020204030204" pitchFamily="34" charset="0"/>
               </a:rPr>
-              <a:t>ce qui permettra de </a:t>
+              <a:t>, ce qui permettra de </a:t>
             </a:r>
             <a:r>
               <a:rPr lang="fr-FR" sz="2400" b="1" u="sng" dirty="0">
@@ -12878,10 +12305,9 @@
           <a:lstStyle/>
           <a:p>
             <a:r>
-              <a:rPr lang="fr-FR" sz="1600" i="1" dirty="0" smtClean="0"/>
+              <a:rPr lang="fr-FR" sz="1600" i="1" dirty="0"/>
               <a:t>(2019)</a:t>
             </a:r>
-            <a:endParaRPr lang="fr-FR" sz="1600" i="1" dirty="0"/>
           </a:p>
         </p:txBody>
       </p:sp>
@@ -12900,9 +12326,9 @@
         <p:grpSpPr>
           <a:xfrm>
             <a:off x="8803283" y="10171014"/>
-            <a:ext cx="9690655" cy="11949384"/>
+            <a:ext cx="9969778" cy="11949384"/>
             <a:chOff x="3562686" y="25673501"/>
-            <a:chExt cx="8616300" cy="7650028"/>
+            <a:chExt cx="8864478" cy="7650028"/>
           </a:xfrm>
         </p:grpSpPr>
         <p:sp>
@@ -13000,7 +12426,7 @@
           </p:nvSpPr>
           <p:spPr>
             <a:xfrm>
-              <a:off x="3883264" y="25956959"/>
+              <a:off x="4348447" y="25963773"/>
               <a:ext cx="8078717" cy="916480"/>
             </a:xfrm>
             <a:prstGeom prst="rect">
@@ -13036,7 +12462,7 @@
                   <a:cs typeface="Lora"/>
                   <a:sym typeface="Lora"/>
                 </a:rPr>
-                <a:t>Pourquoi recycler le cuivre en particulier</a:t>
+                <a:t>Pourquoi recycler le cuivre en particulier ?</a:t>
               </a:r>
               <a:endParaRPr sz="3600" b="1" dirty="0">
                 <a:solidFill>
@@ -13420,7 +12846,7 @@
           <p:nvPr/>
         </p:nvPicPr>
         <p:blipFill rotWithShape="1">
-          <a:blip r:embed="rId16">
+          <a:blip r:embed="rId15">
             <a:alphaModFix/>
           </a:blip>
           <a:srcRect l="20831" t="27074" r="23736" b="9384"/>
@@ -13428,8 +12854,8 @@
         </p:blipFill>
         <p:spPr>
           <a:xfrm>
-            <a:off x="10642929" y="17217855"/>
-            <a:ext cx="6307489" cy="4114399"/>
+            <a:off x="10001177" y="17031939"/>
+            <a:ext cx="7206986" cy="4462090"/>
           </a:xfrm>
           <a:prstGeom prst="rect">
             <a:avLst/>
@@ -13456,8 +12882,8 @@
         </p:nvSpPr>
         <p:spPr>
           <a:xfrm>
-            <a:off x="9644557" y="21494029"/>
-            <a:ext cx="8273340" cy="461665"/>
+            <a:off x="10001177" y="21608500"/>
+            <a:ext cx="7206986" cy="461665"/>
           </a:xfrm>
           <a:prstGeom prst="rect">
             <a:avLst/>
@@ -13564,25 +12990,8 @@
                 <a:latin typeface="Calibri" panose="020F0502020204030204" pitchFamily="34" charset="0"/>
                 <a:cs typeface="Calibri" panose="020F0502020204030204" pitchFamily="34" charset="0"/>
               </a:rPr>
-              <a:t>Procédé de récupération en fonction de </a:t>
-            </a:r>
-            <a:r>
-              <a:rPr lang="fr-FR" sz="3200" b="1" dirty="0" smtClean="0">
-                <a:solidFill>
-                  <a:schemeClr val="dk1"/>
-                </a:solidFill>
-                <a:latin typeface="Calibri" panose="020F0502020204030204" pitchFamily="34" charset="0"/>
-                <a:cs typeface="Calibri" panose="020F0502020204030204" pitchFamily="34" charset="0"/>
-              </a:rPr>
-              <a:t>l’objet :</a:t>
-            </a:r>
-            <a:endParaRPr lang="fr-FR" sz="3200" b="1" dirty="0">
-              <a:solidFill>
-                <a:schemeClr val="dk1"/>
-              </a:solidFill>
-              <a:latin typeface="Calibri" panose="020F0502020204030204" pitchFamily="34" charset="0"/>
-              <a:cs typeface="Calibri" panose="020F0502020204030204" pitchFamily="34" charset="0"/>
-            </a:endParaRPr>
+              <a:t>Procédé de récupération en fonction de l’objet :</a:t>
+            </a:r>
           </a:p>
           <a:p>
             <a:endParaRPr lang="fr-FR" sz="3200" dirty="0"/>
@@ -13630,33 +13039,8 @@
                 <a:latin typeface="Calibri" panose="020F0502020204030204" pitchFamily="34" charset="0"/>
                 <a:cs typeface="Calibri" panose="020F0502020204030204" pitchFamily="34" charset="0"/>
               </a:rPr>
-              <a:t>: </a:t>
-            </a:r>
-            <a:r>
-              <a:rPr lang="fr-FR" sz="2800" dirty="0" smtClean="0">
-                <a:latin typeface="Calibri" panose="020F0502020204030204" pitchFamily="34" charset="0"/>
-                <a:cs typeface="Calibri" panose="020F0502020204030204" pitchFamily="34" charset="0"/>
-              </a:rPr>
-              <a:t>granulation</a:t>
-            </a:r>
-            <a:r>
-              <a:rPr lang="fr-FR" sz="2800" dirty="0">
-                <a:latin typeface="Calibri" panose="020F0502020204030204" pitchFamily="34" charset="0"/>
-                <a:cs typeface="Calibri" panose="020F0502020204030204" pitchFamily="34" charset="0"/>
-              </a:rPr>
-              <a:t>, tamisages et </a:t>
-            </a:r>
-            <a:r>
-              <a:rPr lang="fr-FR" sz="2800" dirty="0" smtClean="0">
-                <a:latin typeface="Calibri" panose="020F0502020204030204" pitchFamily="34" charset="0"/>
-                <a:cs typeface="Calibri" panose="020F0502020204030204" pitchFamily="34" charset="0"/>
-              </a:rPr>
-              <a:t>fonderie</a:t>
-            </a:r>
-            <a:endParaRPr lang="fr-FR" sz="2800" dirty="0">
-              <a:latin typeface="Calibri" panose="020F0502020204030204" pitchFamily="34" charset="0"/>
-              <a:cs typeface="Calibri" panose="020F0502020204030204" pitchFamily="34" charset="0"/>
-            </a:endParaRPr>
+              <a:t>: granulation, tamisages et fonderie</a:t>
+            </a:r>
           </a:p>
         </p:txBody>
       </p:sp>
@@ -13684,18 +13068,11 @@
           <a:p>
             <a:pPr algn="just"/>
             <a:r>
-              <a:rPr lang="fr-FR" sz="2800" b="1" u="sng" dirty="0" smtClean="0">
-                <a:latin typeface="Calibri" panose="020F0502020204030204" pitchFamily="34" charset="0"/>
-                <a:cs typeface="Calibri" panose="020F0502020204030204" pitchFamily="34" charset="0"/>
-              </a:rPr>
-              <a:t>Carte </a:t>
-            </a:r>
-            <a:r>
               <a:rPr lang="fr-FR" sz="2800" b="1" u="sng" dirty="0">
                 <a:latin typeface="Calibri" panose="020F0502020204030204" pitchFamily="34" charset="0"/>
                 <a:cs typeface="Calibri" panose="020F0502020204030204" pitchFamily="34" charset="0"/>
               </a:rPr>
-              <a:t>électronique</a:t>
+              <a:t>Carte électronique</a:t>
             </a:r>
             <a:r>
               <a:rPr lang="fr-FR" sz="2800" b="1" dirty="0">
@@ -13733,35 +13110,21 @@
                 <a:latin typeface="Calibri" panose="020F0502020204030204" pitchFamily="34" charset="0"/>
                 <a:cs typeface="Calibri" panose="020F0502020204030204" pitchFamily="34" charset="0"/>
               </a:rPr>
-              <a:t> : broyage et </a:t>
-            </a:r>
-            <a:r>
-              <a:rPr lang="fr-FR" sz="2800" dirty="0" smtClean="0">
-                <a:latin typeface="Calibri" panose="020F0502020204030204" pitchFamily="34" charset="0"/>
-                <a:cs typeface="Calibri" panose="020F0502020204030204" pitchFamily="34" charset="0"/>
-              </a:rPr>
-              <a:t>pyrolyse, </a:t>
-            </a:r>
-            <a:r>
-              <a:rPr lang="fr-FR" sz="2800" b="1" dirty="0" smtClean="0">
+              <a:t> : broyage et pyrolyse, </a:t>
+            </a:r>
+            <a:r>
+              <a:rPr lang="fr-FR" sz="2800" b="1" dirty="0">
                 <a:latin typeface="Calibri" panose="020F0502020204030204" pitchFamily="34" charset="0"/>
                 <a:cs typeface="Calibri" panose="020F0502020204030204" pitchFamily="34" charset="0"/>
               </a:rPr>
               <a:t>très énergivore </a:t>
             </a:r>
             <a:r>
-              <a:rPr lang="fr-FR" sz="2800" dirty="0" smtClean="0">
-                <a:latin typeface="Calibri" panose="020F0502020204030204" pitchFamily="34" charset="0"/>
-                <a:cs typeface="Calibri" panose="020F0502020204030204" pitchFamily="34" charset="0"/>
-              </a:rPr>
-              <a:t>(fours </a:t>
-            </a:r>
-            <a:r>
               <a:rPr lang="fr-FR" sz="2800" dirty="0">
                 <a:latin typeface="Calibri" panose="020F0502020204030204" pitchFamily="34" charset="0"/>
                 <a:cs typeface="Calibri" panose="020F0502020204030204" pitchFamily="34" charset="0"/>
               </a:rPr>
-              <a:t>chauffés à 500 degrés)</a:t>
+              <a:t>(fours chauffés à 500 degrés)</a:t>
             </a:r>
           </a:p>
           <a:p>
@@ -13778,35 +13141,14 @@
                 <a:latin typeface="Calibri" panose="020F0502020204030204" pitchFamily="34" charset="0"/>
                 <a:cs typeface="Calibri" panose="020F0502020204030204" pitchFamily="34" charset="0"/>
               </a:rPr>
-              <a:t> : dissolution avec </a:t>
-            </a:r>
-            <a:r>
-              <a:rPr lang="fr-FR" sz="2800" dirty="0" smtClean="0">
-                <a:latin typeface="Calibri" panose="020F0502020204030204" pitchFamily="34" charset="0"/>
-                <a:cs typeface="Calibri" panose="020F0502020204030204" pitchFamily="34" charset="0"/>
-              </a:rPr>
-              <a:t>acides, </a:t>
-            </a:r>
-            <a:r>
-              <a:rPr lang="fr-FR" sz="2800" dirty="0">
-                <a:latin typeface="Calibri" panose="020F0502020204030204" pitchFamily="34" charset="0"/>
-                <a:cs typeface="Calibri" panose="020F0502020204030204" pitchFamily="34" charset="0"/>
-              </a:rPr>
-              <a:t>dégage dioxines et furanes, des </a:t>
-            </a:r>
-            <a:r>
-              <a:rPr lang="fr-FR" sz="2800" b="1" dirty="0" smtClean="0">
-                <a:latin typeface="Calibri" panose="020F0502020204030204" pitchFamily="34" charset="0"/>
-                <a:cs typeface="Calibri" panose="020F0502020204030204" pitchFamily="34" charset="0"/>
-              </a:rPr>
-              <a:t>gaz </a:t>
+              <a:t> : dissolution avec acides, dégage dioxines et furanes, des </a:t>
             </a:r>
             <a:r>
               <a:rPr lang="fr-FR" sz="2800" b="1" dirty="0">
                 <a:latin typeface="Calibri" panose="020F0502020204030204" pitchFamily="34" charset="0"/>
                 <a:cs typeface="Calibri" panose="020F0502020204030204" pitchFamily="34" charset="0"/>
               </a:rPr>
-              <a:t>nocifs </a:t>
+              <a:t>gaz nocifs </a:t>
             </a:r>
             <a:r>
               <a:rPr lang="fr-FR" sz="2800" dirty="0">
@@ -13830,21 +13172,7 @@
                 <a:latin typeface="Calibri" panose="020F0502020204030204" pitchFamily="34" charset="0"/>
                 <a:cs typeface="Calibri" panose="020F0502020204030204" pitchFamily="34" charset="0"/>
               </a:rPr>
-              <a:t> : broyage puis séparation par </a:t>
-            </a:r>
-            <a:r>
-              <a:rPr lang="fr-FR" sz="2800" dirty="0" smtClean="0">
-                <a:latin typeface="Calibri" panose="020F0502020204030204" pitchFamily="34" charset="0"/>
-                <a:cs typeface="Calibri" panose="020F0502020204030204" pitchFamily="34" charset="0"/>
-              </a:rPr>
-              <a:t>granulométrie, ne </a:t>
-            </a:r>
-            <a:r>
-              <a:rPr lang="fr-FR" sz="2800" dirty="0">
-                <a:latin typeface="Calibri" panose="020F0502020204030204" pitchFamily="34" charset="0"/>
-                <a:cs typeface="Calibri" panose="020F0502020204030204" pitchFamily="34" charset="0"/>
-              </a:rPr>
-              <a:t>récupère que 90% des métaux contre 98% avec les 2 autres méthodes </a:t>
+              <a:t> : broyage puis séparation par granulométrie, ne récupère que 90% des métaux contre 98% avec les 2 autres méthodes </a:t>
             </a:r>
           </a:p>
         </p:txBody>
@@ -13873,21 +13201,14 @@
           <a:p>
             <a:pPr algn="just"/>
             <a:r>
-              <a:rPr lang="fr-FR" sz="2800" b="1" u="sng" dirty="0" err="1">
-                <a:latin typeface="Calibri" panose="020F0502020204030204" pitchFamily="34" charset="0"/>
-                <a:cs typeface="Calibri" panose="020F0502020204030204" pitchFamily="34" charset="0"/>
-              </a:rPr>
-              <a:t>Nanofil</a:t>
-            </a:r>
-            <a:r>
               <a:rPr lang="fr-FR" sz="2800" b="1" u="sng" dirty="0">
                 <a:latin typeface="Calibri" panose="020F0502020204030204" pitchFamily="34" charset="0"/>
                 <a:cs typeface="Calibri" panose="020F0502020204030204" pitchFamily="34" charset="0"/>
               </a:rPr>
-              <a:t> de cuivre dans les chaussettes </a:t>
-            </a:r>
-            <a:r>
-              <a:rPr lang="fr-FR" sz="2800" dirty="0" smtClean="0">
+              <a:t>Nanofils de cuivre dans les chaussettes </a:t>
+            </a:r>
+            <a:r>
+              <a:rPr lang="fr-FR" sz="2800" dirty="0">
                 <a:latin typeface="Calibri" panose="020F0502020204030204" pitchFamily="34" charset="0"/>
                 <a:cs typeface="Calibri" panose="020F0502020204030204" pitchFamily="34" charset="0"/>
               </a:rPr>
@@ -13897,44 +13218,26 @@
           <a:p>
             <a:pPr algn="just"/>
             <a:r>
-              <a:rPr lang="fr-FR" sz="2800" dirty="0" smtClean="0">
-                <a:latin typeface="Calibri" panose="020F0502020204030204" pitchFamily="34" charset="0"/>
-                <a:cs typeface="Calibri" panose="020F0502020204030204" pitchFamily="34" charset="0"/>
-              </a:rPr>
-              <a:t>Utilisés pour </a:t>
-            </a:r>
-            <a:r>
               <a:rPr lang="fr-FR" sz="2800" dirty="0">
                 <a:latin typeface="Calibri" panose="020F0502020204030204" pitchFamily="34" charset="0"/>
                 <a:cs typeface="Calibri" panose="020F0502020204030204" pitchFamily="34" charset="0"/>
               </a:rPr>
-              <a:t>limiter le développement de </a:t>
-            </a:r>
-            <a:r>
-              <a:rPr lang="fr-FR" sz="2800" dirty="0" smtClean="0">
+              <a:t>Utilisés pour limiter le développement de bactéries. C’est un usage </a:t>
+            </a:r>
+            <a:r>
+              <a:rPr lang="fr-FR" sz="2800" b="1" dirty="0">
                 <a:latin typeface="Calibri" panose="020F0502020204030204" pitchFamily="34" charset="0"/>
                 <a:cs typeface="Calibri" panose="020F0502020204030204" pitchFamily="34" charset="0"/>
               </a:rPr>
-              <a:t>bactéries. C’est </a:t>
+              <a:t>dispersif</a:t>
             </a:r>
             <a:r>
               <a:rPr lang="fr-FR" sz="2800" dirty="0">
                 <a:latin typeface="Calibri" panose="020F0502020204030204" pitchFamily="34" charset="0"/>
                 <a:cs typeface="Calibri" panose="020F0502020204030204" pitchFamily="34" charset="0"/>
               </a:rPr>
-              <a:t>un usage dispersif dans lequel le cuivre ne peut pas être </a:t>
-            </a:r>
-            <a:r>
-              <a:rPr lang="fr-FR" sz="2800" dirty="0" smtClean="0">
-                <a:latin typeface="Calibri" panose="020F0502020204030204" pitchFamily="34" charset="0"/>
-                <a:cs typeface="Calibri" panose="020F0502020204030204" pitchFamily="34" charset="0"/>
-              </a:rPr>
-              <a:t>récupéré</a:t>
-            </a:r>
-            <a:endParaRPr lang="fr-FR" sz="2800" dirty="0">
-              <a:latin typeface="Calibri" panose="020F0502020204030204" pitchFamily="34" charset="0"/>
-              <a:cs typeface="Calibri" panose="020F0502020204030204" pitchFamily="34" charset="0"/>
-            </a:endParaRPr>
+              <a:t> dans lequel le cuivre ne peut pas être récupéré</a:t>
+            </a:r>
           </a:p>
         </p:txBody>
       </p:sp>
@@ -13971,39 +13274,105 @@
                 <a:latin typeface="Calibri" panose="020F0502020204030204" pitchFamily="34" charset="0"/>
                 <a:cs typeface="Calibri" panose="020F0502020204030204" pitchFamily="34" charset="0"/>
               </a:rPr>
-              <a:t>D</a:t>
-            </a:r>
-            <a:r>
-              <a:rPr lang="fr-FR" sz="2800" b="1" u="sng" dirty="0" smtClean="0">
-                <a:latin typeface="Calibri" panose="020F0502020204030204" pitchFamily="34" charset="0"/>
-                <a:cs typeface="Calibri" panose="020F0502020204030204" pitchFamily="34" charset="0"/>
-              </a:rPr>
-              <a:t>ifférence </a:t>
-            </a:r>
-            <a:r>
-              <a:rPr lang="fr-FR" sz="2800" b="1" u="sng" dirty="0">
-                <a:latin typeface="Calibri" panose="020F0502020204030204" pitchFamily="34" charset="0"/>
-                <a:cs typeface="Calibri" panose="020F0502020204030204" pitchFamily="34" charset="0"/>
-              </a:rPr>
-              <a:t>de </a:t>
-            </a:r>
-            <a:r>
-              <a:rPr lang="fr-FR" sz="2800" b="1" u="sng" dirty="0" err="1">
-                <a:latin typeface="Calibri" panose="020F0502020204030204" pitchFamily="34" charset="0"/>
-                <a:cs typeface="Calibri" panose="020F0502020204030204" pitchFamily="34" charset="0"/>
-              </a:rPr>
-              <a:t>recyclabilité</a:t>
-            </a:r>
-            <a:r>
-              <a:rPr lang="fr-FR" sz="2800" b="1" u="sng" dirty="0">
-                <a:latin typeface="Calibri" panose="020F0502020204030204" pitchFamily="34" charset="0"/>
-                <a:cs typeface="Calibri" panose="020F0502020204030204" pitchFamily="34" charset="0"/>
-              </a:rPr>
-              <a:t> selon les produits (usage dispersif ou non)</a:t>
+              <a:t>Différence de recyclabilité selon les produits (usage dispersif ou non)</a:t>
             </a:r>
           </a:p>
         </p:txBody>
       </p:sp>
+      <p:pic>
+        <p:nvPicPr>
+          <p:cNvPr id="16" name="Image 15">
+            <a:extLst>
+              <a:ext uri="{FF2B5EF4-FFF2-40B4-BE49-F238E27FC236}">
+                <a16:creationId xmlns:a16="http://schemas.microsoft.com/office/drawing/2014/main" id="{953ECA29-5C4D-4953-9440-1A36E2F8AD67}"/>
+              </a:ext>
+            </a:extLst>
+          </p:cNvPr>
+          <p:cNvPicPr>
+            <a:picLocks noChangeAspect="1"/>
+          </p:cNvPicPr>
+          <p:nvPr/>
+        </p:nvPicPr>
+        <p:blipFill>
+          <a:blip r:embed="rId16"/>
+          <a:stretch>
+            <a:fillRect/>
+          </a:stretch>
+        </p:blipFill>
+        <p:spPr>
+          <a:xfrm>
+            <a:off x="23509502" y="22764017"/>
+            <a:ext cx="6315956" cy="2400635"/>
+          </a:xfrm>
+          <a:prstGeom prst="rect">
+            <a:avLst/>
+          </a:prstGeom>
+        </p:spPr>
+      </p:pic>
+      <p:pic>
+        <p:nvPicPr>
+          <p:cNvPr id="25" name="Image 24">
+            <a:extLst>
+              <a:ext uri="{FF2B5EF4-FFF2-40B4-BE49-F238E27FC236}">
+                <a16:creationId xmlns:a16="http://schemas.microsoft.com/office/drawing/2014/main" id="{33442B08-BFB1-4B6D-93EA-42FFAC0F7B12}"/>
+              </a:ext>
+            </a:extLst>
+          </p:cNvPr>
+          <p:cNvPicPr>
+            <a:picLocks noChangeAspect="1"/>
+          </p:cNvPicPr>
+          <p:nvPr/>
+        </p:nvPicPr>
+        <p:blipFill rotWithShape="1">
+          <a:blip r:embed="rId17">
+            <a:extLst>
+              <a:ext uri="{28A0092B-C50C-407E-A947-70E740481C1C}">
+                <a14:useLocalDpi xmlns:a14="http://schemas.microsoft.com/office/drawing/2010/main" val="0"/>
+              </a:ext>
+            </a:extLst>
+          </a:blip>
+          <a:srcRect b="-933"/>
+          <a:stretch/>
+        </p:blipFill>
+        <p:spPr>
+          <a:xfrm>
+            <a:off x="17488427" y="29144763"/>
+            <a:ext cx="11309274" cy="8561029"/>
+          </a:xfrm>
+          <a:prstGeom prst="rect">
+            <a:avLst/>
+          </a:prstGeom>
+        </p:spPr>
+      </p:pic>
+      <p:pic>
+        <p:nvPicPr>
+          <p:cNvPr id="27" name="Image 26">
+            <a:extLst>
+              <a:ext uri="{FF2B5EF4-FFF2-40B4-BE49-F238E27FC236}">
+                <a16:creationId xmlns:a16="http://schemas.microsoft.com/office/drawing/2014/main" id="{48AD1D99-6099-4A79-BF1E-983CAF055BDA}"/>
+              </a:ext>
+            </a:extLst>
+          </p:cNvPr>
+          <p:cNvPicPr>
+            <a:picLocks noChangeAspect="1"/>
+          </p:cNvPicPr>
+          <p:nvPr/>
+        </p:nvPicPr>
+        <p:blipFill rotWithShape="1">
+          <a:blip r:embed="rId18"/>
+          <a:srcRect r="1182" b="12216"/>
+          <a:stretch/>
+        </p:blipFill>
+        <p:spPr>
+          <a:xfrm>
+            <a:off x="23504574" y="25416411"/>
+            <a:ext cx="6655466" cy="2540579"/>
+          </a:xfrm>
+          <a:prstGeom prst="rect">
+            <a:avLst/>
+          </a:prstGeom>
+        </p:spPr>
+      </p:pic>
     </p:spTree>
     <p:extLst>
       <p:ext uri="{BB962C8B-B14F-4D97-AF65-F5344CB8AC3E}">

</xml_diff>